<commit_message>
Added empty placeholder slides
We can have more than one slide per topic.
</commit_message>
<xml_diff>
--- a/Design Powerpoint.pptx
+++ b/Design Powerpoint.pptx
@@ -6,7 +6,12 @@
   </p:sldMasterIdLst>
   <p:sldIdLst>
     <p:sldId id="256" r:id="rId2"/>
-    <p:sldId id="257" r:id="rId3"/>
+    <p:sldId id="258" r:id="rId3"/>
+    <p:sldId id="259" r:id="rId4"/>
+    <p:sldId id="260" r:id="rId5"/>
+    <p:sldId id="261" r:id="rId6"/>
+    <p:sldId id="262" r:id="rId7"/>
+    <p:sldId id="263" r:id="rId8"/>
   </p:sldIdLst>
   <p:sldSz cx="12192000" cy="6858000"/>
   <p:notesSz cx="6858000" cy="9144000"/>
@@ -170,7 +175,7 @@
           <a:noFill/>
           <a:extLst>
             <a:ext uri="{909E8E84-426E-40dd-AFC4-6F175D3DCCD1}">
-              <a14:hiddenFill xmlns="" xmlns:a14="http://schemas.microsoft.com/office/drawing/2010/main">
+              <a14:hiddenFill xmlns:a14="http://schemas.microsoft.com/office/drawing/2010/main" xmlns="">
                 <a:solidFill>
                   <a:srgbClr val="FFFFFF"/>
                 </a:solidFill>
@@ -229,7 +234,7 @@
             </a:ln>
             <a:extLst>
               <a:ext uri="{91240B29-F687-4f45-9708-019B960494DF}">
-                <a14:hiddenLine xmlns="" xmlns:a14="http://schemas.microsoft.com/office/drawing/2010/main" w="9525">
+                <a14:hiddenLine xmlns:a14="http://schemas.microsoft.com/office/drawing/2010/main" xmlns="" w="9525">
                   <a:solidFill>
                     <a:srgbClr val="000000"/>
                   </a:solidFill>
@@ -319,7 +324,7 @@
             </a:ln>
             <a:extLst>
               <a:ext uri="{91240B29-F687-4f45-9708-019B960494DF}">
-                <a14:hiddenLine xmlns="" xmlns:a14="http://schemas.microsoft.com/office/drawing/2010/main" w="9525">
+                <a14:hiddenLine xmlns:a14="http://schemas.microsoft.com/office/drawing/2010/main" xmlns="" w="9525">
                   <a:solidFill>
                     <a:srgbClr val="000000"/>
                   </a:solidFill>
@@ -409,7 +414,7 @@
             </a:ln>
             <a:extLst>
               <a:ext uri="{91240B29-F687-4f45-9708-019B960494DF}">
-                <a14:hiddenLine xmlns="" xmlns:a14="http://schemas.microsoft.com/office/drawing/2010/main" w="9525">
+                <a14:hiddenLine xmlns:a14="http://schemas.microsoft.com/office/drawing/2010/main" xmlns="" w="9525">
                   <a:solidFill>
                     <a:srgbClr val="000000"/>
                   </a:solidFill>
@@ -443,7 +448,7 @@
             </a:ln>
             <a:extLst>
               <a:ext uri="{91240B29-F687-4f45-9708-019B960494DF}">
-                <a14:hiddenLine xmlns="" xmlns:a14="http://schemas.microsoft.com/office/drawing/2010/main" w="9525">
+                <a14:hiddenLine xmlns:a14="http://schemas.microsoft.com/office/drawing/2010/main" xmlns="" w="9525">
                   <a:solidFill>
                     <a:srgbClr val="000000"/>
                   </a:solidFill>
@@ -533,7 +538,7 @@
             </a:ln>
             <a:extLst>
               <a:ext uri="{91240B29-F687-4f45-9708-019B960494DF}">
-                <a14:hiddenLine xmlns="" xmlns:a14="http://schemas.microsoft.com/office/drawing/2010/main" w="9525">
+                <a14:hiddenLine xmlns:a14="http://schemas.microsoft.com/office/drawing/2010/main" xmlns="" w="9525">
                   <a:solidFill>
                     <a:srgbClr val="000000"/>
                   </a:solidFill>
@@ -595,7 +600,7 @@
             </a:ln>
             <a:extLst>
               <a:ext uri="{91240B29-F687-4f45-9708-019B960494DF}">
-                <a14:hiddenLine xmlns="" xmlns:a14="http://schemas.microsoft.com/office/drawing/2010/main" w="9525">
+                <a14:hiddenLine xmlns:a14="http://schemas.microsoft.com/office/drawing/2010/main" xmlns="" w="9525">
                   <a:solidFill>
                     <a:srgbClr val="000000"/>
                   </a:solidFill>
@@ -657,7 +662,7 @@
             </a:ln>
             <a:extLst>
               <a:ext uri="{91240B29-F687-4f45-9708-019B960494DF}">
-                <a14:hiddenLine xmlns="" xmlns:a14="http://schemas.microsoft.com/office/drawing/2010/main" w="9525">
+                <a14:hiddenLine xmlns:a14="http://schemas.microsoft.com/office/drawing/2010/main" xmlns="" w="9525">
                   <a:solidFill>
                     <a:srgbClr val="000000"/>
                   </a:solidFill>
@@ -747,7 +752,7 @@
             </a:ln>
             <a:extLst>
               <a:ext uri="{91240B29-F687-4f45-9708-019B960494DF}">
-                <a14:hiddenLine xmlns="" xmlns:a14="http://schemas.microsoft.com/office/drawing/2010/main" w="9525">
+                <a14:hiddenLine xmlns:a14="http://schemas.microsoft.com/office/drawing/2010/main" xmlns="" w="9525">
                   <a:solidFill>
                     <a:srgbClr val="000000"/>
                   </a:solidFill>
@@ -809,7 +814,7 @@
             </a:ln>
             <a:extLst>
               <a:ext uri="{91240B29-F687-4f45-9708-019B960494DF}">
-                <a14:hiddenLine xmlns="" xmlns:a14="http://schemas.microsoft.com/office/drawing/2010/main" w="9525">
+                <a14:hiddenLine xmlns:a14="http://schemas.microsoft.com/office/drawing/2010/main" xmlns="" w="9525">
                   <a:solidFill>
                     <a:srgbClr val="000000"/>
                   </a:solidFill>
@@ -871,7 +876,7 @@
             </a:ln>
             <a:extLst>
               <a:ext uri="{91240B29-F687-4f45-9708-019B960494DF}">
-                <a14:hiddenLine xmlns="" xmlns:a14="http://schemas.microsoft.com/office/drawing/2010/main" w="9525">
+                <a14:hiddenLine xmlns:a14="http://schemas.microsoft.com/office/drawing/2010/main" xmlns="" w="9525">
                   <a:solidFill>
                     <a:srgbClr val="000000"/>
                   </a:solidFill>
@@ -961,7 +966,7 @@
             </a:ln>
             <a:extLst>
               <a:ext uri="{91240B29-F687-4f45-9708-019B960494DF}">
-                <a14:hiddenLine xmlns="" xmlns:a14="http://schemas.microsoft.com/office/drawing/2010/main" w="9525">
+                <a14:hiddenLine xmlns:a14="http://schemas.microsoft.com/office/drawing/2010/main" xmlns="" w="9525">
                   <a:solidFill>
                     <a:srgbClr val="000000"/>
                   </a:solidFill>
@@ -1051,7 +1056,7 @@
             </a:ln>
             <a:extLst>
               <a:ext uri="{91240B29-F687-4f45-9708-019B960494DF}">
-                <a14:hiddenLine xmlns="" xmlns:a14="http://schemas.microsoft.com/office/drawing/2010/main" w="9525">
+                <a14:hiddenLine xmlns:a14="http://schemas.microsoft.com/office/drawing/2010/main" xmlns="" w="9525">
                   <a:solidFill>
                     <a:srgbClr val="000000"/>
                   </a:solidFill>
@@ -1113,7 +1118,7 @@
             </a:ln>
             <a:extLst>
               <a:ext uri="{91240B29-F687-4f45-9708-019B960494DF}">
-                <a14:hiddenLine xmlns="" xmlns:a14="http://schemas.microsoft.com/office/drawing/2010/main" w="9525">
+                <a14:hiddenLine xmlns:a14="http://schemas.microsoft.com/office/drawing/2010/main" xmlns="" w="9525">
                   <a:solidFill>
                     <a:srgbClr val="000000"/>
                   </a:solidFill>
@@ -1223,7 +1228,7 @@
             </a:ln>
             <a:extLst>
               <a:ext uri="{91240B29-F687-4f45-9708-019B960494DF}">
-                <a14:hiddenLine xmlns="" xmlns:a14="http://schemas.microsoft.com/office/drawing/2010/main" w="9525">
+                <a14:hiddenLine xmlns:a14="http://schemas.microsoft.com/office/drawing/2010/main" xmlns="" w="9525">
                   <a:solidFill>
                     <a:srgbClr val="000000"/>
                   </a:solidFill>
@@ -1285,7 +1290,7 @@
             </a:ln>
             <a:extLst>
               <a:ext uri="{91240B29-F687-4f45-9708-019B960494DF}">
-                <a14:hiddenLine xmlns="" xmlns:a14="http://schemas.microsoft.com/office/drawing/2010/main" w="9525">
+                <a14:hiddenLine xmlns:a14="http://schemas.microsoft.com/office/drawing/2010/main" xmlns="" w="9525">
                   <a:solidFill>
                     <a:srgbClr val="000000"/>
                   </a:solidFill>
@@ -1375,7 +1380,7 @@
             </a:ln>
             <a:extLst>
               <a:ext uri="{91240B29-F687-4f45-9708-019B960494DF}">
-                <a14:hiddenLine xmlns="" xmlns:a14="http://schemas.microsoft.com/office/drawing/2010/main" w="9525">
+                <a14:hiddenLine xmlns:a14="http://schemas.microsoft.com/office/drawing/2010/main" xmlns="" w="9525">
                   <a:solidFill>
                     <a:srgbClr val="000000"/>
                   </a:solidFill>
@@ -1465,7 +1470,7 @@
             </a:ln>
             <a:extLst>
               <a:ext uri="{91240B29-F687-4f45-9708-019B960494DF}">
-                <a14:hiddenLine xmlns="" xmlns:a14="http://schemas.microsoft.com/office/drawing/2010/main" w="9525">
+                <a14:hiddenLine xmlns:a14="http://schemas.microsoft.com/office/drawing/2010/main" xmlns="" w="9525">
                   <a:solidFill>
                     <a:srgbClr val="000000"/>
                   </a:solidFill>
@@ -1527,7 +1532,7 @@
             </a:ln>
             <a:extLst>
               <a:ext uri="{91240B29-F687-4f45-9708-019B960494DF}">
-                <a14:hiddenLine xmlns="" xmlns:a14="http://schemas.microsoft.com/office/drawing/2010/main" w="9525">
+                <a14:hiddenLine xmlns:a14="http://schemas.microsoft.com/office/drawing/2010/main" xmlns="" w="9525">
                   <a:solidFill>
                     <a:srgbClr val="000000"/>
                   </a:solidFill>
@@ -1617,7 +1622,7 @@
             </a:ln>
             <a:extLst>
               <a:ext uri="{91240B29-F687-4f45-9708-019B960494DF}">
-                <a14:hiddenLine xmlns="" xmlns:a14="http://schemas.microsoft.com/office/drawing/2010/main" w="9525">
+                <a14:hiddenLine xmlns:a14="http://schemas.microsoft.com/office/drawing/2010/main" xmlns="" w="9525">
                   <a:solidFill>
                     <a:srgbClr val="000000"/>
                   </a:solidFill>
@@ -1707,7 +1712,7 @@
             </a:ln>
             <a:extLst>
               <a:ext uri="{91240B29-F687-4f45-9708-019B960494DF}">
-                <a14:hiddenLine xmlns="" xmlns:a14="http://schemas.microsoft.com/office/drawing/2010/main" w="9525">
+                <a14:hiddenLine xmlns:a14="http://schemas.microsoft.com/office/drawing/2010/main" xmlns="" w="9525">
                   <a:solidFill>
                     <a:srgbClr val="000000"/>
                   </a:solidFill>
@@ -1763,7 +1768,7 @@
             </a:ln>
             <a:extLst>
               <a:ext uri="{91240B29-F687-4f45-9708-019B960494DF}">
-                <a14:hiddenLine xmlns="" xmlns:a14="http://schemas.microsoft.com/office/drawing/2010/main" w="9525">
+                <a14:hiddenLine xmlns:a14="http://schemas.microsoft.com/office/drawing/2010/main" xmlns="" w="9525">
                   <a:solidFill>
                     <a:srgbClr val="000000"/>
                   </a:solidFill>
@@ -1853,7 +1858,7 @@
             </a:ln>
             <a:extLst>
               <a:ext uri="{91240B29-F687-4f45-9708-019B960494DF}">
-                <a14:hiddenLine xmlns="" xmlns:a14="http://schemas.microsoft.com/office/drawing/2010/main" w="9525">
+                <a14:hiddenLine xmlns:a14="http://schemas.microsoft.com/office/drawing/2010/main" xmlns="" w="9525">
                   <a:solidFill>
                     <a:srgbClr val="000000"/>
                   </a:solidFill>
@@ -1909,7 +1914,7 @@
             </a:ln>
             <a:extLst>
               <a:ext uri="{91240B29-F687-4f45-9708-019B960494DF}">
-                <a14:hiddenLine xmlns="" xmlns:a14="http://schemas.microsoft.com/office/drawing/2010/main" w="9525">
+                <a14:hiddenLine xmlns:a14="http://schemas.microsoft.com/office/drawing/2010/main" xmlns="" w="9525">
                   <a:solidFill>
                     <a:srgbClr val="000000"/>
                   </a:solidFill>
@@ -1999,7 +2004,7 @@
             </a:ln>
             <a:extLst>
               <a:ext uri="{91240B29-F687-4f45-9708-019B960494DF}">
-                <a14:hiddenLine xmlns="" xmlns:a14="http://schemas.microsoft.com/office/drawing/2010/main" w="9525">
+                <a14:hiddenLine xmlns:a14="http://schemas.microsoft.com/office/drawing/2010/main" xmlns="" w="9525">
                   <a:solidFill>
                     <a:srgbClr val="000000"/>
                   </a:solidFill>
@@ -2067,7 +2072,7 @@
             </a:ln>
             <a:extLst>
               <a:ext uri="{91240B29-F687-4f45-9708-019B960494DF}">
-                <a14:hiddenLine xmlns="" xmlns:a14="http://schemas.microsoft.com/office/drawing/2010/main" w="9525">
+                <a14:hiddenLine xmlns:a14="http://schemas.microsoft.com/office/drawing/2010/main" xmlns="" w="9525">
                   <a:solidFill>
                     <a:srgbClr val="000000"/>
                   </a:solidFill>
@@ -2157,7 +2162,7 @@
             </a:ln>
             <a:extLst>
               <a:ext uri="{91240B29-F687-4f45-9708-019B960494DF}">
-                <a14:hiddenLine xmlns="" xmlns:a14="http://schemas.microsoft.com/office/drawing/2010/main" w="9525">
+                <a14:hiddenLine xmlns:a14="http://schemas.microsoft.com/office/drawing/2010/main" xmlns="" w="9525">
                   <a:solidFill>
                     <a:srgbClr val="000000"/>
                   </a:solidFill>
@@ -2225,7 +2230,7 @@
             </a:ln>
             <a:extLst>
               <a:ext uri="{91240B29-F687-4f45-9708-019B960494DF}">
-                <a14:hiddenLine xmlns="" xmlns:a14="http://schemas.microsoft.com/office/drawing/2010/main" w="9525">
+                <a14:hiddenLine xmlns:a14="http://schemas.microsoft.com/office/drawing/2010/main" xmlns="" w="9525">
                   <a:solidFill>
                     <a:srgbClr val="000000"/>
                   </a:solidFill>
@@ -2315,7 +2320,7 @@
             </a:ln>
             <a:extLst>
               <a:ext uri="{91240B29-F687-4f45-9708-019B960494DF}">
-                <a14:hiddenLine xmlns="" xmlns:a14="http://schemas.microsoft.com/office/drawing/2010/main" w="9525">
+                <a14:hiddenLine xmlns:a14="http://schemas.microsoft.com/office/drawing/2010/main" xmlns="" w="9525">
                   <a:solidFill>
                     <a:srgbClr val="000000"/>
                   </a:solidFill>
@@ -2349,7 +2354,7 @@
             </a:ln>
             <a:extLst>
               <a:ext uri="{91240B29-F687-4f45-9708-019B960494DF}">
-                <a14:hiddenLine xmlns="" xmlns:a14="http://schemas.microsoft.com/office/drawing/2010/main" w="9525">
+                <a14:hiddenLine xmlns:a14="http://schemas.microsoft.com/office/drawing/2010/main" xmlns="" w="9525">
                   <a:solidFill>
                     <a:srgbClr val="000000"/>
                   </a:solidFill>
@@ -2439,7 +2444,7 @@
             </a:ln>
             <a:extLst>
               <a:ext uri="{91240B29-F687-4f45-9708-019B960494DF}">
-                <a14:hiddenLine xmlns="" xmlns:a14="http://schemas.microsoft.com/office/drawing/2010/main" w="9525">
+                <a14:hiddenLine xmlns:a14="http://schemas.microsoft.com/office/drawing/2010/main" xmlns="" w="9525">
                   <a:solidFill>
                     <a:srgbClr val="000000"/>
                   </a:solidFill>
@@ -2501,7 +2506,7 @@
             </a:ln>
             <a:extLst>
               <a:ext uri="{91240B29-F687-4f45-9708-019B960494DF}">
-                <a14:hiddenLine xmlns="" xmlns:a14="http://schemas.microsoft.com/office/drawing/2010/main" w="9525">
+                <a14:hiddenLine xmlns:a14="http://schemas.microsoft.com/office/drawing/2010/main" xmlns="" w="9525">
                   <a:solidFill>
                     <a:srgbClr val="000000"/>
                   </a:solidFill>
@@ -2563,7 +2568,7 @@
             </a:ln>
             <a:extLst>
               <a:ext uri="{91240B29-F687-4f45-9708-019B960494DF}">
-                <a14:hiddenLine xmlns="" xmlns:a14="http://schemas.microsoft.com/office/drawing/2010/main" w="9525">
+                <a14:hiddenLine xmlns:a14="http://schemas.microsoft.com/office/drawing/2010/main" xmlns="" w="9525">
                   <a:solidFill>
                     <a:srgbClr val="000000"/>
                   </a:solidFill>
@@ -2653,7 +2658,7 @@
             </a:ln>
             <a:extLst>
               <a:ext uri="{91240B29-F687-4f45-9708-019B960494DF}">
-                <a14:hiddenLine xmlns="" xmlns:a14="http://schemas.microsoft.com/office/drawing/2010/main" w="9525">
+                <a14:hiddenLine xmlns:a14="http://schemas.microsoft.com/office/drawing/2010/main" xmlns="" w="9525">
                   <a:solidFill>
                     <a:srgbClr val="000000"/>
                   </a:solidFill>
@@ -2721,7 +2726,7 @@
             </a:ln>
             <a:extLst>
               <a:ext uri="{91240B29-F687-4f45-9708-019B960494DF}">
-                <a14:hiddenLine xmlns="" xmlns:a14="http://schemas.microsoft.com/office/drawing/2010/main" w="9525">
+                <a14:hiddenLine xmlns:a14="http://schemas.microsoft.com/office/drawing/2010/main" xmlns="" w="9525">
                   <a:solidFill>
                     <a:srgbClr val="000000"/>
                   </a:solidFill>
@@ -2783,7 +2788,7 @@
             </a:ln>
             <a:extLst>
               <a:ext uri="{91240B29-F687-4f45-9708-019B960494DF}">
-                <a14:hiddenLine xmlns="" xmlns:a14="http://schemas.microsoft.com/office/drawing/2010/main" w="9525">
+                <a14:hiddenLine xmlns:a14="http://schemas.microsoft.com/office/drawing/2010/main" xmlns="" w="9525">
                   <a:solidFill>
                     <a:srgbClr val="000000"/>
                   </a:solidFill>
@@ -2873,7 +2878,7 @@
             </a:ln>
             <a:extLst>
               <a:ext uri="{91240B29-F687-4f45-9708-019B960494DF}">
-                <a14:hiddenLine xmlns="" xmlns:a14="http://schemas.microsoft.com/office/drawing/2010/main" w="9525">
+                <a14:hiddenLine xmlns:a14="http://schemas.microsoft.com/office/drawing/2010/main" xmlns="" w="9525">
                   <a:solidFill>
                     <a:srgbClr val="000000"/>
                   </a:solidFill>
@@ -2935,7 +2940,7 @@
             </a:ln>
             <a:extLst>
               <a:ext uri="{91240B29-F687-4f45-9708-019B960494DF}">
-                <a14:hiddenLine xmlns="" xmlns:a14="http://schemas.microsoft.com/office/drawing/2010/main" w="9525">
+                <a14:hiddenLine xmlns:a14="http://schemas.microsoft.com/office/drawing/2010/main" xmlns="" w="9525">
                   <a:solidFill>
                     <a:srgbClr val="000000"/>
                   </a:solidFill>
@@ -3025,7 +3030,7 @@
             </a:ln>
             <a:extLst>
               <a:ext uri="{91240B29-F687-4f45-9708-019B960494DF}">
-                <a14:hiddenLine xmlns="" xmlns:a14="http://schemas.microsoft.com/office/drawing/2010/main" w="9525">
+                <a14:hiddenLine xmlns:a14="http://schemas.microsoft.com/office/drawing/2010/main" xmlns="" w="9525">
                   <a:solidFill>
                     <a:srgbClr val="000000"/>
                   </a:solidFill>
@@ -3087,7 +3092,7 @@
             </a:ln>
             <a:extLst>
               <a:ext uri="{91240B29-F687-4f45-9708-019B960494DF}">
-                <a14:hiddenLine xmlns="" xmlns:a14="http://schemas.microsoft.com/office/drawing/2010/main" w="9525">
+                <a14:hiddenLine xmlns:a14="http://schemas.microsoft.com/office/drawing/2010/main" xmlns="" w="9525">
                   <a:solidFill>
                     <a:srgbClr val="000000"/>
                   </a:solidFill>
@@ -3177,7 +3182,7 @@
             </a:ln>
             <a:extLst>
               <a:ext uri="{91240B29-F687-4f45-9708-019B960494DF}">
-                <a14:hiddenLine xmlns="" xmlns:a14="http://schemas.microsoft.com/office/drawing/2010/main" w="9525">
+                <a14:hiddenLine xmlns:a14="http://schemas.microsoft.com/office/drawing/2010/main" xmlns="" w="9525">
                   <a:solidFill>
                     <a:srgbClr val="000000"/>
                   </a:solidFill>
@@ -3211,7 +3216,7 @@
             </a:ln>
             <a:extLst>
               <a:ext uri="{91240B29-F687-4f45-9708-019B960494DF}">
-                <a14:hiddenLine xmlns="" xmlns:a14="http://schemas.microsoft.com/office/drawing/2010/main" w="9525">
+                <a14:hiddenLine xmlns:a14="http://schemas.microsoft.com/office/drawing/2010/main" xmlns="" w="9525">
                   <a:solidFill>
                     <a:srgbClr val="000000"/>
                   </a:solidFill>
@@ -3276,7 +3281,7 @@
             </a:ln>
             <a:extLst>
               <a:ext uri="{91240B29-F687-4f45-9708-019B960494DF}">
-                <a14:hiddenLine xmlns="" xmlns:a14="http://schemas.microsoft.com/office/drawing/2010/main" w="9525">
+                <a14:hiddenLine xmlns:a14="http://schemas.microsoft.com/office/drawing/2010/main" xmlns="" w="9525">
                   <a:solidFill>
                     <a:srgbClr val="000000"/>
                   </a:solidFill>
@@ -3366,7 +3371,7 @@
             </a:ln>
             <a:extLst>
               <a:ext uri="{91240B29-F687-4f45-9708-019B960494DF}">
-                <a14:hiddenLine xmlns="" xmlns:a14="http://schemas.microsoft.com/office/drawing/2010/main" w="9525">
+                <a14:hiddenLine xmlns:a14="http://schemas.microsoft.com/office/drawing/2010/main" xmlns="" w="9525">
                   <a:solidFill>
                     <a:srgbClr val="000000"/>
                   </a:solidFill>
@@ -3428,7 +3433,7 @@
             </a:ln>
             <a:extLst>
               <a:ext uri="{91240B29-F687-4f45-9708-019B960494DF}">
-                <a14:hiddenLine xmlns="" xmlns:a14="http://schemas.microsoft.com/office/drawing/2010/main" w="9525">
+                <a14:hiddenLine xmlns:a14="http://schemas.microsoft.com/office/drawing/2010/main" xmlns="" w="9525">
                   <a:solidFill>
                     <a:srgbClr val="000000"/>
                   </a:solidFill>
@@ -3518,7 +3523,7 @@
             </a:ln>
             <a:extLst>
               <a:ext uri="{91240B29-F687-4f45-9708-019B960494DF}">
-                <a14:hiddenLine xmlns="" xmlns:a14="http://schemas.microsoft.com/office/drawing/2010/main" w="9525">
+                <a14:hiddenLine xmlns:a14="http://schemas.microsoft.com/office/drawing/2010/main" xmlns="" w="9525">
                   <a:solidFill>
                     <a:srgbClr val="000000"/>
                   </a:solidFill>
@@ -3608,7 +3613,7 @@
             </a:ln>
             <a:extLst>
               <a:ext uri="{91240B29-F687-4f45-9708-019B960494DF}">
-                <a14:hiddenLine xmlns="" xmlns:a14="http://schemas.microsoft.com/office/drawing/2010/main" w="9525">
+                <a14:hiddenLine xmlns:a14="http://schemas.microsoft.com/office/drawing/2010/main" xmlns="" w="9525">
                   <a:solidFill>
                     <a:srgbClr val="000000"/>
                   </a:solidFill>
@@ -3673,7 +3678,7 @@
             </a:ln>
             <a:extLst>
               <a:ext uri="{91240B29-F687-4f45-9708-019B960494DF}">
-                <a14:hiddenLine xmlns="" xmlns:a14="http://schemas.microsoft.com/office/drawing/2010/main" w="9525">
+                <a14:hiddenLine xmlns:a14="http://schemas.microsoft.com/office/drawing/2010/main" xmlns="" w="9525">
                   <a:solidFill>
                     <a:srgbClr val="000000"/>
                   </a:solidFill>
@@ -3735,7 +3740,7 @@
             </a:ln>
             <a:extLst>
               <a:ext uri="{91240B29-F687-4f45-9708-019B960494DF}">
-                <a14:hiddenLine xmlns="" xmlns:a14="http://schemas.microsoft.com/office/drawing/2010/main" w="9525">
+                <a14:hiddenLine xmlns:a14="http://schemas.microsoft.com/office/drawing/2010/main" xmlns="" w="9525">
                   <a:solidFill>
                     <a:srgbClr val="000000"/>
                   </a:solidFill>
@@ -3825,7 +3830,7 @@
             </a:ln>
             <a:extLst>
               <a:ext uri="{91240B29-F687-4f45-9708-019B960494DF}">
-                <a14:hiddenLine xmlns="" xmlns:a14="http://schemas.microsoft.com/office/drawing/2010/main" w="9525">
+                <a14:hiddenLine xmlns:a14="http://schemas.microsoft.com/office/drawing/2010/main" xmlns="" w="9525">
                   <a:solidFill>
                     <a:srgbClr val="000000"/>
                   </a:solidFill>
@@ -3915,7 +3920,7 @@
             </a:ln>
             <a:extLst>
               <a:ext uri="{91240B29-F687-4f45-9708-019B960494DF}">
-                <a14:hiddenLine xmlns="" xmlns:a14="http://schemas.microsoft.com/office/drawing/2010/main" w="9525">
+                <a14:hiddenLine xmlns:a14="http://schemas.microsoft.com/office/drawing/2010/main" xmlns="" w="9525">
                   <a:solidFill>
                     <a:srgbClr val="000000"/>
                   </a:solidFill>
@@ -3977,7 +3982,7 @@
             </a:ln>
             <a:extLst>
               <a:ext uri="{91240B29-F687-4f45-9708-019B960494DF}">
-                <a14:hiddenLine xmlns="" xmlns:a14="http://schemas.microsoft.com/office/drawing/2010/main" w="9525">
+                <a14:hiddenLine xmlns:a14="http://schemas.microsoft.com/office/drawing/2010/main" xmlns="" w="9525">
                   <a:solidFill>
                     <a:srgbClr val="000000"/>
                   </a:solidFill>
@@ -4097,7 +4102,7 @@
             </a:ln>
             <a:extLst>
               <a:ext uri="{91240B29-F687-4f45-9708-019B960494DF}">
-                <a14:hiddenLine xmlns="" xmlns:a14="http://schemas.microsoft.com/office/drawing/2010/main" w="9525">
+                <a14:hiddenLine xmlns:a14="http://schemas.microsoft.com/office/drawing/2010/main" xmlns="" w="9525">
                   <a:solidFill>
                     <a:srgbClr val="000000"/>
                   </a:solidFill>
@@ -4165,7 +4170,7 @@
             </a:ln>
             <a:extLst>
               <a:ext uri="{91240B29-F687-4f45-9708-019B960494DF}">
-                <a14:hiddenLine xmlns="" xmlns:a14="http://schemas.microsoft.com/office/drawing/2010/main" w="9525">
+                <a14:hiddenLine xmlns:a14="http://schemas.microsoft.com/office/drawing/2010/main" xmlns="" w="9525">
                   <a:solidFill>
                     <a:srgbClr val="000000"/>
                   </a:solidFill>
@@ -4255,7 +4260,7 @@
             </a:ln>
             <a:extLst>
               <a:ext uri="{91240B29-F687-4f45-9708-019B960494DF}">
-                <a14:hiddenLine xmlns="" xmlns:a14="http://schemas.microsoft.com/office/drawing/2010/main" w="9525">
+                <a14:hiddenLine xmlns:a14="http://schemas.microsoft.com/office/drawing/2010/main" xmlns="" w="9525">
                   <a:solidFill>
                     <a:srgbClr val="000000"/>
                   </a:solidFill>
@@ -4395,7 +4400,7 @@
           <a:p>
             <a:fld id="{48A87A34-81AB-432B-8DAE-1953F412C126}" type="datetimeFigureOut">
               <a:rPr lang="en-US" dirty="0"/>
-              <a:t>12/19/2014</a:t>
+              <a:t>1/3/2015</a:t>
             </a:fld>
             <a:endParaRPr lang="en-US" dirty="0"/>
           </a:p>
@@ -4657,7 +4662,7 @@
           <a:p>
             <a:fld id="{48A87A34-81AB-432B-8DAE-1953F412C126}" type="datetimeFigureOut">
               <a:rPr lang="en-US" dirty="0"/>
-              <a:t>12/19/2014</a:t>
+              <a:t>1/3/2015</a:t>
             </a:fld>
             <a:endParaRPr lang="en-US" dirty="0"/>
           </a:p>
@@ -4848,7 +4853,7 @@
           <a:p>
             <a:fld id="{48A87A34-81AB-432B-8DAE-1953F412C126}" type="datetimeFigureOut">
               <a:rPr lang="en-US" dirty="0"/>
-              <a:t>12/19/2014</a:t>
+              <a:t>1/3/2015</a:t>
             </a:fld>
             <a:endParaRPr lang="en-US" dirty="0"/>
           </a:p>
@@ -5106,7 +5111,7 @@
           <a:p>
             <a:fld id="{48A87A34-81AB-432B-8DAE-1953F412C126}" type="datetimeFigureOut">
               <a:rPr lang="en-US" dirty="0"/>
-              <a:t>12/19/2014</a:t>
+              <a:t>1/3/2015</a:t>
             </a:fld>
             <a:endParaRPr lang="en-US" dirty="0"/>
           </a:p>
@@ -5535,7 +5540,7 @@
           <a:p>
             <a:fld id="{48A87A34-81AB-432B-8DAE-1953F412C126}" type="datetimeFigureOut">
               <a:rPr lang="en-US" dirty="0"/>
-              <a:t>12/19/2014</a:t>
+              <a:t>1/3/2015</a:t>
             </a:fld>
             <a:endParaRPr lang="en-US" dirty="0"/>
           </a:p>
@@ -6076,7 +6081,7 @@
           <a:p>
             <a:fld id="{48A87A34-81AB-432B-8DAE-1953F412C126}" type="datetimeFigureOut">
               <a:rPr lang="en-US" dirty="0"/>
-              <a:t>12/19/2014</a:t>
+              <a:t>1/3/2015</a:t>
             </a:fld>
             <a:endParaRPr lang="en-US" dirty="0"/>
           </a:p>
@@ -6791,7 +6796,7 @@
           <a:p>
             <a:fld id="{48A87A34-81AB-432B-8DAE-1953F412C126}" type="datetimeFigureOut">
               <a:rPr lang="en-US" dirty="0"/>
-              <a:t>12/19/2014</a:t>
+              <a:t>1/3/2015</a:t>
             </a:fld>
             <a:endParaRPr lang="en-US" dirty="0"/>
           </a:p>
@@ -6956,7 +6961,7 @@
           <a:p>
             <a:fld id="{48A87A34-81AB-432B-8DAE-1953F412C126}" type="datetimeFigureOut">
               <a:rPr lang="en-US" dirty="0"/>
-              <a:t>12/19/2014</a:t>
+              <a:t>1/3/2015</a:t>
             </a:fld>
             <a:endParaRPr lang="en-US" dirty="0"/>
           </a:p>
@@ -7131,7 +7136,7 @@
           <a:p>
             <a:fld id="{48A87A34-81AB-432B-8DAE-1953F412C126}" type="datetimeFigureOut">
               <a:rPr lang="en-US" dirty="0"/>
-              <a:t>12/19/2014</a:t>
+              <a:t>1/3/2015</a:t>
             </a:fld>
             <a:endParaRPr lang="en-US" dirty="0"/>
           </a:p>
@@ -7296,7 +7301,7 @@
           <a:p>
             <a:fld id="{48A87A34-81AB-432B-8DAE-1953F412C126}" type="datetimeFigureOut">
               <a:rPr lang="en-US" dirty="0"/>
-              <a:t>12/19/2014</a:t>
+              <a:t>1/3/2015</a:t>
             </a:fld>
             <a:endParaRPr lang="en-US" dirty="0"/>
           </a:p>
@@ -7541,7 +7546,7 @@
           <a:p>
             <a:fld id="{48A87A34-81AB-432B-8DAE-1953F412C126}" type="datetimeFigureOut">
               <a:rPr lang="en-US" dirty="0"/>
-              <a:t>12/19/2014</a:t>
+              <a:t>1/3/2015</a:t>
             </a:fld>
             <a:endParaRPr lang="en-US" dirty="0"/>
           </a:p>
@@ -7768,7 +7773,7 @@
           <a:p>
             <a:fld id="{48A87A34-81AB-432B-8DAE-1953F412C126}" type="datetimeFigureOut">
               <a:rPr lang="en-US" dirty="0"/>
-              <a:t>12/19/2014</a:t>
+              <a:t>1/3/2015</a:t>
             </a:fld>
             <a:endParaRPr lang="en-US" dirty="0"/>
           </a:p>
@@ -8144,7 +8149,7 @@
           <a:p>
             <a:fld id="{48A87A34-81AB-432B-8DAE-1953F412C126}" type="datetimeFigureOut">
               <a:rPr lang="en-US" dirty="0"/>
-              <a:t>12/19/2014</a:t>
+              <a:t>1/3/2015</a:t>
             </a:fld>
             <a:endParaRPr lang="en-US" dirty="0"/>
           </a:p>
@@ -8257,7 +8262,7 @@
           <a:p>
             <a:fld id="{48A87A34-81AB-432B-8DAE-1953F412C126}" type="datetimeFigureOut">
               <a:rPr lang="en-US" dirty="0"/>
-              <a:t>12/19/2014</a:t>
+              <a:t>1/3/2015</a:t>
             </a:fld>
             <a:endParaRPr lang="en-US" dirty="0"/>
           </a:p>
@@ -8347,7 +8352,7 @@
           <a:p>
             <a:fld id="{48A87A34-81AB-432B-8DAE-1953F412C126}" type="datetimeFigureOut">
               <a:rPr lang="en-US" dirty="0"/>
-              <a:t>12/19/2014</a:t>
+              <a:t>1/3/2015</a:t>
             </a:fld>
             <a:endParaRPr lang="en-US" dirty="0"/>
           </a:p>
@@ -8591,7 +8596,7 @@
           <a:p>
             <a:fld id="{48A87A34-81AB-432B-8DAE-1953F412C126}" type="datetimeFigureOut">
               <a:rPr lang="en-US" dirty="0"/>
-              <a:t>12/19/2014</a:t>
+              <a:t>1/3/2015</a:t>
             </a:fld>
             <a:endParaRPr lang="en-US" dirty="0"/>
           </a:p>
@@ -8866,7 +8871,7 @@
           <a:p>
             <a:fld id="{48A87A34-81AB-432B-8DAE-1953F412C126}" type="datetimeFigureOut">
               <a:rPr lang="en-US" dirty="0"/>
-              <a:t>12/19/2014</a:t>
+              <a:t>1/3/2015</a:t>
             </a:fld>
             <a:endParaRPr lang="en-US" dirty="0"/>
           </a:p>
@@ -8984,7 +8989,7 @@
           <a:noFill/>
           <a:extLst>
             <a:ext uri="{909E8E84-426E-40dd-AFC4-6F175D3DCCD1}">
-              <a14:hiddenFill xmlns="" xmlns:a14="http://schemas.microsoft.com/office/drawing/2010/main">
+              <a14:hiddenFill xmlns:a14="http://schemas.microsoft.com/office/drawing/2010/main" xmlns="">
                 <a:solidFill>
                   <a:srgbClr val="FFFFFF"/>
                 </a:solidFill>
@@ -9058,7 +9063,7 @@
               </a:ln>
               <a:extLst>
                 <a:ext uri="{91240B29-F687-4f45-9708-019B960494DF}">
-                  <a14:hiddenLine xmlns="" xmlns:a14="http://schemas.microsoft.com/office/drawing/2010/main" w="9525">
+                  <a14:hiddenLine xmlns:a14="http://schemas.microsoft.com/office/drawing/2010/main" xmlns="" w="9525">
                     <a:solidFill>
                       <a:srgbClr val="000000"/>
                     </a:solidFill>
@@ -9148,7 +9153,7 @@
               </a:ln>
               <a:extLst>
                 <a:ext uri="{91240B29-F687-4f45-9708-019B960494DF}">
-                  <a14:hiddenLine xmlns="" xmlns:a14="http://schemas.microsoft.com/office/drawing/2010/main" w="9525">
+                  <a14:hiddenLine xmlns:a14="http://schemas.microsoft.com/office/drawing/2010/main" xmlns="" w="9525">
                     <a:solidFill>
                       <a:srgbClr val="000000"/>
                     </a:solidFill>
@@ -9238,7 +9243,7 @@
               </a:ln>
               <a:extLst>
                 <a:ext uri="{91240B29-F687-4f45-9708-019B960494DF}">
-                  <a14:hiddenLine xmlns="" xmlns:a14="http://schemas.microsoft.com/office/drawing/2010/main" w="9525">
+                  <a14:hiddenLine xmlns:a14="http://schemas.microsoft.com/office/drawing/2010/main" xmlns="" w="9525">
                     <a:solidFill>
                       <a:srgbClr val="000000"/>
                     </a:solidFill>
@@ -9300,7 +9305,7 @@
               </a:ln>
               <a:extLst>
                 <a:ext uri="{91240B29-F687-4f45-9708-019B960494DF}">
-                  <a14:hiddenLine xmlns="" xmlns:a14="http://schemas.microsoft.com/office/drawing/2010/main" w="9525">
+                  <a14:hiddenLine xmlns:a14="http://schemas.microsoft.com/office/drawing/2010/main" xmlns="" w="9525">
                     <a:solidFill>
                       <a:srgbClr val="000000"/>
                     </a:solidFill>
@@ -9390,7 +9395,7 @@
               </a:ln>
               <a:extLst>
                 <a:ext uri="{91240B29-F687-4f45-9708-019B960494DF}">
-                  <a14:hiddenLine xmlns="" xmlns:a14="http://schemas.microsoft.com/office/drawing/2010/main" w="9525">
+                  <a14:hiddenLine xmlns:a14="http://schemas.microsoft.com/office/drawing/2010/main" xmlns="" w="9525">
                     <a:solidFill>
                       <a:srgbClr val="000000"/>
                     </a:solidFill>
@@ -9452,7 +9457,7 @@
               </a:ln>
               <a:extLst>
                 <a:ext uri="{91240B29-F687-4f45-9708-019B960494DF}">
-                  <a14:hiddenLine xmlns="" xmlns:a14="http://schemas.microsoft.com/office/drawing/2010/main" w="9525">
+                  <a14:hiddenLine xmlns:a14="http://schemas.microsoft.com/office/drawing/2010/main" xmlns="" w="9525">
                     <a:solidFill>
                       <a:srgbClr val="000000"/>
                     </a:solidFill>
@@ -9514,7 +9519,7 @@
               </a:ln>
               <a:extLst>
                 <a:ext uri="{91240B29-F687-4f45-9708-019B960494DF}">
-                  <a14:hiddenLine xmlns="" xmlns:a14="http://schemas.microsoft.com/office/drawing/2010/main" w="9525">
+                  <a14:hiddenLine xmlns:a14="http://schemas.microsoft.com/office/drawing/2010/main" xmlns="" w="9525">
                     <a:solidFill>
                       <a:srgbClr val="000000"/>
                     </a:solidFill>
@@ -9604,7 +9609,7 @@
               </a:ln>
               <a:extLst>
                 <a:ext uri="{91240B29-F687-4f45-9708-019B960494DF}">
-                  <a14:hiddenLine xmlns="" xmlns:a14="http://schemas.microsoft.com/office/drawing/2010/main" w="9525">
+                  <a14:hiddenLine xmlns:a14="http://schemas.microsoft.com/office/drawing/2010/main" xmlns="" w="9525">
                     <a:solidFill>
                       <a:srgbClr val="000000"/>
                     </a:solidFill>
@@ -9694,7 +9699,7 @@
               </a:ln>
               <a:extLst>
                 <a:ext uri="{91240B29-F687-4f45-9708-019B960494DF}">
-                  <a14:hiddenLine xmlns="" xmlns:a14="http://schemas.microsoft.com/office/drawing/2010/main" w="9525">
+                  <a14:hiddenLine xmlns:a14="http://schemas.microsoft.com/office/drawing/2010/main" xmlns="" w="9525">
                     <a:solidFill>
                       <a:srgbClr val="000000"/>
                     </a:solidFill>
@@ -9756,7 +9761,7 @@
               </a:ln>
               <a:extLst>
                 <a:ext uri="{91240B29-F687-4f45-9708-019B960494DF}">
-                  <a14:hiddenLine xmlns="" xmlns:a14="http://schemas.microsoft.com/office/drawing/2010/main" w="9525">
+                  <a14:hiddenLine xmlns:a14="http://schemas.microsoft.com/office/drawing/2010/main" xmlns="" w="9525">
                     <a:solidFill>
                       <a:srgbClr val="000000"/>
                     </a:solidFill>
@@ -9866,7 +9871,7 @@
               </a:ln>
               <a:extLst>
                 <a:ext uri="{91240B29-F687-4f45-9708-019B960494DF}">
-                  <a14:hiddenLine xmlns="" xmlns:a14="http://schemas.microsoft.com/office/drawing/2010/main" w="9525">
+                  <a14:hiddenLine xmlns:a14="http://schemas.microsoft.com/office/drawing/2010/main" xmlns="" w="9525">
                     <a:solidFill>
                       <a:srgbClr val="000000"/>
                     </a:solidFill>
@@ -9950,7 +9955,7 @@
               </a:ln>
               <a:extLst>
                 <a:ext uri="{91240B29-F687-4f45-9708-019B960494DF}">
-                  <a14:hiddenLine xmlns="" xmlns:a14="http://schemas.microsoft.com/office/drawing/2010/main" w="9525">
+                  <a14:hiddenLine xmlns:a14="http://schemas.microsoft.com/office/drawing/2010/main" xmlns="" w="9525">
                     <a:solidFill>
                       <a:srgbClr val="000000"/>
                     </a:solidFill>
@@ -10012,7 +10017,7 @@
               </a:ln>
               <a:extLst>
                 <a:ext uri="{91240B29-F687-4f45-9708-019B960494DF}">
-                  <a14:hiddenLine xmlns="" xmlns:a14="http://schemas.microsoft.com/office/drawing/2010/main" w="9525">
+                  <a14:hiddenLine xmlns:a14="http://schemas.microsoft.com/office/drawing/2010/main" xmlns="" w="9525">
                     <a:solidFill>
                       <a:srgbClr val="000000"/>
                     </a:solidFill>
@@ -10074,7 +10079,7 @@
               </a:ln>
               <a:extLst>
                 <a:ext uri="{91240B29-F687-4f45-9708-019B960494DF}">
-                  <a14:hiddenLine xmlns="" xmlns:a14="http://schemas.microsoft.com/office/drawing/2010/main" w="9525">
+                  <a14:hiddenLine xmlns:a14="http://schemas.microsoft.com/office/drawing/2010/main" xmlns="" w="9525">
                     <a:solidFill>
                       <a:srgbClr val="000000"/>
                     </a:solidFill>
@@ -10164,7 +10169,7 @@
               </a:ln>
               <a:extLst>
                 <a:ext uri="{91240B29-F687-4f45-9708-019B960494DF}">
-                  <a14:hiddenLine xmlns="" xmlns:a14="http://schemas.microsoft.com/office/drawing/2010/main" w="9525">
+                  <a14:hiddenLine xmlns:a14="http://schemas.microsoft.com/office/drawing/2010/main" xmlns="" w="9525">
                     <a:solidFill>
                       <a:srgbClr val="000000"/>
                     </a:solidFill>
@@ -10198,7 +10203,7 @@
               </a:ln>
               <a:extLst>
                 <a:ext uri="{91240B29-F687-4f45-9708-019B960494DF}">
-                  <a14:hiddenLine xmlns="" xmlns:a14="http://schemas.microsoft.com/office/drawing/2010/main" w="9525">
+                  <a14:hiddenLine xmlns:a14="http://schemas.microsoft.com/office/drawing/2010/main" xmlns="" w="9525">
                     <a:solidFill>
                       <a:srgbClr val="000000"/>
                     </a:solidFill>
@@ -10263,7 +10268,7 @@
               </a:ln>
               <a:extLst>
                 <a:ext uri="{91240B29-F687-4f45-9708-019B960494DF}">
-                  <a14:hiddenLine xmlns="" xmlns:a14="http://schemas.microsoft.com/office/drawing/2010/main" w="9525">
+                  <a14:hiddenLine xmlns:a14="http://schemas.microsoft.com/office/drawing/2010/main" xmlns="" w="9525">
                     <a:solidFill>
                       <a:srgbClr val="000000"/>
                     </a:solidFill>
@@ -10353,7 +10358,7 @@
               </a:ln>
               <a:extLst>
                 <a:ext uri="{91240B29-F687-4f45-9708-019B960494DF}">
-                  <a14:hiddenLine xmlns="" xmlns:a14="http://schemas.microsoft.com/office/drawing/2010/main" w="9525">
+                  <a14:hiddenLine xmlns:a14="http://schemas.microsoft.com/office/drawing/2010/main" xmlns="" w="9525">
                     <a:solidFill>
                       <a:srgbClr val="000000"/>
                     </a:solidFill>
@@ -10415,7 +10420,7 @@
               </a:ln>
               <a:extLst>
                 <a:ext uri="{91240B29-F687-4f45-9708-019B960494DF}">
-                  <a14:hiddenLine xmlns="" xmlns:a14="http://schemas.microsoft.com/office/drawing/2010/main" w="9525">
+                  <a14:hiddenLine xmlns:a14="http://schemas.microsoft.com/office/drawing/2010/main" xmlns="" w="9525">
                     <a:solidFill>
                       <a:srgbClr val="000000"/>
                     </a:solidFill>
@@ -10505,7 +10510,7 @@
               </a:ln>
               <a:extLst>
                 <a:ext uri="{91240B29-F687-4f45-9708-019B960494DF}">
-                  <a14:hiddenLine xmlns="" xmlns:a14="http://schemas.microsoft.com/office/drawing/2010/main" w="9525">
+                  <a14:hiddenLine xmlns:a14="http://schemas.microsoft.com/office/drawing/2010/main" xmlns="" w="9525">
                     <a:solidFill>
                       <a:srgbClr val="000000"/>
                     </a:solidFill>
@@ -10570,7 +10575,7 @@
               </a:ln>
               <a:extLst>
                 <a:ext uri="{91240B29-F687-4f45-9708-019B960494DF}">
-                  <a14:hiddenLine xmlns="" xmlns:a14="http://schemas.microsoft.com/office/drawing/2010/main" w="9525">
+                  <a14:hiddenLine xmlns:a14="http://schemas.microsoft.com/office/drawing/2010/main" xmlns="" w="9525">
                     <a:solidFill>
                       <a:srgbClr val="000000"/>
                     </a:solidFill>
@@ -10632,7 +10637,7 @@
               </a:ln>
               <a:extLst>
                 <a:ext uri="{91240B29-F687-4f45-9708-019B960494DF}">
-                  <a14:hiddenLine xmlns="" xmlns:a14="http://schemas.microsoft.com/office/drawing/2010/main" w="9525">
+                  <a14:hiddenLine xmlns:a14="http://schemas.microsoft.com/office/drawing/2010/main" xmlns="" w="9525">
                     <a:solidFill>
                       <a:srgbClr val="000000"/>
                     </a:solidFill>
@@ -10722,7 +10727,7 @@
               </a:ln>
               <a:extLst>
                 <a:ext uri="{91240B29-F687-4f45-9708-019B960494DF}">
-                  <a14:hiddenLine xmlns="" xmlns:a14="http://schemas.microsoft.com/office/drawing/2010/main" w="9525">
+                  <a14:hiddenLine xmlns:a14="http://schemas.microsoft.com/office/drawing/2010/main" xmlns="" w="9525">
                     <a:solidFill>
                       <a:srgbClr val="000000"/>
                     </a:solidFill>
@@ -10812,7 +10817,7 @@
               </a:ln>
               <a:extLst>
                 <a:ext uri="{91240B29-F687-4f45-9708-019B960494DF}">
-                  <a14:hiddenLine xmlns="" xmlns:a14="http://schemas.microsoft.com/office/drawing/2010/main" w="9525">
+                  <a14:hiddenLine xmlns:a14="http://schemas.microsoft.com/office/drawing/2010/main" xmlns="" w="9525">
                     <a:solidFill>
                       <a:srgbClr val="000000"/>
                     </a:solidFill>
@@ -10877,7 +10882,7 @@
               </a:ln>
               <a:extLst>
                 <a:ext uri="{91240B29-F687-4f45-9708-019B960494DF}">
-                  <a14:hiddenLine xmlns="" xmlns:a14="http://schemas.microsoft.com/office/drawing/2010/main" w="9525">
+                  <a14:hiddenLine xmlns:a14="http://schemas.microsoft.com/office/drawing/2010/main" xmlns="" w="9525">
                     <a:solidFill>
                       <a:srgbClr val="000000"/>
                     </a:solidFill>
@@ -10997,7 +11002,7 @@
               </a:ln>
               <a:extLst>
                 <a:ext uri="{91240B29-F687-4f45-9708-019B960494DF}">
-                  <a14:hiddenLine xmlns="" xmlns:a14="http://schemas.microsoft.com/office/drawing/2010/main" w="9525">
+                  <a14:hiddenLine xmlns:a14="http://schemas.microsoft.com/office/drawing/2010/main" xmlns="" w="9525">
                     <a:solidFill>
                       <a:srgbClr val="000000"/>
                     </a:solidFill>
@@ -11078,7 +11083,7 @@
               </a:ln>
               <a:extLst>
                 <a:ext uri="{91240B29-F687-4f45-9708-019B960494DF}">
-                  <a14:hiddenLine xmlns="" xmlns:a14="http://schemas.microsoft.com/office/drawing/2010/main" w="9525">
+                  <a14:hiddenLine xmlns:a14="http://schemas.microsoft.com/office/drawing/2010/main" xmlns="" w="9525">
                     <a:solidFill>
                       <a:srgbClr val="000000"/>
                     </a:solidFill>
@@ -11193,7 +11198,7 @@
               </a:ln>
               <a:extLst>
                 <a:ext uri="{91240B29-F687-4f45-9708-019B960494DF}">
-                  <a14:hiddenLine xmlns="" xmlns:a14="http://schemas.microsoft.com/office/drawing/2010/main" w="9525">
+                  <a14:hiddenLine xmlns:a14="http://schemas.microsoft.com/office/drawing/2010/main" xmlns="" w="9525">
                     <a:solidFill>
                       <a:srgbClr val="000000"/>
                     </a:solidFill>
@@ -11283,7 +11288,7 @@
               </a:ln>
               <a:extLst>
                 <a:ext uri="{91240B29-F687-4f45-9708-019B960494DF}">
-                  <a14:hiddenLine xmlns="" xmlns:a14="http://schemas.microsoft.com/office/drawing/2010/main" w="9525">
+                  <a14:hiddenLine xmlns:a14="http://schemas.microsoft.com/office/drawing/2010/main" xmlns="" w="9525">
                     <a:solidFill>
                       <a:srgbClr val="000000"/>
                     </a:solidFill>
@@ -11348,7 +11353,7 @@
               </a:ln>
               <a:extLst>
                 <a:ext uri="{91240B29-F687-4f45-9708-019B960494DF}">
-                  <a14:hiddenLine xmlns="" xmlns:a14="http://schemas.microsoft.com/office/drawing/2010/main" w="9525">
+                  <a14:hiddenLine xmlns:a14="http://schemas.microsoft.com/office/drawing/2010/main" xmlns="" w="9525">
                     <a:solidFill>
                       <a:srgbClr val="000000"/>
                     </a:solidFill>
@@ -11438,7 +11443,7 @@
               </a:ln>
               <a:extLst>
                 <a:ext uri="{91240B29-F687-4f45-9708-019B960494DF}">
-                  <a14:hiddenLine xmlns="" xmlns:a14="http://schemas.microsoft.com/office/drawing/2010/main" w="9525">
+                  <a14:hiddenLine xmlns:a14="http://schemas.microsoft.com/office/drawing/2010/main" xmlns="" w="9525">
                     <a:solidFill>
                       <a:srgbClr val="000000"/>
                     </a:solidFill>
@@ -11506,7 +11511,7 @@
               </a:ln>
               <a:extLst>
                 <a:ext uri="{91240B29-F687-4f45-9708-019B960494DF}">
-                  <a14:hiddenLine xmlns="" xmlns:a14="http://schemas.microsoft.com/office/drawing/2010/main" w="9525">
+                  <a14:hiddenLine xmlns:a14="http://schemas.microsoft.com/office/drawing/2010/main" xmlns="" w="9525">
                     <a:solidFill>
                       <a:srgbClr val="000000"/>
                     </a:solidFill>
@@ -11596,7 +11601,7 @@
               </a:ln>
               <a:extLst>
                 <a:ext uri="{91240B29-F687-4f45-9708-019B960494DF}">
-                  <a14:hiddenLine xmlns="" xmlns:a14="http://schemas.microsoft.com/office/drawing/2010/main" w="9525">
+                  <a14:hiddenLine xmlns:a14="http://schemas.microsoft.com/office/drawing/2010/main" xmlns="" w="9525">
                     <a:solidFill>
                       <a:srgbClr val="000000"/>
                     </a:solidFill>
@@ -11664,7 +11669,7 @@
               </a:ln>
               <a:extLst>
                 <a:ext uri="{91240B29-F687-4f45-9708-019B960494DF}">
-                  <a14:hiddenLine xmlns="" xmlns:a14="http://schemas.microsoft.com/office/drawing/2010/main" w="9525">
+                  <a14:hiddenLine xmlns:a14="http://schemas.microsoft.com/office/drawing/2010/main" xmlns="" w="9525">
                     <a:solidFill>
                       <a:srgbClr val="000000"/>
                     </a:solidFill>
@@ -11754,7 +11759,7 @@
               </a:ln>
               <a:extLst>
                 <a:ext uri="{91240B29-F687-4f45-9708-019B960494DF}">
-                  <a14:hiddenLine xmlns="" xmlns:a14="http://schemas.microsoft.com/office/drawing/2010/main" w="9525">
+                  <a14:hiddenLine xmlns:a14="http://schemas.microsoft.com/office/drawing/2010/main" xmlns="" w="9525">
                     <a:solidFill>
                       <a:srgbClr val="000000"/>
                     </a:solidFill>
@@ -11788,7 +11793,7 @@
               </a:ln>
               <a:extLst>
                 <a:ext uri="{91240B29-F687-4f45-9708-019B960494DF}">
-                  <a14:hiddenLine xmlns="" xmlns:a14="http://schemas.microsoft.com/office/drawing/2010/main" w="9525">
+                  <a14:hiddenLine xmlns:a14="http://schemas.microsoft.com/office/drawing/2010/main" xmlns="" w="9525">
                     <a:solidFill>
                       <a:srgbClr val="000000"/>
                     </a:solidFill>
@@ -11929,7 +11934,7 @@
             <a:fld id="{48A87A34-81AB-432B-8DAE-1953F412C126}" type="datetimeFigureOut">
               <a:rPr lang="en-US" dirty="0"/>
               <a:pPr/>
-              <a:t>12/19/2014</a:t>
+              <a:t>1/3/2015</a:t>
             </a:fld>
             <a:endParaRPr lang="en-US" dirty="0"/>
           </a:p>
@@ -12464,7 +12469,7 @@
           <a:p>
             <a:r>
               <a:rPr lang="en-US" dirty="0" smtClean="0"/>
-              <a:t>Remove this slide, please</a:t>
+              <a:t>Background</a:t>
             </a:r>
             <a:endParaRPr lang="en-US" dirty="0"/>
           </a:p>
@@ -12485,68 +12490,374 @@
           <a:bodyPr/>
           <a:lstStyle/>
           <a:p>
-            <a:r>
-              <a:rPr lang="en-US" dirty="0" smtClean="0"/>
-              <a:t>Problem statement </a:t>
-            </a:r>
-            <a:r>
-              <a:rPr lang="en-US" dirty="0" smtClean="0"/>
-              <a:t>and</a:t>
-            </a:r>
-            <a:r>
-              <a:rPr lang="en-US" dirty="0" smtClean="0"/>
-              <a:t> </a:t>
-            </a:r>
-            <a:r>
-              <a:rPr lang="en-US" dirty="0" smtClean="0"/>
-              <a:t>why legs and pneumatics</a:t>
-            </a:r>
-          </a:p>
-          <a:p>
-            <a:r>
-              <a:rPr lang="en-US" dirty="0" smtClean="0"/>
-              <a:t>Mechanical Design – Justin</a:t>
-            </a:r>
-          </a:p>
-          <a:p>
-            <a:r>
-              <a:rPr lang="en-US" dirty="0" smtClean="0"/>
-              <a:t>Pneumatic circuits – Ronaldo </a:t>
-            </a:r>
-          </a:p>
-          <a:p>
-            <a:r>
-              <a:rPr lang="en-US" dirty="0" smtClean="0"/>
-              <a:t>Simulation and verification/equations – Logan</a:t>
-            </a:r>
-          </a:p>
-          <a:p>
-            <a:r>
-              <a:rPr lang="en-US" dirty="0" smtClean="0"/>
-              <a:t>Control architecture and black magic – Tyler</a:t>
-            </a:r>
-          </a:p>
-          <a:p>
-            <a:r>
-              <a:rPr lang="en-US" dirty="0" smtClean="0"/>
-              <a:t>Questions, </a:t>
-            </a:r>
-            <a:r>
-              <a:rPr lang="en-US" dirty="0" err="1" smtClean="0"/>
-              <a:t>stupids</a:t>
-            </a:r>
-            <a:r>
-              <a:rPr lang="en-US" dirty="0" smtClean="0"/>
-              <a:t>?</a:t>
-            </a:r>
-            <a:endParaRPr lang="en-US" dirty="0"/>
+            <a:endParaRPr lang="en-US"/>
           </a:p>
         </p:txBody>
       </p:sp>
     </p:spTree>
     <p:extLst>
       <p:ext uri="{BB962C8B-B14F-4D97-AF65-F5344CB8AC3E}">
-        <p14:creationId xmlns:p14="http://schemas.microsoft.com/office/powerpoint/2010/main" val="2100871770"/>
+        <p14:creationId xmlns:p14="http://schemas.microsoft.com/office/powerpoint/2010/main" val="3501672542"/>
+      </p:ext>
+    </p:extLst>
+  </p:cSld>
+  <p:clrMapOvr>
+    <a:masterClrMapping/>
+  </p:clrMapOvr>
+</p:sld>
+</file>
+
+<file path=ppt/slides/slide3.xml><?xml version="1.0" encoding="utf-8"?>
+<p:sld xmlns:a="http://schemas.openxmlformats.org/drawingml/2006/main" xmlns:r="http://schemas.openxmlformats.org/officeDocument/2006/relationships" xmlns:p="http://schemas.openxmlformats.org/presentationml/2006/main">
+  <p:cSld>
+    <p:spTree>
+      <p:nvGrpSpPr>
+        <p:cNvPr id="1" name=""/>
+        <p:cNvGrpSpPr/>
+        <p:nvPr/>
+      </p:nvGrpSpPr>
+      <p:grpSpPr>
+        <a:xfrm>
+          <a:off x="0" y="0"/>
+          <a:ext cx="0" cy="0"/>
+          <a:chOff x="0" y="0"/>
+          <a:chExt cx="0" cy="0"/>
+        </a:xfrm>
+      </p:grpSpPr>
+      <p:sp>
+        <p:nvSpPr>
+          <p:cNvPr id="2" name="Title 1"/>
+          <p:cNvSpPr>
+            <a:spLocks noGrp="1"/>
+          </p:cNvSpPr>
+          <p:nvPr>
+            <p:ph type="title"/>
+          </p:nvPr>
+        </p:nvSpPr>
+        <p:spPr/>
+        <p:txBody>
+          <a:bodyPr/>
+          <a:lstStyle/>
+          <a:p>
+            <a:r>
+              <a:rPr lang="en-US" dirty="0" smtClean="0"/>
+              <a:t>Mechanical Design</a:t>
+            </a:r>
+            <a:endParaRPr lang="en-US" dirty="0"/>
+          </a:p>
+        </p:txBody>
+      </p:sp>
+      <p:sp>
+        <p:nvSpPr>
+          <p:cNvPr id="3" name="Content Placeholder 2"/>
+          <p:cNvSpPr>
+            <a:spLocks noGrp="1"/>
+          </p:cNvSpPr>
+          <p:nvPr>
+            <p:ph idx="1"/>
+          </p:nvPr>
+        </p:nvSpPr>
+        <p:spPr/>
+        <p:txBody>
+          <a:bodyPr/>
+          <a:lstStyle/>
+          <a:p>
+            <a:endParaRPr lang="en-US"/>
+          </a:p>
+        </p:txBody>
+      </p:sp>
+    </p:spTree>
+    <p:extLst>
+      <p:ext uri="{BB962C8B-B14F-4D97-AF65-F5344CB8AC3E}">
+        <p14:creationId xmlns:p14="http://schemas.microsoft.com/office/powerpoint/2010/main" val="4056473331"/>
+      </p:ext>
+    </p:extLst>
+  </p:cSld>
+  <p:clrMapOvr>
+    <a:masterClrMapping/>
+  </p:clrMapOvr>
+</p:sld>
+</file>
+
+<file path=ppt/slides/slide4.xml><?xml version="1.0" encoding="utf-8"?>
+<p:sld xmlns:a="http://schemas.openxmlformats.org/drawingml/2006/main" xmlns:r="http://schemas.openxmlformats.org/officeDocument/2006/relationships" xmlns:p="http://schemas.openxmlformats.org/presentationml/2006/main">
+  <p:cSld>
+    <p:spTree>
+      <p:nvGrpSpPr>
+        <p:cNvPr id="1" name=""/>
+        <p:cNvGrpSpPr/>
+        <p:nvPr/>
+      </p:nvGrpSpPr>
+      <p:grpSpPr>
+        <a:xfrm>
+          <a:off x="0" y="0"/>
+          <a:ext cx="0" cy="0"/>
+          <a:chOff x="0" y="0"/>
+          <a:chExt cx="0" cy="0"/>
+        </a:xfrm>
+      </p:grpSpPr>
+      <p:sp>
+        <p:nvSpPr>
+          <p:cNvPr id="2" name="Title 1"/>
+          <p:cNvSpPr>
+            <a:spLocks noGrp="1"/>
+          </p:cNvSpPr>
+          <p:nvPr>
+            <p:ph type="title"/>
+          </p:nvPr>
+        </p:nvSpPr>
+        <p:spPr/>
+        <p:txBody>
+          <a:bodyPr/>
+          <a:lstStyle/>
+          <a:p>
+            <a:r>
+              <a:rPr lang="en-US" dirty="0" smtClean="0"/>
+              <a:t>Pneumatic Design</a:t>
+            </a:r>
+            <a:endParaRPr lang="en-US" dirty="0"/>
+          </a:p>
+        </p:txBody>
+      </p:sp>
+      <p:sp>
+        <p:nvSpPr>
+          <p:cNvPr id="3" name="Content Placeholder 2"/>
+          <p:cNvSpPr>
+            <a:spLocks noGrp="1"/>
+          </p:cNvSpPr>
+          <p:nvPr>
+            <p:ph idx="1"/>
+          </p:nvPr>
+        </p:nvSpPr>
+        <p:spPr/>
+        <p:txBody>
+          <a:bodyPr/>
+          <a:lstStyle/>
+          <a:p>
+            <a:endParaRPr lang="en-US"/>
+          </a:p>
+        </p:txBody>
+      </p:sp>
+    </p:spTree>
+    <p:extLst>
+      <p:ext uri="{BB962C8B-B14F-4D97-AF65-F5344CB8AC3E}">
+        <p14:creationId xmlns:p14="http://schemas.microsoft.com/office/powerpoint/2010/main" val="1387209749"/>
+      </p:ext>
+    </p:extLst>
+  </p:cSld>
+  <p:clrMapOvr>
+    <a:masterClrMapping/>
+  </p:clrMapOvr>
+</p:sld>
+</file>
+
+<file path=ppt/slides/slide5.xml><?xml version="1.0" encoding="utf-8"?>
+<p:sld xmlns:a="http://schemas.openxmlformats.org/drawingml/2006/main" xmlns:r="http://schemas.openxmlformats.org/officeDocument/2006/relationships" xmlns:p="http://schemas.openxmlformats.org/presentationml/2006/main">
+  <p:cSld>
+    <p:spTree>
+      <p:nvGrpSpPr>
+        <p:cNvPr id="1" name=""/>
+        <p:cNvGrpSpPr/>
+        <p:nvPr/>
+      </p:nvGrpSpPr>
+      <p:grpSpPr>
+        <a:xfrm>
+          <a:off x="0" y="0"/>
+          <a:ext cx="0" cy="0"/>
+          <a:chOff x="0" y="0"/>
+          <a:chExt cx="0" cy="0"/>
+        </a:xfrm>
+      </p:grpSpPr>
+      <p:sp>
+        <p:nvSpPr>
+          <p:cNvPr id="2" name="Title 1"/>
+          <p:cNvSpPr>
+            <a:spLocks noGrp="1"/>
+          </p:cNvSpPr>
+          <p:nvPr>
+            <p:ph type="title"/>
+          </p:nvPr>
+        </p:nvSpPr>
+        <p:spPr/>
+        <p:txBody>
+          <a:bodyPr/>
+          <a:lstStyle/>
+          <a:p>
+            <a:r>
+              <a:rPr lang="en-US" dirty="0" smtClean="0"/>
+              <a:t>Simulation and Verification</a:t>
+            </a:r>
+            <a:endParaRPr lang="en-US" dirty="0"/>
+          </a:p>
+        </p:txBody>
+      </p:sp>
+      <p:sp>
+        <p:nvSpPr>
+          <p:cNvPr id="3" name="Content Placeholder 2"/>
+          <p:cNvSpPr>
+            <a:spLocks noGrp="1"/>
+          </p:cNvSpPr>
+          <p:nvPr>
+            <p:ph idx="1"/>
+          </p:nvPr>
+        </p:nvSpPr>
+        <p:spPr/>
+        <p:txBody>
+          <a:bodyPr/>
+          <a:lstStyle/>
+          <a:p>
+            <a:endParaRPr lang="en-US"/>
+          </a:p>
+        </p:txBody>
+      </p:sp>
+    </p:spTree>
+    <p:extLst>
+      <p:ext uri="{BB962C8B-B14F-4D97-AF65-F5344CB8AC3E}">
+        <p14:creationId xmlns:p14="http://schemas.microsoft.com/office/powerpoint/2010/main" val="3978015491"/>
+      </p:ext>
+    </p:extLst>
+  </p:cSld>
+  <p:clrMapOvr>
+    <a:masterClrMapping/>
+  </p:clrMapOvr>
+</p:sld>
+</file>
+
+<file path=ppt/slides/slide6.xml><?xml version="1.0" encoding="utf-8"?>
+<p:sld xmlns:a="http://schemas.openxmlformats.org/drawingml/2006/main" xmlns:r="http://schemas.openxmlformats.org/officeDocument/2006/relationships" xmlns:p="http://schemas.openxmlformats.org/presentationml/2006/main">
+  <p:cSld>
+    <p:spTree>
+      <p:nvGrpSpPr>
+        <p:cNvPr id="1" name=""/>
+        <p:cNvGrpSpPr/>
+        <p:nvPr/>
+      </p:nvGrpSpPr>
+      <p:grpSpPr>
+        <a:xfrm>
+          <a:off x="0" y="0"/>
+          <a:ext cx="0" cy="0"/>
+          <a:chOff x="0" y="0"/>
+          <a:chExt cx="0" cy="0"/>
+        </a:xfrm>
+      </p:grpSpPr>
+      <p:sp>
+        <p:nvSpPr>
+          <p:cNvPr id="2" name="Title 1"/>
+          <p:cNvSpPr>
+            <a:spLocks noGrp="1"/>
+          </p:cNvSpPr>
+          <p:nvPr>
+            <p:ph type="title"/>
+          </p:nvPr>
+        </p:nvSpPr>
+        <p:spPr/>
+        <p:txBody>
+          <a:bodyPr/>
+          <a:lstStyle/>
+          <a:p>
+            <a:r>
+              <a:rPr lang="en-US" dirty="0" smtClean="0"/>
+              <a:t>Control architecture and electronics</a:t>
+            </a:r>
+            <a:endParaRPr lang="en-US" dirty="0"/>
+          </a:p>
+        </p:txBody>
+      </p:sp>
+      <p:sp>
+        <p:nvSpPr>
+          <p:cNvPr id="3" name="Content Placeholder 2"/>
+          <p:cNvSpPr>
+            <a:spLocks noGrp="1"/>
+          </p:cNvSpPr>
+          <p:nvPr>
+            <p:ph idx="1"/>
+          </p:nvPr>
+        </p:nvSpPr>
+        <p:spPr/>
+        <p:txBody>
+          <a:bodyPr/>
+          <a:lstStyle/>
+          <a:p>
+            <a:endParaRPr lang="en-US"/>
+          </a:p>
+        </p:txBody>
+      </p:sp>
+    </p:spTree>
+    <p:extLst>
+      <p:ext uri="{BB962C8B-B14F-4D97-AF65-F5344CB8AC3E}">
+        <p14:creationId xmlns:p14="http://schemas.microsoft.com/office/powerpoint/2010/main" val="3700963556"/>
+      </p:ext>
+    </p:extLst>
+  </p:cSld>
+  <p:clrMapOvr>
+    <a:masterClrMapping/>
+  </p:clrMapOvr>
+</p:sld>
+</file>
+
+<file path=ppt/slides/slide7.xml><?xml version="1.0" encoding="utf-8"?>
+<p:sld xmlns:a="http://schemas.openxmlformats.org/drawingml/2006/main" xmlns:r="http://schemas.openxmlformats.org/officeDocument/2006/relationships" xmlns:p="http://schemas.openxmlformats.org/presentationml/2006/main">
+  <p:cSld>
+    <p:spTree>
+      <p:nvGrpSpPr>
+        <p:cNvPr id="1" name=""/>
+        <p:cNvGrpSpPr/>
+        <p:nvPr/>
+      </p:nvGrpSpPr>
+      <p:grpSpPr>
+        <a:xfrm>
+          <a:off x="0" y="0"/>
+          <a:ext cx="0" cy="0"/>
+          <a:chOff x="0" y="0"/>
+          <a:chExt cx="0" cy="0"/>
+        </a:xfrm>
+      </p:grpSpPr>
+      <p:sp>
+        <p:nvSpPr>
+          <p:cNvPr id="2" name="Title 1"/>
+          <p:cNvSpPr>
+            <a:spLocks noGrp="1"/>
+          </p:cNvSpPr>
+          <p:nvPr>
+            <p:ph type="title"/>
+          </p:nvPr>
+        </p:nvSpPr>
+        <p:spPr/>
+        <p:txBody>
+          <a:bodyPr/>
+          <a:lstStyle/>
+          <a:p>
+            <a:r>
+              <a:rPr lang="en-US" dirty="0" smtClean="0"/>
+              <a:t>Questions?</a:t>
+            </a:r>
+            <a:endParaRPr lang="en-US" dirty="0"/>
+          </a:p>
+        </p:txBody>
+      </p:sp>
+      <p:sp>
+        <p:nvSpPr>
+          <p:cNvPr id="3" name="Content Placeholder 2"/>
+          <p:cNvSpPr>
+            <a:spLocks noGrp="1"/>
+          </p:cNvSpPr>
+          <p:nvPr>
+            <p:ph idx="1"/>
+          </p:nvPr>
+        </p:nvSpPr>
+        <p:spPr/>
+        <p:txBody>
+          <a:bodyPr/>
+          <a:lstStyle/>
+          <a:p>
+            <a:endParaRPr lang="en-US"/>
+          </a:p>
+        </p:txBody>
+      </p:sp>
+    </p:spTree>
+    <p:extLst>
+      <p:ext uri="{BB962C8B-B14F-4D97-AF65-F5344CB8AC3E}">
+        <p14:creationId xmlns:p14="http://schemas.microsoft.com/office/powerpoint/2010/main" val="1223679356"/>
       </p:ext>
     </p:extLst>
   </p:cSld>

</xml_diff>

<commit_message>
Added initial simulation and verification slides
</commit_message>
<xml_diff>
--- a/Design Powerpoint.pptx
+++ b/Design Powerpoint.pptx
@@ -7,11 +7,14 @@
   <p:sldIdLst>
     <p:sldId id="256" r:id="rId2"/>
     <p:sldId id="258" r:id="rId3"/>
-    <p:sldId id="259" r:id="rId4"/>
-    <p:sldId id="260" r:id="rId5"/>
-    <p:sldId id="261" r:id="rId6"/>
-    <p:sldId id="262" r:id="rId7"/>
-    <p:sldId id="263" r:id="rId8"/>
+    <p:sldId id="264" r:id="rId4"/>
+    <p:sldId id="259" r:id="rId5"/>
+    <p:sldId id="260" r:id="rId6"/>
+    <p:sldId id="261" r:id="rId7"/>
+    <p:sldId id="265" r:id="rId8"/>
+    <p:sldId id="266" r:id="rId9"/>
+    <p:sldId id="262" r:id="rId10"/>
+    <p:sldId id="263" r:id="rId11"/>
   </p:sldIdLst>
   <p:sldSz cx="12192000" cy="6858000"/>
   <p:notesSz cx="6858000" cy="9144000"/>
@@ -175,7 +178,7 @@
           <a:noFill/>
           <a:extLst>
             <a:ext uri="{909E8E84-426E-40dd-AFC4-6F175D3DCCD1}">
-              <a14:hiddenFill xmlns:a14="http://schemas.microsoft.com/office/drawing/2010/main" xmlns="">
+              <a14:hiddenFill xmlns="" xmlns:a14="http://schemas.microsoft.com/office/drawing/2010/main">
                 <a:solidFill>
                   <a:srgbClr val="FFFFFF"/>
                 </a:solidFill>
@@ -234,7 +237,7 @@
             </a:ln>
             <a:extLst>
               <a:ext uri="{91240B29-F687-4f45-9708-019B960494DF}">
-                <a14:hiddenLine xmlns:a14="http://schemas.microsoft.com/office/drawing/2010/main" xmlns="" w="9525">
+                <a14:hiddenLine xmlns="" xmlns:a14="http://schemas.microsoft.com/office/drawing/2010/main" w="9525">
                   <a:solidFill>
                     <a:srgbClr val="000000"/>
                   </a:solidFill>
@@ -324,7 +327,7 @@
             </a:ln>
             <a:extLst>
               <a:ext uri="{91240B29-F687-4f45-9708-019B960494DF}">
-                <a14:hiddenLine xmlns:a14="http://schemas.microsoft.com/office/drawing/2010/main" xmlns="" w="9525">
+                <a14:hiddenLine xmlns="" xmlns:a14="http://schemas.microsoft.com/office/drawing/2010/main" w="9525">
                   <a:solidFill>
                     <a:srgbClr val="000000"/>
                   </a:solidFill>
@@ -414,7 +417,7 @@
             </a:ln>
             <a:extLst>
               <a:ext uri="{91240B29-F687-4f45-9708-019B960494DF}">
-                <a14:hiddenLine xmlns:a14="http://schemas.microsoft.com/office/drawing/2010/main" xmlns="" w="9525">
+                <a14:hiddenLine xmlns="" xmlns:a14="http://schemas.microsoft.com/office/drawing/2010/main" w="9525">
                   <a:solidFill>
                     <a:srgbClr val="000000"/>
                   </a:solidFill>
@@ -448,7 +451,7 @@
             </a:ln>
             <a:extLst>
               <a:ext uri="{91240B29-F687-4f45-9708-019B960494DF}">
-                <a14:hiddenLine xmlns:a14="http://schemas.microsoft.com/office/drawing/2010/main" xmlns="" w="9525">
+                <a14:hiddenLine xmlns="" xmlns:a14="http://schemas.microsoft.com/office/drawing/2010/main" w="9525">
                   <a:solidFill>
                     <a:srgbClr val="000000"/>
                   </a:solidFill>
@@ -538,7 +541,7 @@
             </a:ln>
             <a:extLst>
               <a:ext uri="{91240B29-F687-4f45-9708-019B960494DF}">
-                <a14:hiddenLine xmlns:a14="http://schemas.microsoft.com/office/drawing/2010/main" xmlns="" w="9525">
+                <a14:hiddenLine xmlns="" xmlns:a14="http://schemas.microsoft.com/office/drawing/2010/main" w="9525">
                   <a:solidFill>
                     <a:srgbClr val="000000"/>
                   </a:solidFill>
@@ -600,7 +603,7 @@
             </a:ln>
             <a:extLst>
               <a:ext uri="{91240B29-F687-4f45-9708-019B960494DF}">
-                <a14:hiddenLine xmlns:a14="http://schemas.microsoft.com/office/drawing/2010/main" xmlns="" w="9525">
+                <a14:hiddenLine xmlns="" xmlns:a14="http://schemas.microsoft.com/office/drawing/2010/main" w="9525">
                   <a:solidFill>
                     <a:srgbClr val="000000"/>
                   </a:solidFill>
@@ -662,7 +665,7 @@
             </a:ln>
             <a:extLst>
               <a:ext uri="{91240B29-F687-4f45-9708-019B960494DF}">
-                <a14:hiddenLine xmlns:a14="http://schemas.microsoft.com/office/drawing/2010/main" xmlns="" w="9525">
+                <a14:hiddenLine xmlns="" xmlns:a14="http://schemas.microsoft.com/office/drawing/2010/main" w="9525">
                   <a:solidFill>
                     <a:srgbClr val="000000"/>
                   </a:solidFill>
@@ -752,7 +755,7 @@
             </a:ln>
             <a:extLst>
               <a:ext uri="{91240B29-F687-4f45-9708-019B960494DF}">
-                <a14:hiddenLine xmlns:a14="http://schemas.microsoft.com/office/drawing/2010/main" xmlns="" w="9525">
+                <a14:hiddenLine xmlns="" xmlns:a14="http://schemas.microsoft.com/office/drawing/2010/main" w="9525">
                   <a:solidFill>
                     <a:srgbClr val="000000"/>
                   </a:solidFill>
@@ -814,7 +817,7 @@
             </a:ln>
             <a:extLst>
               <a:ext uri="{91240B29-F687-4f45-9708-019B960494DF}">
-                <a14:hiddenLine xmlns:a14="http://schemas.microsoft.com/office/drawing/2010/main" xmlns="" w="9525">
+                <a14:hiddenLine xmlns="" xmlns:a14="http://schemas.microsoft.com/office/drawing/2010/main" w="9525">
                   <a:solidFill>
                     <a:srgbClr val="000000"/>
                   </a:solidFill>
@@ -876,7 +879,7 @@
             </a:ln>
             <a:extLst>
               <a:ext uri="{91240B29-F687-4f45-9708-019B960494DF}">
-                <a14:hiddenLine xmlns:a14="http://schemas.microsoft.com/office/drawing/2010/main" xmlns="" w="9525">
+                <a14:hiddenLine xmlns="" xmlns:a14="http://schemas.microsoft.com/office/drawing/2010/main" w="9525">
                   <a:solidFill>
                     <a:srgbClr val="000000"/>
                   </a:solidFill>
@@ -966,7 +969,7 @@
             </a:ln>
             <a:extLst>
               <a:ext uri="{91240B29-F687-4f45-9708-019B960494DF}">
-                <a14:hiddenLine xmlns:a14="http://schemas.microsoft.com/office/drawing/2010/main" xmlns="" w="9525">
+                <a14:hiddenLine xmlns="" xmlns:a14="http://schemas.microsoft.com/office/drawing/2010/main" w="9525">
                   <a:solidFill>
                     <a:srgbClr val="000000"/>
                   </a:solidFill>
@@ -1056,7 +1059,7 @@
             </a:ln>
             <a:extLst>
               <a:ext uri="{91240B29-F687-4f45-9708-019B960494DF}">
-                <a14:hiddenLine xmlns:a14="http://schemas.microsoft.com/office/drawing/2010/main" xmlns="" w="9525">
+                <a14:hiddenLine xmlns="" xmlns:a14="http://schemas.microsoft.com/office/drawing/2010/main" w="9525">
                   <a:solidFill>
                     <a:srgbClr val="000000"/>
                   </a:solidFill>
@@ -1118,7 +1121,7 @@
             </a:ln>
             <a:extLst>
               <a:ext uri="{91240B29-F687-4f45-9708-019B960494DF}">
-                <a14:hiddenLine xmlns:a14="http://schemas.microsoft.com/office/drawing/2010/main" xmlns="" w="9525">
+                <a14:hiddenLine xmlns="" xmlns:a14="http://schemas.microsoft.com/office/drawing/2010/main" w="9525">
                   <a:solidFill>
                     <a:srgbClr val="000000"/>
                   </a:solidFill>
@@ -1228,7 +1231,7 @@
             </a:ln>
             <a:extLst>
               <a:ext uri="{91240B29-F687-4f45-9708-019B960494DF}">
-                <a14:hiddenLine xmlns:a14="http://schemas.microsoft.com/office/drawing/2010/main" xmlns="" w="9525">
+                <a14:hiddenLine xmlns="" xmlns:a14="http://schemas.microsoft.com/office/drawing/2010/main" w="9525">
                   <a:solidFill>
                     <a:srgbClr val="000000"/>
                   </a:solidFill>
@@ -1290,7 +1293,7 @@
             </a:ln>
             <a:extLst>
               <a:ext uri="{91240B29-F687-4f45-9708-019B960494DF}">
-                <a14:hiddenLine xmlns:a14="http://schemas.microsoft.com/office/drawing/2010/main" xmlns="" w="9525">
+                <a14:hiddenLine xmlns="" xmlns:a14="http://schemas.microsoft.com/office/drawing/2010/main" w="9525">
                   <a:solidFill>
                     <a:srgbClr val="000000"/>
                   </a:solidFill>
@@ -1380,7 +1383,7 @@
             </a:ln>
             <a:extLst>
               <a:ext uri="{91240B29-F687-4f45-9708-019B960494DF}">
-                <a14:hiddenLine xmlns:a14="http://schemas.microsoft.com/office/drawing/2010/main" xmlns="" w="9525">
+                <a14:hiddenLine xmlns="" xmlns:a14="http://schemas.microsoft.com/office/drawing/2010/main" w="9525">
                   <a:solidFill>
                     <a:srgbClr val="000000"/>
                   </a:solidFill>
@@ -1470,7 +1473,7 @@
             </a:ln>
             <a:extLst>
               <a:ext uri="{91240B29-F687-4f45-9708-019B960494DF}">
-                <a14:hiddenLine xmlns:a14="http://schemas.microsoft.com/office/drawing/2010/main" xmlns="" w="9525">
+                <a14:hiddenLine xmlns="" xmlns:a14="http://schemas.microsoft.com/office/drawing/2010/main" w="9525">
                   <a:solidFill>
                     <a:srgbClr val="000000"/>
                   </a:solidFill>
@@ -1532,7 +1535,7 @@
             </a:ln>
             <a:extLst>
               <a:ext uri="{91240B29-F687-4f45-9708-019B960494DF}">
-                <a14:hiddenLine xmlns:a14="http://schemas.microsoft.com/office/drawing/2010/main" xmlns="" w="9525">
+                <a14:hiddenLine xmlns="" xmlns:a14="http://schemas.microsoft.com/office/drawing/2010/main" w="9525">
                   <a:solidFill>
                     <a:srgbClr val="000000"/>
                   </a:solidFill>
@@ -1622,7 +1625,7 @@
             </a:ln>
             <a:extLst>
               <a:ext uri="{91240B29-F687-4f45-9708-019B960494DF}">
-                <a14:hiddenLine xmlns:a14="http://schemas.microsoft.com/office/drawing/2010/main" xmlns="" w="9525">
+                <a14:hiddenLine xmlns="" xmlns:a14="http://schemas.microsoft.com/office/drawing/2010/main" w="9525">
                   <a:solidFill>
                     <a:srgbClr val="000000"/>
                   </a:solidFill>
@@ -1712,7 +1715,7 @@
             </a:ln>
             <a:extLst>
               <a:ext uri="{91240B29-F687-4f45-9708-019B960494DF}">
-                <a14:hiddenLine xmlns:a14="http://schemas.microsoft.com/office/drawing/2010/main" xmlns="" w="9525">
+                <a14:hiddenLine xmlns="" xmlns:a14="http://schemas.microsoft.com/office/drawing/2010/main" w="9525">
                   <a:solidFill>
                     <a:srgbClr val="000000"/>
                   </a:solidFill>
@@ -1768,7 +1771,7 @@
             </a:ln>
             <a:extLst>
               <a:ext uri="{91240B29-F687-4f45-9708-019B960494DF}">
-                <a14:hiddenLine xmlns:a14="http://schemas.microsoft.com/office/drawing/2010/main" xmlns="" w="9525">
+                <a14:hiddenLine xmlns="" xmlns:a14="http://schemas.microsoft.com/office/drawing/2010/main" w="9525">
                   <a:solidFill>
                     <a:srgbClr val="000000"/>
                   </a:solidFill>
@@ -1858,7 +1861,7 @@
             </a:ln>
             <a:extLst>
               <a:ext uri="{91240B29-F687-4f45-9708-019B960494DF}">
-                <a14:hiddenLine xmlns:a14="http://schemas.microsoft.com/office/drawing/2010/main" xmlns="" w="9525">
+                <a14:hiddenLine xmlns="" xmlns:a14="http://schemas.microsoft.com/office/drawing/2010/main" w="9525">
                   <a:solidFill>
                     <a:srgbClr val="000000"/>
                   </a:solidFill>
@@ -1914,7 +1917,7 @@
             </a:ln>
             <a:extLst>
               <a:ext uri="{91240B29-F687-4f45-9708-019B960494DF}">
-                <a14:hiddenLine xmlns:a14="http://schemas.microsoft.com/office/drawing/2010/main" xmlns="" w="9525">
+                <a14:hiddenLine xmlns="" xmlns:a14="http://schemas.microsoft.com/office/drawing/2010/main" w="9525">
                   <a:solidFill>
                     <a:srgbClr val="000000"/>
                   </a:solidFill>
@@ -2004,7 +2007,7 @@
             </a:ln>
             <a:extLst>
               <a:ext uri="{91240B29-F687-4f45-9708-019B960494DF}">
-                <a14:hiddenLine xmlns:a14="http://schemas.microsoft.com/office/drawing/2010/main" xmlns="" w="9525">
+                <a14:hiddenLine xmlns="" xmlns:a14="http://schemas.microsoft.com/office/drawing/2010/main" w="9525">
                   <a:solidFill>
                     <a:srgbClr val="000000"/>
                   </a:solidFill>
@@ -2072,7 +2075,7 @@
             </a:ln>
             <a:extLst>
               <a:ext uri="{91240B29-F687-4f45-9708-019B960494DF}">
-                <a14:hiddenLine xmlns:a14="http://schemas.microsoft.com/office/drawing/2010/main" xmlns="" w="9525">
+                <a14:hiddenLine xmlns="" xmlns:a14="http://schemas.microsoft.com/office/drawing/2010/main" w="9525">
                   <a:solidFill>
                     <a:srgbClr val="000000"/>
                   </a:solidFill>
@@ -2162,7 +2165,7 @@
             </a:ln>
             <a:extLst>
               <a:ext uri="{91240B29-F687-4f45-9708-019B960494DF}">
-                <a14:hiddenLine xmlns:a14="http://schemas.microsoft.com/office/drawing/2010/main" xmlns="" w="9525">
+                <a14:hiddenLine xmlns="" xmlns:a14="http://schemas.microsoft.com/office/drawing/2010/main" w="9525">
                   <a:solidFill>
                     <a:srgbClr val="000000"/>
                   </a:solidFill>
@@ -2230,7 +2233,7 @@
             </a:ln>
             <a:extLst>
               <a:ext uri="{91240B29-F687-4f45-9708-019B960494DF}">
-                <a14:hiddenLine xmlns:a14="http://schemas.microsoft.com/office/drawing/2010/main" xmlns="" w="9525">
+                <a14:hiddenLine xmlns="" xmlns:a14="http://schemas.microsoft.com/office/drawing/2010/main" w="9525">
                   <a:solidFill>
                     <a:srgbClr val="000000"/>
                   </a:solidFill>
@@ -2320,7 +2323,7 @@
             </a:ln>
             <a:extLst>
               <a:ext uri="{91240B29-F687-4f45-9708-019B960494DF}">
-                <a14:hiddenLine xmlns:a14="http://schemas.microsoft.com/office/drawing/2010/main" xmlns="" w="9525">
+                <a14:hiddenLine xmlns="" xmlns:a14="http://schemas.microsoft.com/office/drawing/2010/main" w="9525">
                   <a:solidFill>
                     <a:srgbClr val="000000"/>
                   </a:solidFill>
@@ -2354,7 +2357,7 @@
             </a:ln>
             <a:extLst>
               <a:ext uri="{91240B29-F687-4f45-9708-019B960494DF}">
-                <a14:hiddenLine xmlns:a14="http://schemas.microsoft.com/office/drawing/2010/main" xmlns="" w="9525">
+                <a14:hiddenLine xmlns="" xmlns:a14="http://schemas.microsoft.com/office/drawing/2010/main" w="9525">
                   <a:solidFill>
                     <a:srgbClr val="000000"/>
                   </a:solidFill>
@@ -2444,7 +2447,7 @@
             </a:ln>
             <a:extLst>
               <a:ext uri="{91240B29-F687-4f45-9708-019B960494DF}">
-                <a14:hiddenLine xmlns:a14="http://schemas.microsoft.com/office/drawing/2010/main" xmlns="" w="9525">
+                <a14:hiddenLine xmlns="" xmlns:a14="http://schemas.microsoft.com/office/drawing/2010/main" w="9525">
                   <a:solidFill>
                     <a:srgbClr val="000000"/>
                   </a:solidFill>
@@ -2506,7 +2509,7 @@
             </a:ln>
             <a:extLst>
               <a:ext uri="{91240B29-F687-4f45-9708-019B960494DF}">
-                <a14:hiddenLine xmlns:a14="http://schemas.microsoft.com/office/drawing/2010/main" xmlns="" w="9525">
+                <a14:hiddenLine xmlns="" xmlns:a14="http://schemas.microsoft.com/office/drawing/2010/main" w="9525">
                   <a:solidFill>
                     <a:srgbClr val="000000"/>
                   </a:solidFill>
@@ -2568,7 +2571,7 @@
             </a:ln>
             <a:extLst>
               <a:ext uri="{91240B29-F687-4f45-9708-019B960494DF}">
-                <a14:hiddenLine xmlns:a14="http://schemas.microsoft.com/office/drawing/2010/main" xmlns="" w="9525">
+                <a14:hiddenLine xmlns="" xmlns:a14="http://schemas.microsoft.com/office/drawing/2010/main" w="9525">
                   <a:solidFill>
                     <a:srgbClr val="000000"/>
                   </a:solidFill>
@@ -2658,7 +2661,7 @@
             </a:ln>
             <a:extLst>
               <a:ext uri="{91240B29-F687-4f45-9708-019B960494DF}">
-                <a14:hiddenLine xmlns:a14="http://schemas.microsoft.com/office/drawing/2010/main" xmlns="" w="9525">
+                <a14:hiddenLine xmlns="" xmlns:a14="http://schemas.microsoft.com/office/drawing/2010/main" w="9525">
                   <a:solidFill>
                     <a:srgbClr val="000000"/>
                   </a:solidFill>
@@ -2726,7 +2729,7 @@
             </a:ln>
             <a:extLst>
               <a:ext uri="{91240B29-F687-4f45-9708-019B960494DF}">
-                <a14:hiddenLine xmlns:a14="http://schemas.microsoft.com/office/drawing/2010/main" xmlns="" w="9525">
+                <a14:hiddenLine xmlns="" xmlns:a14="http://schemas.microsoft.com/office/drawing/2010/main" w="9525">
                   <a:solidFill>
                     <a:srgbClr val="000000"/>
                   </a:solidFill>
@@ -2788,7 +2791,7 @@
             </a:ln>
             <a:extLst>
               <a:ext uri="{91240B29-F687-4f45-9708-019B960494DF}">
-                <a14:hiddenLine xmlns:a14="http://schemas.microsoft.com/office/drawing/2010/main" xmlns="" w="9525">
+                <a14:hiddenLine xmlns="" xmlns:a14="http://schemas.microsoft.com/office/drawing/2010/main" w="9525">
                   <a:solidFill>
                     <a:srgbClr val="000000"/>
                   </a:solidFill>
@@ -2878,7 +2881,7 @@
             </a:ln>
             <a:extLst>
               <a:ext uri="{91240B29-F687-4f45-9708-019B960494DF}">
-                <a14:hiddenLine xmlns:a14="http://schemas.microsoft.com/office/drawing/2010/main" xmlns="" w="9525">
+                <a14:hiddenLine xmlns="" xmlns:a14="http://schemas.microsoft.com/office/drawing/2010/main" w="9525">
                   <a:solidFill>
                     <a:srgbClr val="000000"/>
                   </a:solidFill>
@@ -2940,7 +2943,7 @@
             </a:ln>
             <a:extLst>
               <a:ext uri="{91240B29-F687-4f45-9708-019B960494DF}">
-                <a14:hiddenLine xmlns:a14="http://schemas.microsoft.com/office/drawing/2010/main" xmlns="" w="9525">
+                <a14:hiddenLine xmlns="" xmlns:a14="http://schemas.microsoft.com/office/drawing/2010/main" w="9525">
                   <a:solidFill>
                     <a:srgbClr val="000000"/>
                   </a:solidFill>
@@ -3030,7 +3033,7 @@
             </a:ln>
             <a:extLst>
               <a:ext uri="{91240B29-F687-4f45-9708-019B960494DF}">
-                <a14:hiddenLine xmlns:a14="http://schemas.microsoft.com/office/drawing/2010/main" xmlns="" w="9525">
+                <a14:hiddenLine xmlns="" xmlns:a14="http://schemas.microsoft.com/office/drawing/2010/main" w="9525">
                   <a:solidFill>
                     <a:srgbClr val="000000"/>
                   </a:solidFill>
@@ -3092,7 +3095,7 @@
             </a:ln>
             <a:extLst>
               <a:ext uri="{91240B29-F687-4f45-9708-019B960494DF}">
-                <a14:hiddenLine xmlns:a14="http://schemas.microsoft.com/office/drawing/2010/main" xmlns="" w="9525">
+                <a14:hiddenLine xmlns="" xmlns:a14="http://schemas.microsoft.com/office/drawing/2010/main" w="9525">
                   <a:solidFill>
                     <a:srgbClr val="000000"/>
                   </a:solidFill>
@@ -3182,7 +3185,7 @@
             </a:ln>
             <a:extLst>
               <a:ext uri="{91240B29-F687-4f45-9708-019B960494DF}">
-                <a14:hiddenLine xmlns:a14="http://schemas.microsoft.com/office/drawing/2010/main" xmlns="" w="9525">
+                <a14:hiddenLine xmlns="" xmlns:a14="http://schemas.microsoft.com/office/drawing/2010/main" w="9525">
                   <a:solidFill>
                     <a:srgbClr val="000000"/>
                   </a:solidFill>
@@ -3216,7 +3219,7 @@
             </a:ln>
             <a:extLst>
               <a:ext uri="{91240B29-F687-4f45-9708-019B960494DF}">
-                <a14:hiddenLine xmlns:a14="http://schemas.microsoft.com/office/drawing/2010/main" xmlns="" w="9525">
+                <a14:hiddenLine xmlns="" xmlns:a14="http://schemas.microsoft.com/office/drawing/2010/main" w="9525">
                   <a:solidFill>
                     <a:srgbClr val="000000"/>
                   </a:solidFill>
@@ -3281,7 +3284,7 @@
             </a:ln>
             <a:extLst>
               <a:ext uri="{91240B29-F687-4f45-9708-019B960494DF}">
-                <a14:hiddenLine xmlns:a14="http://schemas.microsoft.com/office/drawing/2010/main" xmlns="" w="9525">
+                <a14:hiddenLine xmlns="" xmlns:a14="http://schemas.microsoft.com/office/drawing/2010/main" w="9525">
                   <a:solidFill>
                     <a:srgbClr val="000000"/>
                   </a:solidFill>
@@ -3371,7 +3374,7 @@
             </a:ln>
             <a:extLst>
               <a:ext uri="{91240B29-F687-4f45-9708-019B960494DF}">
-                <a14:hiddenLine xmlns:a14="http://schemas.microsoft.com/office/drawing/2010/main" xmlns="" w="9525">
+                <a14:hiddenLine xmlns="" xmlns:a14="http://schemas.microsoft.com/office/drawing/2010/main" w="9525">
                   <a:solidFill>
                     <a:srgbClr val="000000"/>
                   </a:solidFill>
@@ -3433,7 +3436,7 @@
             </a:ln>
             <a:extLst>
               <a:ext uri="{91240B29-F687-4f45-9708-019B960494DF}">
-                <a14:hiddenLine xmlns:a14="http://schemas.microsoft.com/office/drawing/2010/main" xmlns="" w="9525">
+                <a14:hiddenLine xmlns="" xmlns:a14="http://schemas.microsoft.com/office/drawing/2010/main" w="9525">
                   <a:solidFill>
                     <a:srgbClr val="000000"/>
                   </a:solidFill>
@@ -3523,7 +3526,7 @@
             </a:ln>
             <a:extLst>
               <a:ext uri="{91240B29-F687-4f45-9708-019B960494DF}">
-                <a14:hiddenLine xmlns:a14="http://schemas.microsoft.com/office/drawing/2010/main" xmlns="" w="9525">
+                <a14:hiddenLine xmlns="" xmlns:a14="http://schemas.microsoft.com/office/drawing/2010/main" w="9525">
                   <a:solidFill>
                     <a:srgbClr val="000000"/>
                   </a:solidFill>
@@ -3613,7 +3616,7 @@
             </a:ln>
             <a:extLst>
               <a:ext uri="{91240B29-F687-4f45-9708-019B960494DF}">
-                <a14:hiddenLine xmlns:a14="http://schemas.microsoft.com/office/drawing/2010/main" xmlns="" w="9525">
+                <a14:hiddenLine xmlns="" xmlns:a14="http://schemas.microsoft.com/office/drawing/2010/main" w="9525">
                   <a:solidFill>
                     <a:srgbClr val="000000"/>
                   </a:solidFill>
@@ -3678,7 +3681,7 @@
             </a:ln>
             <a:extLst>
               <a:ext uri="{91240B29-F687-4f45-9708-019B960494DF}">
-                <a14:hiddenLine xmlns:a14="http://schemas.microsoft.com/office/drawing/2010/main" xmlns="" w="9525">
+                <a14:hiddenLine xmlns="" xmlns:a14="http://schemas.microsoft.com/office/drawing/2010/main" w="9525">
                   <a:solidFill>
                     <a:srgbClr val="000000"/>
                   </a:solidFill>
@@ -3740,7 +3743,7 @@
             </a:ln>
             <a:extLst>
               <a:ext uri="{91240B29-F687-4f45-9708-019B960494DF}">
-                <a14:hiddenLine xmlns:a14="http://schemas.microsoft.com/office/drawing/2010/main" xmlns="" w="9525">
+                <a14:hiddenLine xmlns="" xmlns:a14="http://schemas.microsoft.com/office/drawing/2010/main" w="9525">
                   <a:solidFill>
                     <a:srgbClr val="000000"/>
                   </a:solidFill>
@@ -3830,7 +3833,7 @@
             </a:ln>
             <a:extLst>
               <a:ext uri="{91240B29-F687-4f45-9708-019B960494DF}">
-                <a14:hiddenLine xmlns:a14="http://schemas.microsoft.com/office/drawing/2010/main" xmlns="" w="9525">
+                <a14:hiddenLine xmlns="" xmlns:a14="http://schemas.microsoft.com/office/drawing/2010/main" w="9525">
                   <a:solidFill>
                     <a:srgbClr val="000000"/>
                   </a:solidFill>
@@ -3920,7 +3923,7 @@
             </a:ln>
             <a:extLst>
               <a:ext uri="{91240B29-F687-4f45-9708-019B960494DF}">
-                <a14:hiddenLine xmlns:a14="http://schemas.microsoft.com/office/drawing/2010/main" xmlns="" w="9525">
+                <a14:hiddenLine xmlns="" xmlns:a14="http://schemas.microsoft.com/office/drawing/2010/main" w="9525">
                   <a:solidFill>
                     <a:srgbClr val="000000"/>
                   </a:solidFill>
@@ -3982,7 +3985,7 @@
             </a:ln>
             <a:extLst>
               <a:ext uri="{91240B29-F687-4f45-9708-019B960494DF}">
-                <a14:hiddenLine xmlns:a14="http://schemas.microsoft.com/office/drawing/2010/main" xmlns="" w="9525">
+                <a14:hiddenLine xmlns="" xmlns:a14="http://schemas.microsoft.com/office/drawing/2010/main" w="9525">
                   <a:solidFill>
                     <a:srgbClr val="000000"/>
                   </a:solidFill>
@@ -4102,7 +4105,7 @@
             </a:ln>
             <a:extLst>
               <a:ext uri="{91240B29-F687-4f45-9708-019B960494DF}">
-                <a14:hiddenLine xmlns:a14="http://schemas.microsoft.com/office/drawing/2010/main" xmlns="" w="9525">
+                <a14:hiddenLine xmlns="" xmlns:a14="http://schemas.microsoft.com/office/drawing/2010/main" w="9525">
                   <a:solidFill>
                     <a:srgbClr val="000000"/>
                   </a:solidFill>
@@ -4170,7 +4173,7 @@
             </a:ln>
             <a:extLst>
               <a:ext uri="{91240B29-F687-4f45-9708-019B960494DF}">
-                <a14:hiddenLine xmlns:a14="http://schemas.microsoft.com/office/drawing/2010/main" xmlns="" w="9525">
+                <a14:hiddenLine xmlns="" xmlns:a14="http://schemas.microsoft.com/office/drawing/2010/main" w="9525">
                   <a:solidFill>
                     <a:srgbClr val="000000"/>
                   </a:solidFill>
@@ -4260,7 +4263,7 @@
             </a:ln>
             <a:extLst>
               <a:ext uri="{91240B29-F687-4f45-9708-019B960494DF}">
-                <a14:hiddenLine xmlns:a14="http://schemas.microsoft.com/office/drawing/2010/main" xmlns="" w="9525">
+                <a14:hiddenLine xmlns="" xmlns:a14="http://schemas.microsoft.com/office/drawing/2010/main" w="9525">
                   <a:solidFill>
                     <a:srgbClr val="000000"/>
                   </a:solidFill>
@@ -4400,7 +4403,7 @@
           <a:p>
             <a:fld id="{48A87A34-81AB-432B-8DAE-1953F412C126}" type="datetimeFigureOut">
               <a:rPr lang="en-US" dirty="0"/>
-              <a:t>1/3/2015</a:t>
+              <a:t>1/8/2015</a:t>
             </a:fld>
             <a:endParaRPr lang="en-US" dirty="0"/>
           </a:p>
@@ -4662,7 +4665,7 @@
           <a:p>
             <a:fld id="{48A87A34-81AB-432B-8DAE-1953F412C126}" type="datetimeFigureOut">
               <a:rPr lang="en-US" dirty="0"/>
-              <a:t>1/3/2015</a:t>
+              <a:t>1/8/2015</a:t>
             </a:fld>
             <a:endParaRPr lang="en-US" dirty="0"/>
           </a:p>
@@ -4853,7 +4856,7 @@
           <a:p>
             <a:fld id="{48A87A34-81AB-432B-8DAE-1953F412C126}" type="datetimeFigureOut">
               <a:rPr lang="en-US" dirty="0"/>
-              <a:t>1/3/2015</a:t>
+              <a:t>1/8/2015</a:t>
             </a:fld>
             <a:endParaRPr lang="en-US" dirty="0"/>
           </a:p>
@@ -5111,7 +5114,7 @@
           <a:p>
             <a:fld id="{48A87A34-81AB-432B-8DAE-1953F412C126}" type="datetimeFigureOut">
               <a:rPr lang="en-US" dirty="0"/>
-              <a:t>1/3/2015</a:t>
+              <a:t>1/8/2015</a:t>
             </a:fld>
             <a:endParaRPr lang="en-US" dirty="0"/>
           </a:p>
@@ -5540,7 +5543,7 @@
           <a:p>
             <a:fld id="{48A87A34-81AB-432B-8DAE-1953F412C126}" type="datetimeFigureOut">
               <a:rPr lang="en-US" dirty="0"/>
-              <a:t>1/3/2015</a:t>
+              <a:t>1/8/2015</a:t>
             </a:fld>
             <a:endParaRPr lang="en-US" dirty="0"/>
           </a:p>
@@ -6081,7 +6084,7 @@
           <a:p>
             <a:fld id="{48A87A34-81AB-432B-8DAE-1953F412C126}" type="datetimeFigureOut">
               <a:rPr lang="en-US" dirty="0"/>
-              <a:t>1/3/2015</a:t>
+              <a:t>1/8/2015</a:t>
             </a:fld>
             <a:endParaRPr lang="en-US" dirty="0"/>
           </a:p>
@@ -6796,7 +6799,7 @@
           <a:p>
             <a:fld id="{48A87A34-81AB-432B-8DAE-1953F412C126}" type="datetimeFigureOut">
               <a:rPr lang="en-US" dirty="0"/>
-              <a:t>1/3/2015</a:t>
+              <a:t>1/8/2015</a:t>
             </a:fld>
             <a:endParaRPr lang="en-US" dirty="0"/>
           </a:p>
@@ -6961,7 +6964,7 @@
           <a:p>
             <a:fld id="{48A87A34-81AB-432B-8DAE-1953F412C126}" type="datetimeFigureOut">
               <a:rPr lang="en-US" dirty="0"/>
-              <a:t>1/3/2015</a:t>
+              <a:t>1/8/2015</a:t>
             </a:fld>
             <a:endParaRPr lang="en-US" dirty="0"/>
           </a:p>
@@ -7136,7 +7139,7 @@
           <a:p>
             <a:fld id="{48A87A34-81AB-432B-8DAE-1953F412C126}" type="datetimeFigureOut">
               <a:rPr lang="en-US" dirty="0"/>
-              <a:t>1/3/2015</a:t>
+              <a:t>1/8/2015</a:t>
             </a:fld>
             <a:endParaRPr lang="en-US" dirty="0"/>
           </a:p>
@@ -7301,7 +7304,7 @@
           <a:p>
             <a:fld id="{48A87A34-81AB-432B-8DAE-1953F412C126}" type="datetimeFigureOut">
               <a:rPr lang="en-US" dirty="0"/>
-              <a:t>1/3/2015</a:t>
+              <a:t>1/8/2015</a:t>
             </a:fld>
             <a:endParaRPr lang="en-US" dirty="0"/>
           </a:p>
@@ -7546,7 +7549,7 @@
           <a:p>
             <a:fld id="{48A87A34-81AB-432B-8DAE-1953F412C126}" type="datetimeFigureOut">
               <a:rPr lang="en-US" dirty="0"/>
-              <a:t>1/3/2015</a:t>
+              <a:t>1/8/2015</a:t>
             </a:fld>
             <a:endParaRPr lang="en-US" dirty="0"/>
           </a:p>
@@ -7773,7 +7776,7 @@
           <a:p>
             <a:fld id="{48A87A34-81AB-432B-8DAE-1953F412C126}" type="datetimeFigureOut">
               <a:rPr lang="en-US" dirty="0"/>
-              <a:t>1/3/2015</a:t>
+              <a:t>1/8/2015</a:t>
             </a:fld>
             <a:endParaRPr lang="en-US" dirty="0"/>
           </a:p>
@@ -8149,7 +8152,7 @@
           <a:p>
             <a:fld id="{48A87A34-81AB-432B-8DAE-1953F412C126}" type="datetimeFigureOut">
               <a:rPr lang="en-US" dirty="0"/>
-              <a:t>1/3/2015</a:t>
+              <a:t>1/8/2015</a:t>
             </a:fld>
             <a:endParaRPr lang="en-US" dirty="0"/>
           </a:p>
@@ -8262,7 +8265,7 @@
           <a:p>
             <a:fld id="{48A87A34-81AB-432B-8DAE-1953F412C126}" type="datetimeFigureOut">
               <a:rPr lang="en-US" dirty="0"/>
-              <a:t>1/3/2015</a:t>
+              <a:t>1/8/2015</a:t>
             </a:fld>
             <a:endParaRPr lang="en-US" dirty="0"/>
           </a:p>
@@ -8352,7 +8355,7 @@
           <a:p>
             <a:fld id="{48A87A34-81AB-432B-8DAE-1953F412C126}" type="datetimeFigureOut">
               <a:rPr lang="en-US" dirty="0"/>
-              <a:t>1/3/2015</a:t>
+              <a:t>1/8/2015</a:t>
             </a:fld>
             <a:endParaRPr lang="en-US" dirty="0"/>
           </a:p>
@@ -8596,7 +8599,7 @@
           <a:p>
             <a:fld id="{48A87A34-81AB-432B-8DAE-1953F412C126}" type="datetimeFigureOut">
               <a:rPr lang="en-US" dirty="0"/>
-              <a:t>1/3/2015</a:t>
+              <a:t>1/8/2015</a:t>
             </a:fld>
             <a:endParaRPr lang="en-US" dirty="0"/>
           </a:p>
@@ -8871,7 +8874,7 @@
           <a:p>
             <a:fld id="{48A87A34-81AB-432B-8DAE-1953F412C126}" type="datetimeFigureOut">
               <a:rPr lang="en-US" dirty="0"/>
-              <a:t>1/3/2015</a:t>
+              <a:t>1/8/2015</a:t>
             </a:fld>
             <a:endParaRPr lang="en-US" dirty="0"/>
           </a:p>
@@ -8989,7 +8992,7 @@
           <a:noFill/>
           <a:extLst>
             <a:ext uri="{909E8E84-426E-40dd-AFC4-6F175D3DCCD1}">
-              <a14:hiddenFill xmlns:a14="http://schemas.microsoft.com/office/drawing/2010/main" xmlns="">
+              <a14:hiddenFill xmlns="" xmlns:a14="http://schemas.microsoft.com/office/drawing/2010/main">
                 <a:solidFill>
                   <a:srgbClr val="FFFFFF"/>
                 </a:solidFill>
@@ -9063,7 +9066,7 @@
               </a:ln>
               <a:extLst>
                 <a:ext uri="{91240B29-F687-4f45-9708-019B960494DF}">
-                  <a14:hiddenLine xmlns:a14="http://schemas.microsoft.com/office/drawing/2010/main" xmlns="" w="9525">
+                  <a14:hiddenLine xmlns="" xmlns:a14="http://schemas.microsoft.com/office/drawing/2010/main" w="9525">
                     <a:solidFill>
                       <a:srgbClr val="000000"/>
                     </a:solidFill>
@@ -9153,7 +9156,7 @@
               </a:ln>
               <a:extLst>
                 <a:ext uri="{91240B29-F687-4f45-9708-019B960494DF}">
-                  <a14:hiddenLine xmlns:a14="http://schemas.microsoft.com/office/drawing/2010/main" xmlns="" w="9525">
+                  <a14:hiddenLine xmlns="" xmlns:a14="http://schemas.microsoft.com/office/drawing/2010/main" w="9525">
                     <a:solidFill>
                       <a:srgbClr val="000000"/>
                     </a:solidFill>
@@ -9243,7 +9246,7 @@
               </a:ln>
               <a:extLst>
                 <a:ext uri="{91240B29-F687-4f45-9708-019B960494DF}">
-                  <a14:hiddenLine xmlns:a14="http://schemas.microsoft.com/office/drawing/2010/main" xmlns="" w="9525">
+                  <a14:hiddenLine xmlns="" xmlns:a14="http://schemas.microsoft.com/office/drawing/2010/main" w="9525">
                     <a:solidFill>
                       <a:srgbClr val="000000"/>
                     </a:solidFill>
@@ -9305,7 +9308,7 @@
               </a:ln>
               <a:extLst>
                 <a:ext uri="{91240B29-F687-4f45-9708-019B960494DF}">
-                  <a14:hiddenLine xmlns:a14="http://schemas.microsoft.com/office/drawing/2010/main" xmlns="" w="9525">
+                  <a14:hiddenLine xmlns="" xmlns:a14="http://schemas.microsoft.com/office/drawing/2010/main" w="9525">
                     <a:solidFill>
                       <a:srgbClr val="000000"/>
                     </a:solidFill>
@@ -9395,7 +9398,7 @@
               </a:ln>
               <a:extLst>
                 <a:ext uri="{91240B29-F687-4f45-9708-019B960494DF}">
-                  <a14:hiddenLine xmlns:a14="http://schemas.microsoft.com/office/drawing/2010/main" xmlns="" w="9525">
+                  <a14:hiddenLine xmlns="" xmlns:a14="http://schemas.microsoft.com/office/drawing/2010/main" w="9525">
                     <a:solidFill>
                       <a:srgbClr val="000000"/>
                     </a:solidFill>
@@ -9457,7 +9460,7 @@
               </a:ln>
               <a:extLst>
                 <a:ext uri="{91240B29-F687-4f45-9708-019B960494DF}">
-                  <a14:hiddenLine xmlns:a14="http://schemas.microsoft.com/office/drawing/2010/main" xmlns="" w="9525">
+                  <a14:hiddenLine xmlns="" xmlns:a14="http://schemas.microsoft.com/office/drawing/2010/main" w="9525">
                     <a:solidFill>
                       <a:srgbClr val="000000"/>
                     </a:solidFill>
@@ -9519,7 +9522,7 @@
               </a:ln>
               <a:extLst>
                 <a:ext uri="{91240B29-F687-4f45-9708-019B960494DF}">
-                  <a14:hiddenLine xmlns:a14="http://schemas.microsoft.com/office/drawing/2010/main" xmlns="" w="9525">
+                  <a14:hiddenLine xmlns="" xmlns:a14="http://schemas.microsoft.com/office/drawing/2010/main" w="9525">
                     <a:solidFill>
                       <a:srgbClr val="000000"/>
                     </a:solidFill>
@@ -9609,7 +9612,7 @@
               </a:ln>
               <a:extLst>
                 <a:ext uri="{91240B29-F687-4f45-9708-019B960494DF}">
-                  <a14:hiddenLine xmlns:a14="http://schemas.microsoft.com/office/drawing/2010/main" xmlns="" w="9525">
+                  <a14:hiddenLine xmlns="" xmlns:a14="http://schemas.microsoft.com/office/drawing/2010/main" w="9525">
                     <a:solidFill>
                       <a:srgbClr val="000000"/>
                     </a:solidFill>
@@ -9699,7 +9702,7 @@
               </a:ln>
               <a:extLst>
                 <a:ext uri="{91240B29-F687-4f45-9708-019B960494DF}">
-                  <a14:hiddenLine xmlns:a14="http://schemas.microsoft.com/office/drawing/2010/main" xmlns="" w="9525">
+                  <a14:hiddenLine xmlns="" xmlns:a14="http://schemas.microsoft.com/office/drawing/2010/main" w="9525">
                     <a:solidFill>
                       <a:srgbClr val="000000"/>
                     </a:solidFill>
@@ -9761,7 +9764,7 @@
               </a:ln>
               <a:extLst>
                 <a:ext uri="{91240B29-F687-4f45-9708-019B960494DF}">
-                  <a14:hiddenLine xmlns:a14="http://schemas.microsoft.com/office/drawing/2010/main" xmlns="" w="9525">
+                  <a14:hiddenLine xmlns="" xmlns:a14="http://schemas.microsoft.com/office/drawing/2010/main" w="9525">
                     <a:solidFill>
                       <a:srgbClr val="000000"/>
                     </a:solidFill>
@@ -9871,7 +9874,7 @@
               </a:ln>
               <a:extLst>
                 <a:ext uri="{91240B29-F687-4f45-9708-019B960494DF}">
-                  <a14:hiddenLine xmlns:a14="http://schemas.microsoft.com/office/drawing/2010/main" xmlns="" w="9525">
+                  <a14:hiddenLine xmlns="" xmlns:a14="http://schemas.microsoft.com/office/drawing/2010/main" w="9525">
                     <a:solidFill>
                       <a:srgbClr val="000000"/>
                     </a:solidFill>
@@ -9955,7 +9958,7 @@
               </a:ln>
               <a:extLst>
                 <a:ext uri="{91240B29-F687-4f45-9708-019B960494DF}">
-                  <a14:hiddenLine xmlns:a14="http://schemas.microsoft.com/office/drawing/2010/main" xmlns="" w="9525">
+                  <a14:hiddenLine xmlns="" xmlns:a14="http://schemas.microsoft.com/office/drawing/2010/main" w="9525">
                     <a:solidFill>
                       <a:srgbClr val="000000"/>
                     </a:solidFill>
@@ -10017,7 +10020,7 @@
               </a:ln>
               <a:extLst>
                 <a:ext uri="{91240B29-F687-4f45-9708-019B960494DF}">
-                  <a14:hiddenLine xmlns:a14="http://schemas.microsoft.com/office/drawing/2010/main" xmlns="" w="9525">
+                  <a14:hiddenLine xmlns="" xmlns:a14="http://schemas.microsoft.com/office/drawing/2010/main" w="9525">
                     <a:solidFill>
                       <a:srgbClr val="000000"/>
                     </a:solidFill>
@@ -10079,7 +10082,7 @@
               </a:ln>
               <a:extLst>
                 <a:ext uri="{91240B29-F687-4f45-9708-019B960494DF}">
-                  <a14:hiddenLine xmlns:a14="http://schemas.microsoft.com/office/drawing/2010/main" xmlns="" w="9525">
+                  <a14:hiddenLine xmlns="" xmlns:a14="http://schemas.microsoft.com/office/drawing/2010/main" w="9525">
                     <a:solidFill>
                       <a:srgbClr val="000000"/>
                     </a:solidFill>
@@ -10169,7 +10172,7 @@
               </a:ln>
               <a:extLst>
                 <a:ext uri="{91240B29-F687-4f45-9708-019B960494DF}">
-                  <a14:hiddenLine xmlns:a14="http://schemas.microsoft.com/office/drawing/2010/main" xmlns="" w="9525">
+                  <a14:hiddenLine xmlns="" xmlns:a14="http://schemas.microsoft.com/office/drawing/2010/main" w="9525">
                     <a:solidFill>
                       <a:srgbClr val="000000"/>
                     </a:solidFill>
@@ -10203,7 +10206,7 @@
               </a:ln>
               <a:extLst>
                 <a:ext uri="{91240B29-F687-4f45-9708-019B960494DF}">
-                  <a14:hiddenLine xmlns:a14="http://schemas.microsoft.com/office/drawing/2010/main" xmlns="" w="9525">
+                  <a14:hiddenLine xmlns="" xmlns:a14="http://schemas.microsoft.com/office/drawing/2010/main" w="9525">
                     <a:solidFill>
                       <a:srgbClr val="000000"/>
                     </a:solidFill>
@@ -10268,7 +10271,7 @@
               </a:ln>
               <a:extLst>
                 <a:ext uri="{91240B29-F687-4f45-9708-019B960494DF}">
-                  <a14:hiddenLine xmlns:a14="http://schemas.microsoft.com/office/drawing/2010/main" xmlns="" w="9525">
+                  <a14:hiddenLine xmlns="" xmlns:a14="http://schemas.microsoft.com/office/drawing/2010/main" w="9525">
                     <a:solidFill>
                       <a:srgbClr val="000000"/>
                     </a:solidFill>
@@ -10358,7 +10361,7 @@
               </a:ln>
               <a:extLst>
                 <a:ext uri="{91240B29-F687-4f45-9708-019B960494DF}">
-                  <a14:hiddenLine xmlns:a14="http://schemas.microsoft.com/office/drawing/2010/main" xmlns="" w="9525">
+                  <a14:hiddenLine xmlns="" xmlns:a14="http://schemas.microsoft.com/office/drawing/2010/main" w="9525">
                     <a:solidFill>
                       <a:srgbClr val="000000"/>
                     </a:solidFill>
@@ -10420,7 +10423,7 @@
               </a:ln>
               <a:extLst>
                 <a:ext uri="{91240B29-F687-4f45-9708-019B960494DF}">
-                  <a14:hiddenLine xmlns:a14="http://schemas.microsoft.com/office/drawing/2010/main" xmlns="" w="9525">
+                  <a14:hiddenLine xmlns="" xmlns:a14="http://schemas.microsoft.com/office/drawing/2010/main" w="9525">
                     <a:solidFill>
                       <a:srgbClr val="000000"/>
                     </a:solidFill>
@@ -10510,7 +10513,7 @@
               </a:ln>
               <a:extLst>
                 <a:ext uri="{91240B29-F687-4f45-9708-019B960494DF}">
-                  <a14:hiddenLine xmlns:a14="http://schemas.microsoft.com/office/drawing/2010/main" xmlns="" w="9525">
+                  <a14:hiddenLine xmlns="" xmlns:a14="http://schemas.microsoft.com/office/drawing/2010/main" w="9525">
                     <a:solidFill>
                       <a:srgbClr val="000000"/>
                     </a:solidFill>
@@ -10575,7 +10578,7 @@
               </a:ln>
               <a:extLst>
                 <a:ext uri="{91240B29-F687-4f45-9708-019B960494DF}">
-                  <a14:hiddenLine xmlns:a14="http://schemas.microsoft.com/office/drawing/2010/main" xmlns="" w="9525">
+                  <a14:hiddenLine xmlns="" xmlns:a14="http://schemas.microsoft.com/office/drawing/2010/main" w="9525">
                     <a:solidFill>
                       <a:srgbClr val="000000"/>
                     </a:solidFill>
@@ -10637,7 +10640,7 @@
               </a:ln>
               <a:extLst>
                 <a:ext uri="{91240B29-F687-4f45-9708-019B960494DF}">
-                  <a14:hiddenLine xmlns:a14="http://schemas.microsoft.com/office/drawing/2010/main" xmlns="" w="9525">
+                  <a14:hiddenLine xmlns="" xmlns:a14="http://schemas.microsoft.com/office/drawing/2010/main" w="9525">
                     <a:solidFill>
                       <a:srgbClr val="000000"/>
                     </a:solidFill>
@@ -10727,7 +10730,7 @@
               </a:ln>
               <a:extLst>
                 <a:ext uri="{91240B29-F687-4f45-9708-019B960494DF}">
-                  <a14:hiddenLine xmlns:a14="http://schemas.microsoft.com/office/drawing/2010/main" xmlns="" w="9525">
+                  <a14:hiddenLine xmlns="" xmlns:a14="http://schemas.microsoft.com/office/drawing/2010/main" w="9525">
                     <a:solidFill>
                       <a:srgbClr val="000000"/>
                     </a:solidFill>
@@ -10817,7 +10820,7 @@
               </a:ln>
               <a:extLst>
                 <a:ext uri="{91240B29-F687-4f45-9708-019B960494DF}">
-                  <a14:hiddenLine xmlns:a14="http://schemas.microsoft.com/office/drawing/2010/main" xmlns="" w="9525">
+                  <a14:hiddenLine xmlns="" xmlns:a14="http://schemas.microsoft.com/office/drawing/2010/main" w="9525">
                     <a:solidFill>
                       <a:srgbClr val="000000"/>
                     </a:solidFill>
@@ -10882,7 +10885,7 @@
               </a:ln>
               <a:extLst>
                 <a:ext uri="{91240B29-F687-4f45-9708-019B960494DF}">
-                  <a14:hiddenLine xmlns:a14="http://schemas.microsoft.com/office/drawing/2010/main" xmlns="" w="9525">
+                  <a14:hiddenLine xmlns="" xmlns:a14="http://schemas.microsoft.com/office/drawing/2010/main" w="9525">
                     <a:solidFill>
                       <a:srgbClr val="000000"/>
                     </a:solidFill>
@@ -11002,7 +11005,7 @@
               </a:ln>
               <a:extLst>
                 <a:ext uri="{91240B29-F687-4f45-9708-019B960494DF}">
-                  <a14:hiddenLine xmlns:a14="http://schemas.microsoft.com/office/drawing/2010/main" xmlns="" w="9525">
+                  <a14:hiddenLine xmlns="" xmlns:a14="http://schemas.microsoft.com/office/drawing/2010/main" w="9525">
                     <a:solidFill>
                       <a:srgbClr val="000000"/>
                     </a:solidFill>
@@ -11083,7 +11086,7 @@
               </a:ln>
               <a:extLst>
                 <a:ext uri="{91240B29-F687-4f45-9708-019B960494DF}">
-                  <a14:hiddenLine xmlns:a14="http://schemas.microsoft.com/office/drawing/2010/main" xmlns="" w="9525">
+                  <a14:hiddenLine xmlns="" xmlns:a14="http://schemas.microsoft.com/office/drawing/2010/main" w="9525">
                     <a:solidFill>
                       <a:srgbClr val="000000"/>
                     </a:solidFill>
@@ -11198,7 +11201,7 @@
               </a:ln>
               <a:extLst>
                 <a:ext uri="{91240B29-F687-4f45-9708-019B960494DF}">
-                  <a14:hiddenLine xmlns:a14="http://schemas.microsoft.com/office/drawing/2010/main" xmlns="" w="9525">
+                  <a14:hiddenLine xmlns="" xmlns:a14="http://schemas.microsoft.com/office/drawing/2010/main" w="9525">
                     <a:solidFill>
                       <a:srgbClr val="000000"/>
                     </a:solidFill>
@@ -11288,7 +11291,7 @@
               </a:ln>
               <a:extLst>
                 <a:ext uri="{91240B29-F687-4f45-9708-019B960494DF}">
-                  <a14:hiddenLine xmlns:a14="http://schemas.microsoft.com/office/drawing/2010/main" xmlns="" w="9525">
+                  <a14:hiddenLine xmlns="" xmlns:a14="http://schemas.microsoft.com/office/drawing/2010/main" w="9525">
                     <a:solidFill>
                       <a:srgbClr val="000000"/>
                     </a:solidFill>
@@ -11353,7 +11356,7 @@
               </a:ln>
               <a:extLst>
                 <a:ext uri="{91240B29-F687-4f45-9708-019B960494DF}">
-                  <a14:hiddenLine xmlns:a14="http://schemas.microsoft.com/office/drawing/2010/main" xmlns="" w="9525">
+                  <a14:hiddenLine xmlns="" xmlns:a14="http://schemas.microsoft.com/office/drawing/2010/main" w="9525">
                     <a:solidFill>
                       <a:srgbClr val="000000"/>
                     </a:solidFill>
@@ -11443,7 +11446,7 @@
               </a:ln>
               <a:extLst>
                 <a:ext uri="{91240B29-F687-4f45-9708-019B960494DF}">
-                  <a14:hiddenLine xmlns:a14="http://schemas.microsoft.com/office/drawing/2010/main" xmlns="" w="9525">
+                  <a14:hiddenLine xmlns="" xmlns:a14="http://schemas.microsoft.com/office/drawing/2010/main" w="9525">
                     <a:solidFill>
                       <a:srgbClr val="000000"/>
                     </a:solidFill>
@@ -11511,7 +11514,7 @@
               </a:ln>
               <a:extLst>
                 <a:ext uri="{91240B29-F687-4f45-9708-019B960494DF}">
-                  <a14:hiddenLine xmlns:a14="http://schemas.microsoft.com/office/drawing/2010/main" xmlns="" w="9525">
+                  <a14:hiddenLine xmlns="" xmlns:a14="http://schemas.microsoft.com/office/drawing/2010/main" w="9525">
                     <a:solidFill>
                       <a:srgbClr val="000000"/>
                     </a:solidFill>
@@ -11601,7 +11604,7 @@
               </a:ln>
               <a:extLst>
                 <a:ext uri="{91240B29-F687-4f45-9708-019B960494DF}">
-                  <a14:hiddenLine xmlns:a14="http://schemas.microsoft.com/office/drawing/2010/main" xmlns="" w="9525">
+                  <a14:hiddenLine xmlns="" xmlns:a14="http://schemas.microsoft.com/office/drawing/2010/main" w="9525">
                     <a:solidFill>
                       <a:srgbClr val="000000"/>
                     </a:solidFill>
@@ -11669,7 +11672,7 @@
               </a:ln>
               <a:extLst>
                 <a:ext uri="{91240B29-F687-4f45-9708-019B960494DF}">
-                  <a14:hiddenLine xmlns:a14="http://schemas.microsoft.com/office/drawing/2010/main" xmlns="" w="9525">
+                  <a14:hiddenLine xmlns="" xmlns:a14="http://schemas.microsoft.com/office/drawing/2010/main" w="9525">
                     <a:solidFill>
                       <a:srgbClr val="000000"/>
                     </a:solidFill>
@@ -11759,7 +11762,7 @@
               </a:ln>
               <a:extLst>
                 <a:ext uri="{91240B29-F687-4f45-9708-019B960494DF}">
-                  <a14:hiddenLine xmlns:a14="http://schemas.microsoft.com/office/drawing/2010/main" xmlns="" w="9525">
+                  <a14:hiddenLine xmlns="" xmlns:a14="http://schemas.microsoft.com/office/drawing/2010/main" w="9525">
                     <a:solidFill>
                       <a:srgbClr val="000000"/>
                     </a:solidFill>
@@ -11793,7 +11796,7 @@
               </a:ln>
               <a:extLst>
                 <a:ext uri="{91240B29-F687-4f45-9708-019B960494DF}">
-                  <a14:hiddenLine xmlns:a14="http://schemas.microsoft.com/office/drawing/2010/main" xmlns="" w="9525">
+                  <a14:hiddenLine xmlns="" xmlns:a14="http://schemas.microsoft.com/office/drawing/2010/main" w="9525">
                     <a:solidFill>
                       <a:srgbClr val="000000"/>
                     </a:solidFill>
@@ -11934,7 +11937,7 @@
             <a:fld id="{48A87A34-81AB-432B-8DAE-1953F412C126}" type="datetimeFigureOut">
               <a:rPr lang="en-US" dirty="0"/>
               <a:pPr/>
-              <a:t>1/3/2015</a:t>
+              <a:t>1/8/2015</a:t>
             </a:fld>
             <a:endParaRPr lang="en-US" dirty="0"/>
           </a:p>
@@ -12435,6 +12438,78 @@
 </p:sld>
 </file>
 
+<file path=ppt/slides/slide10.xml><?xml version="1.0" encoding="utf-8"?>
+<p:sld xmlns:a="http://schemas.openxmlformats.org/drawingml/2006/main" xmlns:r="http://schemas.openxmlformats.org/officeDocument/2006/relationships" xmlns:p="http://schemas.openxmlformats.org/presentationml/2006/main">
+  <p:cSld>
+    <p:spTree>
+      <p:nvGrpSpPr>
+        <p:cNvPr id="1" name=""/>
+        <p:cNvGrpSpPr/>
+        <p:nvPr/>
+      </p:nvGrpSpPr>
+      <p:grpSpPr>
+        <a:xfrm>
+          <a:off x="0" y="0"/>
+          <a:ext cx="0" cy="0"/>
+          <a:chOff x="0" y="0"/>
+          <a:chExt cx="0" cy="0"/>
+        </a:xfrm>
+      </p:grpSpPr>
+      <p:sp>
+        <p:nvSpPr>
+          <p:cNvPr id="2" name="Title 1"/>
+          <p:cNvSpPr>
+            <a:spLocks noGrp="1"/>
+          </p:cNvSpPr>
+          <p:nvPr>
+            <p:ph type="title"/>
+          </p:nvPr>
+        </p:nvSpPr>
+        <p:spPr/>
+        <p:txBody>
+          <a:bodyPr/>
+          <a:lstStyle/>
+          <a:p>
+            <a:r>
+              <a:rPr lang="en-US" dirty="0" smtClean="0"/>
+              <a:t>Questions?</a:t>
+            </a:r>
+            <a:endParaRPr lang="en-US" dirty="0"/>
+          </a:p>
+        </p:txBody>
+      </p:sp>
+      <p:sp>
+        <p:nvSpPr>
+          <p:cNvPr id="3" name="Content Placeholder 2"/>
+          <p:cNvSpPr>
+            <a:spLocks noGrp="1"/>
+          </p:cNvSpPr>
+          <p:nvPr>
+            <p:ph idx="1"/>
+          </p:nvPr>
+        </p:nvSpPr>
+        <p:spPr/>
+        <p:txBody>
+          <a:bodyPr/>
+          <a:lstStyle/>
+          <a:p>
+            <a:endParaRPr lang="en-US"/>
+          </a:p>
+        </p:txBody>
+      </p:sp>
+    </p:spTree>
+    <p:extLst>
+      <p:ext uri="{BB962C8B-B14F-4D97-AF65-F5344CB8AC3E}">
+        <p14:creationId xmlns:p14="http://schemas.microsoft.com/office/powerpoint/2010/main" val="1223679356"/>
+      </p:ext>
+    </p:extLst>
+  </p:cSld>
+  <p:clrMapOvr>
+    <a:masterClrMapping/>
+  </p:clrMapOvr>
+</p:sld>
+</file>
+
 <file path=ppt/slides/slide2.xml><?xml version="1.0" encoding="utf-8"?>
 <p:sld xmlns:a="http://schemas.openxmlformats.org/drawingml/2006/main" xmlns:r="http://schemas.openxmlformats.org/officeDocument/2006/relationships" xmlns:p="http://schemas.openxmlformats.org/presentationml/2006/main">
   <p:cSld>
@@ -12469,7 +12544,7 @@
           <a:p>
             <a:r>
               <a:rPr lang="en-US" dirty="0" smtClean="0"/>
-              <a:t>Background</a:t>
+              <a:t>Project Overview</a:t>
             </a:r>
             <a:endParaRPr lang="en-US" dirty="0"/>
           </a:p>
@@ -12490,7 +12565,53 @@
           <a:bodyPr/>
           <a:lstStyle/>
           <a:p>
-            <a:endParaRPr lang="en-US"/>
+            <a:r>
+              <a:rPr lang="en-US" dirty="0"/>
+              <a:t>Develop initial robotics platform</a:t>
+            </a:r>
+          </a:p>
+          <a:p>
+            <a:r>
+              <a:rPr lang="en-US" dirty="0"/>
+              <a:t>Public Outreach</a:t>
+            </a:r>
+          </a:p>
+          <a:p>
+            <a:pPr lvl="1"/>
+            <a:r>
+              <a:rPr lang="en-US" dirty="0"/>
+              <a:t>Increase interest in STEM fields</a:t>
+            </a:r>
+          </a:p>
+          <a:p>
+            <a:pPr lvl="1"/>
+            <a:r>
+              <a:rPr lang="en-US" dirty="0"/>
+              <a:t>Engineering deficit</a:t>
+            </a:r>
+          </a:p>
+          <a:p>
+            <a:r>
+              <a:rPr lang="en-US" dirty="0"/>
+              <a:t>Educational robotics platform</a:t>
+            </a:r>
+          </a:p>
+          <a:p>
+            <a:pPr lvl="1"/>
+            <a:r>
+              <a:rPr lang="en-US" dirty="0"/>
+              <a:t>Fluid Power</a:t>
+            </a:r>
+          </a:p>
+          <a:p>
+            <a:pPr lvl="1"/>
+            <a:r>
+              <a:rPr lang="en-US" dirty="0"/>
+              <a:t>Control Systems</a:t>
+            </a:r>
+          </a:p>
+          <a:p>
+            <a:endParaRPr lang="en-US" dirty="0"/>
           </a:p>
         </p:txBody>
       </p:sp>
@@ -12541,7 +12662,7 @@
           <a:p>
             <a:r>
               <a:rPr lang="en-US" dirty="0" smtClean="0"/>
-              <a:t>Mechanical Design</a:t>
+              <a:t>Major Design Decisions</a:t>
             </a:r>
             <a:endParaRPr lang="en-US" dirty="0"/>
           </a:p>
@@ -12562,14 +12683,63 @@
           <a:bodyPr/>
           <a:lstStyle/>
           <a:p>
-            <a:endParaRPr lang="en-US"/>
+            <a:r>
+              <a:rPr lang="en-US" dirty="0"/>
+              <a:t>Quadruped Locomotion</a:t>
+            </a:r>
+          </a:p>
+          <a:p>
+            <a:pPr lvl="1"/>
+            <a:r>
+              <a:rPr lang="en-US" dirty="0"/>
+              <a:t>Agile motion</a:t>
+            </a:r>
+          </a:p>
+          <a:p>
+            <a:pPr lvl="1"/>
+            <a:r>
+              <a:rPr lang="en-US" dirty="0"/>
+              <a:t>Stable</a:t>
+            </a:r>
+          </a:p>
+          <a:p>
+            <a:pPr lvl="1"/>
+            <a:r>
+              <a:rPr lang="en-US" dirty="0"/>
+              <a:t>Rugged Terrain</a:t>
+            </a:r>
+          </a:p>
+          <a:p>
+            <a:r>
+              <a:rPr lang="en-US" dirty="0"/>
+              <a:t>Pneumatic Power</a:t>
+            </a:r>
+          </a:p>
+          <a:p>
+            <a:pPr lvl="1"/>
+            <a:r>
+              <a:rPr lang="en-US" dirty="0"/>
+              <a:t>High energy density</a:t>
+            </a:r>
+          </a:p>
+          <a:p>
+            <a:pPr lvl="1"/>
+            <a:r>
+              <a:rPr lang="en-US" dirty="0"/>
+              <a:t>Clean and </a:t>
+            </a:r>
+            <a:r>
+              <a:rPr lang="en-US" dirty="0" smtClean="0"/>
+              <a:t>lightweight</a:t>
+            </a:r>
+            <a:endParaRPr lang="en-US" dirty="0"/>
           </a:p>
         </p:txBody>
       </p:sp>
     </p:spTree>
     <p:extLst>
       <p:ext uri="{BB962C8B-B14F-4D97-AF65-F5344CB8AC3E}">
-        <p14:creationId xmlns:p14="http://schemas.microsoft.com/office/powerpoint/2010/main" val="4056473331"/>
+        <p14:creationId xmlns:p14="http://schemas.microsoft.com/office/powerpoint/2010/main" val="2005235639"/>
       </p:ext>
     </p:extLst>
   </p:cSld>
@@ -12613,7 +12783,7 @@
           <a:p>
             <a:r>
               <a:rPr lang="en-US" dirty="0" smtClean="0"/>
-              <a:t>Pneumatic Design</a:t>
+              <a:t>Mechanical Design</a:t>
             </a:r>
             <a:endParaRPr lang="en-US" dirty="0"/>
           </a:p>
@@ -12641,7 +12811,7 @@
     </p:spTree>
     <p:extLst>
       <p:ext uri="{BB962C8B-B14F-4D97-AF65-F5344CB8AC3E}">
-        <p14:creationId xmlns:p14="http://schemas.microsoft.com/office/powerpoint/2010/main" val="1387209749"/>
+        <p14:creationId xmlns:p14="http://schemas.microsoft.com/office/powerpoint/2010/main" val="4056473331"/>
       </p:ext>
     </p:extLst>
   </p:cSld>
@@ -12685,7 +12855,7 @@
           <a:p>
             <a:r>
               <a:rPr lang="en-US" dirty="0" smtClean="0"/>
-              <a:t>Simulation and Verification</a:t>
+              <a:t>Pneumatic Design</a:t>
             </a:r>
             <a:endParaRPr lang="en-US" dirty="0"/>
           </a:p>
@@ -12713,7 +12883,7 @@
     </p:spTree>
     <p:extLst>
       <p:ext uri="{BB962C8B-B14F-4D97-AF65-F5344CB8AC3E}">
-        <p14:creationId xmlns:p14="http://schemas.microsoft.com/office/powerpoint/2010/main" val="3978015491"/>
+        <p14:creationId xmlns:p14="http://schemas.microsoft.com/office/powerpoint/2010/main" val="1387209749"/>
       </p:ext>
     </p:extLst>
   </p:cSld>
@@ -12757,7 +12927,7 @@
           <a:p>
             <a:r>
               <a:rPr lang="en-US" dirty="0" smtClean="0"/>
-              <a:t>Control architecture and electronics</a:t>
+              <a:t>Simulation and Verification</a:t>
             </a:r>
             <a:endParaRPr lang="en-US" dirty="0"/>
           </a:p>
@@ -12785,7 +12955,7 @@
     </p:spTree>
     <p:extLst>
       <p:ext uri="{BB962C8B-B14F-4D97-AF65-F5344CB8AC3E}">
-        <p14:creationId xmlns:p14="http://schemas.microsoft.com/office/powerpoint/2010/main" val="3700963556"/>
+        <p14:creationId xmlns:p14="http://schemas.microsoft.com/office/powerpoint/2010/main" val="3978015491"/>
       </p:ext>
     </p:extLst>
   </p:cSld>
@@ -12829,7 +12999,7 @@
           <a:p>
             <a:r>
               <a:rPr lang="en-US" dirty="0" smtClean="0"/>
-              <a:t>Questions?</a:t>
+              <a:t>Kinematic Modelling</a:t>
             </a:r>
             <a:endParaRPr lang="en-US" dirty="0"/>
           </a:p>
@@ -12850,14 +13020,208 @@
           <a:bodyPr/>
           <a:lstStyle/>
           <a:p>
-            <a:endParaRPr lang="en-US"/>
+            <a:r>
+              <a:rPr lang="en-US" dirty="0"/>
+              <a:t>Homogenous Transformations</a:t>
+            </a:r>
+          </a:p>
+          <a:p>
+            <a:r>
+              <a:rPr lang="en-US" dirty="0"/>
+              <a:t>Determines cylinder stroke</a:t>
+            </a:r>
+          </a:p>
+          <a:p>
+            <a:pPr marL="0" indent="0">
+              <a:buNone/>
+            </a:pPr>
+            <a:endParaRPr lang="en-US" dirty="0"/>
           </a:p>
         </p:txBody>
       </p:sp>
     </p:spTree>
     <p:extLst>
       <p:ext uri="{BB962C8B-B14F-4D97-AF65-F5344CB8AC3E}">
-        <p14:creationId xmlns:p14="http://schemas.microsoft.com/office/powerpoint/2010/main" val="1223679356"/>
+        <p14:creationId xmlns:p14="http://schemas.microsoft.com/office/powerpoint/2010/main" val="156962544"/>
+      </p:ext>
+    </p:extLst>
+  </p:cSld>
+  <p:clrMapOvr>
+    <a:masterClrMapping/>
+  </p:clrMapOvr>
+</p:sld>
+</file>
+
+<file path=ppt/slides/slide8.xml><?xml version="1.0" encoding="utf-8"?>
+<p:sld xmlns:a="http://schemas.openxmlformats.org/drawingml/2006/main" xmlns:r="http://schemas.openxmlformats.org/officeDocument/2006/relationships" xmlns:p="http://schemas.openxmlformats.org/presentationml/2006/main">
+  <p:cSld>
+    <p:spTree>
+      <p:nvGrpSpPr>
+        <p:cNvPr id="1" name=""/>
+        <p:cNvGrpSpPr/>
+        <p:nvPr/>
+      </p:nvGrpSpPr>
+      <p:grpSpPr>
+        <a:xfrm>
+          <a:off x="0" y="0"/>
+          <a:ext cx="0" cy="0"/>
+          <a:chOff x="0" y="0"/>
+          <a:chExt cx="0" cy="0"/>
+        </a:xfrm>
+      </p:grpSpPr>
+      <p:sp>
+        <p:nvSpPr>
+          <p:cNvPr id="2" name="Title 1"/>
+          <p:cNvSpPr>
+            <a:spLocks noGrp="1"/>
+          </p:cNvSpPr>
+          <p:nvPr>
+            <p:ph type="title"/>
+          </p:nvPr>
+        </p:nvSpPr>
+        <p:spPr/>
+        <p:txBody>
+          <a:bodyPr/>
+          <a:lstStyle/>
+          <a:p>
+            <a:r>
+              <a:rPr lang="en-US" dirty="0"/>
+              <a:t>Dynamic Model</a:t>
+            </a:r>
+          </a:p>
+        </p:txBody>
+      </p:sp>
+      <p:sp>
+        <p:nvSpPr>
+          <p:cNvPr id="3" name="Content Placeholder 2"/>
+          <p:cNvSpPr>
+            <a:spLocks noGrp="1"/>
+          </p:cNvSpPr>
+          <p:nvPr>
+            <p:ph idx="1"/>
+          </p:nvPr>
+        </p:nvSpPr>
+        <p:spPr/>
+        <p:txBody>
+          <a:bodyPr/>
+          <a:lstStyle/>
+          <a:p>
+            <a:r>
+              <a:rPr lang="en-US" dirty="0" err="1"/>
+              <a:t>Lagrangian</a:t>
+            </a:r>
+            <a:r>
+              <a:rPr lang="en-US" dirty="0"/>
+              <a:t> Mechanics</a:t>
+            </a:r>
+          </a:p>
+          <a:p>
+            <a:r>
+              <a:rPr lang="en-US" dirty="0"/>
+              <a:t>Non-inertial reference frames</a:t>
+            </a:r>
+          </a:p>
+          <a:p>
+            <a:r>
+              <a:rPr lang="en-US" dirty="0"/>
+              <a:t>Arbitrary grounded reference frame</a:t>
+            </a:r>
+          </a:p>
+          <a:p>
+            <a:r>
+              <a:rPr lang="en-US" dirty="0"/>
+              <a:t>Determines mechanical properties of </a:t>
+            </a:r>
+            <a:r>
+              <a:rPr lang="en-US" dirty="0" smtClean="0"/>
+              <a:t>components</a:t>
+            </a:r>
+          </a:p>
+          <a:p>
+            <a:r>
+              <a:rPr lang="en-US" smtClean="0"/>
+              <a:t>27 Equations</a:t>
+            </a:r>
+            <a:endParaRPr lang="en-US"/>
+          </a:p>
+        </p:txBody>
+      </p:sp>
+    </p:spTree>
+    <p:extLst>
+      <p:ext uri="{BB962C8B-B14F-4D97-AF65-F5344CB8AC3E}">
+        <p14:creationId xmlns:p14="http://schemas.microsoft.com/office/powerpoint/2010/main" val="18980793"/>
+      </p:ext>
+    </p:extLst>
+  </p:cSld>
+  <p:clrMapOvr>
+    <a:masterClrMapping/>
+  </p:clrMapOvr>
+</p:sld>
+</file>
+
+<file path=ppt/slides/slide9.xml><?xml version="1.0" encoding="utf-8"?>
+<p:sld xmlns:a="http://schemas.openxmlformats.org/drawingml/2006/main" xmlns:r="http://schemas.openxmlformats.org/officeDocument/2006/relationships" xmlns:p="http://schemas.openxmlformats.org/presentationml/2006/main">
+  <p:cSld>
+    <p:spTree>
+      <p:nvGrpSpPr>
+        <p:cNvPr id="1" name=""/>
+        <p:cNvGrpSpPr/>
+        <p:nvPr/>
+      </p:nvGrpSpPr>
+      <p:grpSpPr>
+        <a:xfrm>
+          <a:off x="0" y="0"/>
+          <a:ext cx="0" cy="0"/>
+          <a:chOff x="0" y="0"/>
+          <a:chExt cx="0" cy="0"/>
+        </a:xfrm>
+      </p:grpSpPr>
+      <p:sp>
+        <p:nvSpPr>
+          <p:cNvPr id="2" name="Title 1"/>
+          <p:cNvSpPr>
+            <a:spLocks noGrp="1"/>
+          </p:cNvSpPr>
+          <p:nvPr>
+            <p:ph type="title"/>
+          </p:nvPr>
+        </p:nvSpPr>
+        <p:spPr/>
+        <p:txBody>
+          <a:bodyPr/>
+          <a:lstStyle/>
+          <a:p>
+            <a:r>
+              <a:rPr lang="en-US" dirty="0" smtClean="0"/>
+              <a:t>Control architecture and electronics</a:t>
+            </a:r>
+            <a:endParaRPr lang="en-US" dirty="0"/>
+          </a:p>
+        </p:txBody>
+      </p:sp>
+      <p:sp>
+        <p:nvSpPr>
+          <p:cNvPr id="3" name="Content Placeholder 2"/>
+          <p:cNvSpPr>
+            <a:spLocks noGrp="1"/>
+          </p:cNvSpPr>
+          <p:nvPr>
+            <p:ph idx="1"/>
+          </p:nvPr>
+        </p:nvSpPr>
+        <p:spPr/>
+        <p:txBody>
+          <a:bodyPr/>
+          <a:lstStyle/>
+          <a:p>
+            <a:endParaRPr lang="en-US"/>
+          </a:p>
+        </p:txBody>
+      </p:sp>
+    </p:spTree>
+    <p:extLst>
+      <p:ext uri="{BB962C8B-B14F-4D97-AF65-F5344CB8AC3E}">
+        <p14:creationId xmlns:p14="http://schemas.microsoft.com/office/powerpoint/2010/main" val="3700963556"/>
       </p:ext>
     </p:extLst>
   </p:cSld>

</xml_diff>

<commit_message>
Added Slides to PowerPoint Presentation
Added slides related to pneumatic design
</commit_message>
<xml_diff>
--- a/Design Powerpoint.pptx
+++ b/Design Powerpoint.pptx
@@ -10,11 +10,15 @@
     <p:sldId id="264" r:id="rId4"/>
     <p:sldId id="259" r:id="rId5"/>
     <p:sldId id="260" r:id="rId6"/>
-    <p:sldId id="261" r:id="rId7"/>
-    <p:sldId id="265" r:id="rId8"/>
-    <p:sldId id="266" r:id="rId9"/>
-    <p:sldId id="262" r:id="rId10"/>
-    <p:sldId id="263" r:id="rId11"/>
+    <p:sldId id="267" r:id="rId7"/>
+    <p:sldId id="268" r:id="rId8"/>
+    <p:sldId id="269" r:id="rId9"/>
+    <p:sldId id="270" r:id="rId10"/>
+    <p:sldId id="261" r:id="rId11"/>
+    <p:sldId id="265" r:id="rId12"/>
+    <p:sldId id="266" r:id="rId13"/>
+    <p:sldId id="262" r:id="rId14"/>
+    <p:sldId id="263" r:id="rId15"/>
   </p:sldIdLst>
   <p:sldSz cx="12192000" cy="6858000"/>
   <p:notesSz cx="6858000" cy="9144000"/>
@@ -115,7 +119,7 @@
   </p:defaultTextStyle>
   <p:extLst>
     <p:ext uri="{EFAFB233-063F-42B5-8137-9DF3F51BA10A}">
-      <p15:sldGuideLst xmlns:p15="http://schemas.microsoft.com/office/powerpoint/2012/main"/>
+      <p15:sldGuideLst xmlns:p15="http://schemas.microsoft.com/office/powerpoint/2012/main" xmlns=""/>
     </p:ext>
   </p:extLst>
 </p:presentation>
@@ -177,8 +181,8 @@
           </a:prstGeom>
           <a:noFill/>
           <a:extLst>
-            <a:ext uri="{909E8E84-426E-40dd-AFC4-6F175D3DCCD1}">
-              <a14:hiddenFill xmlns="" xmlns:a14="http://schemas.microsoft.com/office/drawing/2010/main">
+            <a:ext uri="{909E8E84-426E-40DD-AFC4-6F175D3DCCD1}">
+              <a14:hiddenFill xmlns:a14="http://schemas.microsoft.com/office/drawing/2010/main">
                 <a:solidFill>
                   <a:srgbClr val="FFFFFF"/>
                 </a:solidFill>
@@ -236,8 +240,8 @@
               <a:noFill/>
             </a:ln>
             <a:extLst>
-              <a:ext uri="{91240B29-F687-4f45-9708-019B960494DF}">
-                <a14:hiddenLine xmlns="" xmlns:a14="http://schemas.microsoft.com/office/drawing/2010/main" w="9525">
+              <a:ext uri="{91240B29-F687-4F45-9708-019B960494DF}">
+                <a14:hiddenLine xmlns:a14="http://schemas.microsoft.com/office/drawing/2010/main" w="9525">
                   <a:solidFill>
                     <a:srgbClr val="000000"/>
                   </a:solidFill>
@@ -326,8 +330,8 @@
               <a:noFill/>
             </a:ln>
             <a:extLst>
-              <a:ext uri="{91240B29-F687-4f45-9708-019B960494DF}">
-                <a14:hiddenLine xmlns="" xmlns:a14="http://schemas.microsoft.com/office/drawing/2010/main" w="9525">
+              <a:ext uri="{91240B29-F687-4F45-9708-019B960494DF}">
+                <a14:hiddenLine xmlns:a14="http://schemas.microsoft.com/office/drawing/2010/main" w="9525">
                   <a:solidFill>
                     <a:srgbClr val="000000"/>
                   </a:solidFill>
@@ -416,8 +420,8 @@
               <a:noFill/>
             </a:ln>
             <a:extLst>
-              <a:ext uri="{91240B29-F687-4f45-9708-019B960494DF}">
-                <a14:hiddenLine xmlns="" xmlns:a14="http://schemas.microsoft.com/office/drawing/2010/main" w="9525">
+              <a:ext uri="{91240B29-F687-4F45-9708-019B960494DF}">
+                <a14:hiddenLine xmlns:a14="http://schemas.microsoft.com/office/drawing/2010/main" w="9525">
                   <a:solidFill>
                     <a:srgbClr val="000000"/>
                   </a:solidFill>
@@ -450,8 +454,8 @@
               <a:noFill/>
             </a:ln>
             <a:extLst>
-              <a:ext uri="{91240B29-F687-4f45-9708-019B960494DF}">
-                <a14:hiddenLine xmlns="" xmlns:a14="http://schemas.microsoft.com/office/drawing/2010/main" w="9525">
+              <a:ext uri="{91240B29-F687-4F45-9708-019B960494DF}">
+                <a14:hiddenLine xmlns:a14="http://schemas.microsoft.com/office/drawing/2010/main" w="9525">
                   <a:solidFill>
                     <a:srgbClr val="000000"/>
                   </a:solidFill>
@@ -540,8 +544,8 @@
               <a:noFill/>
             </a:ln>
             <a:extLst>
-              <a:ext uri="{91240B29-F687-4f45-9708-019B960494DF}">
-                <a14:hiddenLine xmlns="" xmlns:a14="http://schemas.microsoft.com/office/drawing/2010/main" w="9525">
+              <a:ext uri="{91240B29-F687-4F45-9708-019B960494DF}">
+                <a14:hiddenLine xmlns:a14="http://schemas.microsoft.com/office/drawing/2010/main" w="9525">
                   <a:solidFill>
                     <a:srgbClr val="000000"/>
                   </a:solidFill>
@@ -602,8 +606,8 @@
               <a:noFill/>
             </a:ln>
             <a:extLst>
-              <a:ext uri="{91240B29-F687-4f45-9708-019B960494DF}">
-                <a14:hiddenLine xmlns="" xmlns:a14="http://schemas.microsoft.com/office/drawing/2010/main" w="9525">
+              <a:ext uri="{91240B29-F687-4F45-9708-019B960494DF}">
+                <a14:hiddenLine xmlns:a14="http://schemas.microsoft.com/office/drawing/2010/main" w="9525">
                   <a:solidFill>
                     <a:srgbClr val="000000"/>
                   </a:solidFill>
@@ -664,8 +668,8 @@
               <a:noFill/>
             </a:ln>
             <a:extLst>
-              <a:ext uri="{91240B29-F687-4f45-9708-019B960494DF}">
-                <a14:hiddenLine xmlns="" xmlns:a14="http://schemas.microsoft.com/office/drawing/2010/main" w="9525">
+              <a:ext uri="{91240B29-F687-4F45-9708-019B960494DF}">
+                <a14:hiddenLine xmlns:a14="http://schemas.microsoft.com/office/drawing/2010/main" w="9525">
                   <a:solidFill>
                     <a:srgbClr val="000000"/>
                   </a:solidFill>
@@ -754,8 +758,8 @@
               <a:noFill/>
             </a:ln>
             <a:extLst>
-              <a:ext uri="{91240B29-F687-4f45-9708-019B960494DF}">
-                <a14:hiddenLine xmlns="" xmlns:a14="http://schemas.microsoft.com/office/drawing/2010/main" w="9525">
+              <a:ext uri="{91240B29-F687-4F45-9708-019B960494DF}">
+                <a14:hiddenLine xmlns:a14="http://schemas.microsoft.com/office/drawing/2010/main" w="9525">
                   <a:solidFill>
                     <a:srgbClr val="000000"/>
                   </a:solidFill>
@@ -816,8 +820,8 @@
               <a:noFill/>
             </a:ln>
             <a:extLst>
-              <a:ext uri="{91240B29-F687-4f45-9708-019B960494DF}">
-                <a14:hiddenLine xmlns="" xmlns:a14="http://schemas.microsoft.com/office/drawing/2010/main" w="9525">
+              <a:ext uri="{91240B29-F687-4F45-9708-019B960494DF}">
+                <a14:hiddenLine xmlns:a14="http://schemas.microsoft.com/office/drawing/2010/main" w="9525">
                   <a:solidFill>
                     <a:srgbClr val="000000"/>
                   </a:solidFill>
@@ -878,8 +882,8 @@
               <a:noFill/>
             </a:ln>
             <a:extLst>
-              <a:ext uri="{91240B29-F687-4f45-9708-019B960494DF}">
-                <a14:hiddenLine xmlns="" xmlns:a14="http://schemas.microsoft.com/office/drawing/2010/main" w="9525">
+              <a:ext uri="{91240B29-F687-4F45-9708-019B960494DF}">
+                <a14:hiddenLine xmlns:a14="http://schemas.microsoft.com/office/drawing/2010/main" w="9525">
                   <a:solidFill>
                     <a:srgbClr val="000000"/>
                   </a:solidFill>
@@ -968,8 +972,8 @@
               <a:noFill/>
             </a:ln>
             <a:extLst>
-              <a:ext uri="{91240B29-F687-4f45-9708-019B960494DF}">
-                <a14:hiddenLine xmlns="" xmlns:a14="http://schemas.microsoft.com/office/drawing/2010/main" w="9525">
+              <a:ext uri="{91240B29-F687-4F45-9708-019B960494DF}">
+                <a14:hiddenLine xmlns:a14="http://schemas.microsoft.com/office/drawing/2010/main" w="9525">
                   <a:solidFill>
                     <a:srgbClr val="000000"/>
                   </a:solidFill>
@@ -1058,8 +1062,8 @@
               <a:noFill/>
             </a:ln>
             <a:extLst>
-              <a:ext uri="{91240B29-F687-4f45-9708-019B960494DF}">
-                <a14:hiddenLine xmlns="" xmlns:a14="http://schemas.microsoft.com/office/drawing/2010/main" w="9525">
+              <a:ext uri="{91240B29-F687-4F45-9708-019B960494DF}">
+                <a14:hiddenLine xmlns:a14="http://schemas.microsoft.com/office/drawing/2010/main" w="9525">
                   <a:solidFill>
                     <a:srgbClr val="000000"/>
                   </a:solidFill>
@@ -1120,8 +1124,8 @@
               <a:noFill/>
             </a:ln>
             <a:extLst>
-              <a:ext uri="{91240B29-F687-4f45-9708-019B960494DF}">
-                <a14:hiddenLine xmlns="" xmlns:a14="http://schemas.microsoft.com/office/drawing/2010/main" w="9525">
+              <a:ext uri="{91240B29-F687-4F45-9708-019B960494DF}">
+                <a14:hiddenLine xmlns:a14="http://schemas.microsoft.com/office/drawing/2010/main" w="9525">
                   <a:solidFill>
                     <a:srgbClr val="000000"/>
                   </a:solidFill>
@@ -1230,8 +1234,8 @@
               <a:noFill/>
             </a:ln>
             <a:extLst>
-              <a:ext uri="{91240B29-F687-4f45-9708-019B960494DF}">
-                <a14:hiddenLine xmlns="" xmlns:a14="http://schemas.microsoft.com/office/drawing/2010/main" w="9525">
+              <a:ext uri="{91240B29-F687-4F45-9708-019B960494DF}">
+                <a14:hiddenLine xmlns:a14="http://schemas.microsoft.com/office/drawing/2010/main" w="9525">
                   <a:solidFill>
                     <a:srgbClr val="000000"/>
                   </a:solidFill>
@@ -1292,8 +1296,8 @@
               <a:noFill/>
             </a:ln>
             <a:extLst>
-              <a:ext uri="{91240B29-F687-4f45-9708-019B960494DF}">
-                <a14:hiddenLine xmlns="" xmlns:a14="http://schemas.microsoft.com/office/drawing/2010/main" w="9525">
+              <a:ext uri="{91240B29-F687-4F45-9708-019B960494DF}">
+                <a14:hiddenLine xmlns:a14="http://schemas.microsoft.com/office/drawing/2010/main" w="9525">
                   <a:solidFill>
                     <a:srgbClr val="000000"/>
                   </a:solidFill>
@@ -1382,8 +1386,8 @@
               <a:noFill/>
             </a:ln>
             <a:extLst>
-              <a:ext uri="{91240B29-F687-4f45-9708-019B960494DF}">
-                <a14:hiddenLine xmlns="" xmlns:a14="http://schemas.microsoft.com/office/drawing/2010/main" w="9525">
+              <a:ext uri="{91240B29-F687-4F45-9708-019B960494DF}">
+                <a14:hiddenLine xmlns:a14="http://schemas.microsoft.com/office/drawing/2010/main" w="9525">
                   <a:solidFill>
                     <a:srgbClr val="000000"/>
                   </a:solidFill>
@@ -1472,8 +1476,8 @@
               <a:noFill/>
             </a:ln>
             <a:extLst>
-              <a:ext uri="{91240B29-F687-4f45-9708-019B960494DF}">
-                <a14:hiddenLine xmlns="" xmlns:a14="http://schemas.microsoft.com/office/drawing/2010/main" w="9525">
+              <a:ext uri="{91240B29-F687-4F45-9708-019B960494DF}">
+                <a14:hiddenLine xmlns:a14="http://schemas.microsoft.com/office/drawing/2010/main" w="9525">
                   <a:solidFill>
                     <a:srgbClr val="000000"/>
                   </a:solidFill>
@@ -1534,8 +1538,8 @@
               <a:noFill/>
             </a:ln>
             <a:extLst>
-              <a:ext uri="{91240B29-F687-4f45-9708-019B960494DF}">
-                <a14:hiddenLine xmlns="" xmlns:a14="http://schemas.microsoft.com/office/drawing/2010/main" w="9525">
+              <a:ext uri="{91240B29-F687-4F45-9708-019B960494DF}">
+                <a14:hiddenLine xmlns:a14="http://schemas.microsoft.com/office/drawing/2010/main" w="9525">
                   <a:solidFill>
                     <a:srgbClr val="000000"/>
                   </a:solidFill>
@@ -1624,8 +1628,8 @@
               <a:noFill/>
             </a:ln>
             <a:extLst>
-              <a:ext uri="{91240B29-F687-4f45-9708-019B960494DF}">
-                <a14:hiddenLine xmlns="" xmlns:a14="http://schemas.microsoft.com/office/drawing/2010/main" w="9525">
+              <a:ext uri="{91240B29-F687-4F45-9708-019B960494DF}">
+                <a14:hiddenLine xmlns:a14="http://schemas.microsoft.com/office/drawing/2010/main" w="9525">
                   <a:solidFill>
                     <a:srgbClr val="000000"/>
                   </a:solidFill>
@@ -1714,8 +1718,8 @@
               <a:noFill/>
             </a:ln>
             <a:extLst>
-              <a:ext uri="{91240B29-F687-4f45-9708-019B960494DF}">
-                <a14:hiddenLine xmlns="" xmlns:a14="http://schemas.microsoft.com/office/drawing/2010/main" w="9525">
+              <a:ext uri="{91240B29-F687-4F45-9708-019B960494DF}">
+                <a14:hiddenLine xmlns:a14="http://schemas.microsoft.com/office/drawing/2010/main" w="9525">
                   <a:solidFill>
                     <a:srgbClr val="000000"/>
                   </a:solidFill>
@@ -1770,8 +1774,8 @@
               <a:noFill/>
             </a:ln>
             <a:extLst>
-              <a:ext uri="{91240B29-F687-4f45-9708-019B960494DF}">
-                <a14:hiddenLine xmlns="" xmlns:a14="http://schemas.microsoft.com/office/drawing/2010/main" w="9525">
+              <a:ext uri="{91240B29-F687-4F45-9708-019B960494DF}">
+                <a14:hiddenLine xmlns:a14="http://schemas.microsoft.com/office/drawing/2010/main" w="9525">
                   <a:solidFill>
                     <a:srgbClr val="000000"/>
                   </a:solidFill>
@@ -1860,8 +1864,8 @@
               <a:noFill/>
             </a:ln>
             <a:extLst>
-              <a:ext uri="{91240B29-F687-4f45-9708-019B960494DF}">
-                <a14:hiddenLine xmlns="" xmlns:a14="http://schemas.microsoft.com/office/drawing/2010/main" w="9525">
+              <a:ext uri="{91240B29-F687-4F45-9708-019B960494DF}">
+                <a14:hiddenLine xmlns:a14="http://schemas.microsoft.com/office/drawing/2010/main" w="9525">
                   <a:solidFill>
                     <a:srgbClr val="000000"/>
                   </a:solidFill>
@@ -1916,8 +1920,8 @@
               <a:noFill/>
             </a:ln>
             <a:extLst>
-              <a:ext uri="{91240B29-F687-4f45-9708-019B960494DF}">
-                <a14:hiddenLine xmlns="" xmlns:a14="http://schemas.microsoft.com/office/drawing/2010/main" w="9525">
+              <a:ext uri="{91240B29-F687-4F45-9708-019B960494DF}">
+                <a14:hiddenLine xmlns:a14="http://schemas.microsoft.com/office/drawing/2010/main" w="9525">
                   <a:solidFill>
                     <a:srgbClr val="000000"/>
                   </a:solidFill>
@@ -2006,8 +2010,8 @@
               <a:noFill/>
             </a:ln>
             <a:extLst>
-              <a:ext uri="{91240B29-F687-4f45-9708-019B960494DF}">
-                <a14:hiddenLine xmlns="" xmlns:a14="http://schemas.microsoft.com/office/drawing/2010/main" w="9525">
+              <a:ext uri="{91240B29-F687-4F45-9708-019B960494DF}">
+                <a14:hiddenLine xmlns:a14="http://schemas.microsoft.com/office/drawing/2010/main" w="9525">
                   <a:solidFill>
                     <a:srgbClr val="000000"/>
                   </a:solidFill>
@@ -2074,8 +2078,8 @@
               <a:noFill/>
             </a:ln>
             <a:extLst>
-              <a:ext uri="{91240B29-F687-4f45-9708-019B960494DF}">
-                <a14:hiddenLine xmlns="" xmlns:a14="http://schemas.microsoft.com/office/drawing/2010/main" w="9525">
+              <a:ext uri="{91240B29-F687-4F45-9708-019B960494DF}">
+                <a14:hiddenLine xmlns:a14="http://schemas.microsoft.com/office/drawing/2010/main" w="9525">
                   <a:solidFill>
                     <a:srgbClr val="000000"/>
                   </a:solidFill>
@@ -2164,8 +2168,8 @@
               <a:noFill/>
             </a:ln>
             <a:extLst>
-              <a:ext uri="{91240B29-F687-4f45-9708-019B960494DF}">
-                <a14:hiddenLine xmlns="" xmlns:a14="http://schemas.microsoft.com/office/drawing/2010/main" w="9525">
+              <a:ext uri="{91240B29-F687-4F45-9708-019B960494DF}">
+                <a14:hiddenLine xmlns:a14="http://schemas.microsoft.com/office/drawing/2010/main" w="9525">
                   <a:solidFill>
                     <a:srgbClr val="000000"/>
                   </a:solidFill>
@@ -2232,8 +2236,8 @@
               <a:noFill/>
             </a:ln>
             <a:extLst>
-              <a:ext uri="{91240B29-F687-4f45-9708-019B960494DF}">
-                <a14:hiddenLine xmlns="" xmlns:a14="http://schemas.microsoft.com/office/drawing/2010/main" w="9525">
+              <a:ext uri="{91240B29-F687-4F45-9708-019B960494DF}">
+                <a14:hiddenLine xmlns:a14="http://schemas.microsoft.com/office/drawing/2010/main" w="9525">
                   <a:solidFill>
                     <a:srgbClr val="000000"/>
                   </a:solidFill>
@@ -2322,8 +2326,8 @@
               <a:noFill/>
             </a:ln>
             <a:extLst>
-              <a:ext uri="{91240B29-F687-4f45-9708-019B960494DF}">
-                <a14:hiddenLine xmlns="" xmlns:a14="http://schemas.microsoft.com/office/drawing/2010/main" w="9525">
+              <a:ext uri="{91240B29-F687-4F45-9708-019B960494DF}">
+                <a14:hiddenLine xmlns:a14="http://schemas.microsoft.com/office/drawing/2010/main" w="9525">
                   <a:solidFill>
                     <a:srgbClr val="000000"/>
                   </a:solidFill>
@@ -2356,8 +2360,8 @@
               <a:noFill/>
             </a:ln>
             <a:extLst>
-              <a:ext uri="{91240B29-F687-4f45-9708-019B960494DF}">
-                <a14:hiddenLine xmlns="" xmlns:a14="http://schemas.microsoft.com/office/drawing/2010/main" w="9525">
+              <a:ext uri="{91240B29-F687-4F45-9708-019B960494DF}">
+                <a14:hiddenLine xmlns:a14="http://schemas.microsoft.com/office/drawing/2010/main" w="9525">
                   <a:solidFill>
                     <a:srgbClr val="000000"/>
                   </a:solidFill>
@@ -2446,8 +2450,8 @@
               <a:noFill/>
             </a:ln>
             <a:extLst>
-              <a:ext uri="{91240B29-F687-4f45-9708-019B960494DF}">
-                <a14:hiddenLine xmlns="" xmlns:a14="http://schemas.microsoft.com/office/drawing/2010/main" w="9525">
+              <a:ext uri="{91240B29-F687-4F45-9708-019B960494DF}">
+                <a14:hiddenLine xmlns:a14="http://schemas.microsoft.com/office/drawing/2010/main" w="9525">
                   <a:solidFill>
                     <a:srgbClr val="000000"/>
                   </a:solidFill>
@@ -2508,8 +2512,8 @@
               <a:noFill/>
             </a:ln>
             <a:extLst>
-              <a:ext uri="{91240B29-F687-4f45-9708-019B960494DF}">
-                <a14:hiddenLine xmlns="" xmlns:a14="http://schemas.microsoft.com/office/drawing/2010/main" w="9525">
+              <a:ext uri="{91240B29-F687-4F45-9708-019B960494DF}">
+                <a14:hiddenLine xmlns:a14="http://schemas.microsoft.com/office/drawing/2010/main" w="9525">
                   <a:solidFill>
                     <a:srgbClr val="000000"/>
                   </a:solidFill>
@@ -2570,8 +2574,8 @@
               <a:noFill/>
             </a:ln>
             <a:extLst>
-              <a:ext uri="{91240B29-F687-4f45-9708-019B960494DF}">
-                <a14:hiddenLine xmlns="" xmlns:a14="http://schemas.microsoft.com/office/drawing/2010/main" w="9525">
+              <a:ext uri="{91240B29-F687-4F45-9708-019B960494DF}">
+                <a14:hiddenLine xmlns:a14="http://schemas.microsoft.com/office/drawing/2010/main" w="9525">
                   <a:solidFill>
                     <a:srgbClr val="000000"/>
                   </a:solidFill>
@@ -2660,8 +2664,8 @@
               <a:noFill/>
             </a:ln>
             <a:extLst>
-              <a:ext uri="{91240B29-F687-4f45-9708-019B960494DF}">
-                <a14:hiddenLine xmlns="" xmlns:a14="http://schemas.microsoft.com/office/drawing/2010/main" w="9525">
+              <a:ext uri="{91240B29-F687-4F45-9708-019B960494DF}">
+                <a14:hiddenLine xmlns:a14="http://schemas.microsoft.com/office/drawing/2010/main" w="9525">
                   <a:solidFill>
                     <a:srgbClr val="000000"/>
                   </a:solidFill>
@@ -2728,8 +2732,8 @@
               <a:noFill/>
             </a:ln>
             <a:extLst>
-              <a:ext uri="{91240B29-F687-4f45-9708-019B960494DF}">
-                <a14:hiddenLine xmlns="" xmlns:a14="http://schemas.microsoft.com/office/drawing/2010/main" w="9525">
+              <a:ext uri="{91240B29-F687-4F45-9708-019B960494DF}">
+                <a14:hiddenLine xmlns:a14="http://schemas.microsoft.com/office/drawing/2010/main" w="9525">
                   <a:solidFill>
                     <a:srgbClr val="000000"/>
                   </a:solidFill>
@@ -2790,8 +2794,8 @@
               <a:noFill/>
             </a:ln>
             <a:extLst>
-              <a:ext uri="{91240B29-F687-4f45-9708-019B960494DF}">
-                <a14:hiddenLine xmlns="" xmlns:a14="http://schemas.microsoft.com/office/drawing/2010/main" w="9525">
+              <a:ext uri="{91240B29-F687-4F45-9708-019B960494DF}">
+                <a14:hiddenLine xmlns:a14="http://schemas.microsoft.com/office/drawing/2010/main" w="9525">
                   <a:solidFill>
                     <a:srgbClr val="000000"/>
                   </a:solidFill>
@@ -2880,8 +2884,8 @@
               <a:noFill/>
             </a:ln>
             <a:extLst>
-              <a:ext uri="{91240B29-F687-4f45-9708-019B960494DF}">
-                <a14:hiddenLine xmlns="" xmlns:a14="http://schemas.microsoft.com/office/drawing/2010/main" w="9525">
+              <a:ext uri="{91240B29-F687-4F45-9708-019B960494DF}">
+                <a14:hiddenLine xmlns:a14="http://schemas.microsoft.com/office/drawing/2010/main" w="9525">
                   <a:solidFill>
                     <a:srgbClr val="000000"/>
                   </a:solidFill>
@@ -2942,8 +2946,8 @@
               <a:noFill/>
             </a:ln>
             <a:extLst>
-              <a:ext uri="{91240B29-F687-4f45-9708-019B960494DF}">
-                <a14:hiddenLine xmlns="" xmlns:a14="http://schemas.microsoft.com/office/drawing/2010/main" w="9525">
+              <a:ext uri="{91240B29-F687-4F45-9708-019B960494DF}">
+                <a14:hiddenLine xmlns:a14="http://schemas.microsoft.com/office/drawing/2010/main" w="9525">
                   <a:solidFill>
                     <a:srgbClr val="000000"/>
                   </a:solidFill>
@@ -3032,8 +3036,8 @@
               <a:noFill/>
             </a:ln>
             <a:extLst>
-              <a:ext uri="{91240B29-F687-4f45-9708-019B960494DF}">
-                <a14:hiddenLine xmlns="" xmlns:a14="http://schemas.microsoft.com/office/drawing/2010/main" w="9525">
+              <a:ext uri="{91240B29-F687-4F45-9708-019B960494DF}">
+                <a14:hiddenLine xmlns:a14="http://schemas.microsoft.com/office/drawing/2010/main" w="9525">
                   <a:solidFill>
                     <a:srgbClr val="000000"/>
                   </a:solidFill>
@@ -3094,8 +3098,8 @@
               <a:noFill/>
             </a:ln>
             <a:extLst>
-              <a:ext uri="{91240B29-F687-4f45-9708-019B960494DF}">
-                <a14:hiddenLine xmlns="" xmlns:a14="http://schemas.microsoft.com/office/drawing/2010/main" w="9525">
+              <a:ext uri="{91240B29-F687-4F45-9708-019B960494DF}">
+                <a14:hiddenLine xmlns:a14="http://schemas.microsoft.com/office/drawing/2010/main" w="9525">
                   <a:solidFill>
                     <a:srgbClr val="000000"/>
                   </a:solidFill>
@@ -3184,8 +3188,8 @@
               <a:noFill/>
             </a:ln>
             <a:extLst>
-              <a:ext uri="{91240B29-F687-4f45-9708-019B960494DF}">
-                <a14:hiddenLine xmlns="" xmlns:a14="http://schemas.microsoft.com/office/drawing/2010/main" w="9525">
+              <a:ext uri="{91240B29-F687-4F45-9708-019B960494DF}">
+                <a14:hiddenLine xmlns:a14="http://schemas.microsoft.com/office/drawing/2010/main" w="9525">
                   <a:solidFill>
                     <a:srgbClr val="000000"/>
                   </a:solidFill>
@@ -3218,8 +3222,8 @@
               <a:noFill/>
             </a:ln>
             <a:extLst>
-              <a:ext uri="{91240B29-F687-4f45-9708-019B960494DF}">
-                <a14:hiddenLine xmlns="" xmlns:a14="http://schemas.microsoft.com/office/drawing/2010/main" w="9525">
+              <a:ext uri="{91240B29-F687-4F45-9708-019B960494DF}">
+                <a14:hiddenLine xmlns:a14="http://schemas.microsoft.com/office/drawing/2010/main" w="9525">
                   <a:solidFill>
                     <a:srgbClr val="000000"/>
                   </a:solidFill>
@@ -3283,8 +3287,8 @@
               <a:noFill/>
             </a:ln>
             <a:extLst>
-              <a:ext uri="{91240B29-F687-4f45-9708-019B960494DF}">
-                <a14:hiddenLine xmlns="" xmlns:a14="http://schemas.microsoft.com/office/drawing/2010/main" w="9525">
+              <a:ext uri="{91240B29-F687-4F45-9708-019B960494DF}">
+                <a14:hiddenLine xmlns:a14="http://schemas.microsoft.com/office/drawing/2010/main" w="9525">
                   <a:solidFill>
                     <a:srgbClr val="000000"/>
                   </a:solidFill>
@@ -3373,8 +3377,8 @@
               <a:noFill/>
             </a:ln>
             <a:extLst>
-              <a:ext uri="{91240B29-F687-4f45-9708-019B960494DF}">
-                <a14:hiddenLine xmlns="" xmlns:a14="http://schemas.microsoft.com/office/drawing/2010/main" w="9525">
+              <a:ext uri="{91240B29-F687-4F45-9708-019B960494DF}">
+                <a14:hiddenLine xmlns:a14="http://schemas.microsoft.com/office/drawing/2010/main" w="9525">
                   <a:solidFill>
                     <a:srgbClr val="000000"/>
                   </a:solidFill>
@@ -3435,8 +3439,8 @@
               <a:noFill/>
             </a:ln>
             <a:extLst>
-              <a:ext uri="{91240B29-F687-4f45-9708-019B960494DF}">
-                <a14:hiddenLine xmlns="" xmlns:a14="http://schemas.microsoft.com/office/drawing/2010/main" w="9525">
+              <a:ext uri="{91240B29-F687-4F45-9708-019B960494DF}">
+                <a14:hiddenLine xmlns:a14="http://schemas.microsoft.com/office/drawing/2010/main" w="9525">
                   <a:solidFill>
                     <a:srgbClr val="000000"/>
                   </a:solidFill>
@@ -3525,8 +3529,8 @@
               <a:noFill/>
             </a:ln>
             <a:extLst>
-              <a:ext uri="{91240B29-F687-4f45-9708-019B960494DF}">
-                <a14:hiddenLine xmlns="" xmlns:a14="http://schemas.microsoft.com/office/drawing/2010/main" w="9525">
+              <a:ext uri="{91240B29-F687-4F45-9708-019B960494DF}">
+                <a14:hiddenLine xmlns:a14="http://schemas.microsoft.com/office/drawing/2010/main" w="9525">
                   <a:solidFill>
                     <a:srgbClr val="000000"/>
                   </a:solidFill>
@@ -3615,8 +3619,8 @@
               <a:noFill/>
             </a:ln>
             <a:extLst>
-              <a:ext uri="{91240B29-F687-4f45-9708-019B960494DF}">
-                <a14:hiddenLine xmlns="" xmlns:a14="http://schemas.microsoft.com/office/drawing/2010/main" w="9525">
+              <a:ext uri="{91240B29-F687-4F45-9708-019B960494DF}">
+                <a14:hiddenLine xmlns:a14="http://schemas.microsoft.com/office/drawing/2010/main" w="9525">
                   <a:solidFill>
                     <a:srgbClr val="000000"/>
                   </a:solidFill>
@@ -3680,8 +3684,8 @@
               <a:noFill/>
             </a:ln>
             <a:extLst>
-              <a:ext uri="{91240B29-F687-4f45-9708-019B960494DF}">
-                <a14:hiddenLine xmlns="" xmlns:a14="http://schemas.microsoft.com/office/drawing/2010/main" w="9525">
+              <a:ext uri="{91240B29-F687-4F45-9708-019B960494DF}">
+                <a14:hiddenLine xmlns:a14="http://schemas.microsoft.com/office/drawing/2010/main" w="9525">
                   <a:solidFill>
                     <a:srgbClr val="000000"/>
                   </a:solidFill>
@@ -3742,8 +3746,8 @@
               <a:noFill/>
             </a:ln>
             <a:extLst>
-              <a:ext uri="{91240B29-F687-4f45-9708-019B960494DF}">
-                <a14:hiddenLine xmlns="" xmlns:a14="http://schemas.microsoft.com/office/drawing/2010/main" w="9525">
+              <a:ext uri="{91240B29-F687-4F45-9708-019B960494DF}">
+                <a14:hiddenLine xmlns:a14="http://schemas.microsoft.com/office/drawing/2010/main" w="9525">
                   <a:solidFill>
                     <a:srgbClr val="000000"/>
                   </a:solidFill>
@@ -3832,8 +3836,8 @@
               <a:noFill/>
             </a:ln>
             <a:extLst>
-              <a:ext uri="{91240B29-F687-4f45-9708-019B960494DF}">
-                <a14:hiddenLine xmlns="" xmlns:a14="http://schemas.microsoft.com/office/drawing/2010/main" w="9525">
+              <a:ext uri="{91240B29-F687-4F45-9708-019B960494DF}">
+                <a14:hiddenLine xmlns:a14="http://schemas.microsoft.com/office/drawing/2010/main" w="9525">
                   <a:solidFill>
                     <a:srgbClr val="000000"/>
                   </a:solidFill>
@@ -3922,8 +3926,8 @@
               <a:noFill/>
             </a:ln>
             <a:extLst>
-              <a:ext uri="{91240B29-F687-4f45-9708-019B960494DF}">
-                <a14:hiddenLine xmlns="" xmlns:a14="http://schemas.microsoft.com/office/drawing/2010/main" w="9525">
+              <a:ext uri="{91240B29-F687-4F45-9708-019B960494DF}">
+                <a14:hiddenLine xmlns:a14="http://schemas.microsoft.com/office/drawing/2010/main" w="9525">
                   <a:solidFill>
                     <a:srgbClr val="000000"/>
                   </a:solidFill>
@@ -3984,8 +3988,8 @@
               <a:noFill/>
             </a:ln>
             <a:extLst>
-              <a:ext uri="{91240B29-F687-4f45-9708-019B960494DF}">
-                <a14:hiddenLine xmlns="" xmlns:a14="http://schemas.microsoft.com/office/drawing/2010/main" w="9525">
+              <a:ext uri="{91240B29-F687-4F45-9708-019B960494DF}">
+                <a14:hiddenLine xmlns:a14="http://schemas.microsoft.com/office/drawing/2010/main" w="9525">
                   <a:solidFill>
                     <a:srgbClr val="000000"/>
                   </a:solidFill>
@@ -4104,8 +4108,8 @@
               <a:noFill/>
             </a:ln>
             <a:extLst>
-              <a:ext uri="{91240B29-F687-4f45-9708-019B960494DF}">
-                <a14:hiddenLine xmlns="" xmlns:a14="http://schemas.microsoft.com/office/drawing/2010/main" w="9525">
+              <a:ext uri="{91240B29-F687-4F45-9708-019B960494DF}">
+                <a14:hiddenLine xmlns:a14="http://schemas.microsoft.com/office/drawing/2010/main" w="9525">
                   <a:solidFill>
                     <a:srgbClr val="000000"/>
                   </a:solidFill>
@@ -4172,8 +4176,8 @@
               <a:noFill/>
             </a:ln>
             <a:extLst>
-              <a:ext uri="{91240B29-F687-4f45-9708-019B960494DF}">
-                <a14:hiddenLine xmlns="" xmlns:a14="http://schemas.microsoft.com/office/drawing/2010/main" w="9525">
+              <a:ext uri="{91240B29-F687-4F45-9708-019B960494DF}">
+                <a14:hiddenLine xmlns:a14="http://schemas.microsoft.com/office/drawing/2010/main" w="9525">
                   <a:solidFill>
                     <a:srgbClr val="000000"/>
                   </a:solidFill>
@@ -4262,8 +4266,8 @@
               <a:noFill/>
             </a:ln>
             <a:extLst>
-              <a:ext uri="{91240B29-F687-4f45-9708-019B960494DF}">
-                <a14:hiddenLine xmlns="" xmlns:a14="http://schemas.microsoft.com/office/drawing/2010/main" w="9525">
+              <a:ext uri="{91240B29-F687-4F45-9708-019B960494DF}">
+                <a14:hiddenLine xmlns:a14="http://schemas.microsoft.com/office/drawing/2010/main" w="9525">
                   <a:solidFill>
                     <a:srgbClr val="000000"/>
                   </a:solidFill>
@@ -4403,7 +4407,7 @@
           <a:p>
             <a:fld id="{48A87A34-81AB-432B-8DAE-1953F412C126}" type="datetimeFigureOut">
               <a:rPr lang="en-US" dirty="0"/>
-              <a:t>1/8/2015</a:t>
+              <a:t>1/9/2015</a:t>
             </a:fld>
             <a:endParaRPr lang="en-US" dirty="0"/>
           </a:p>
@@ -4665,7 +4669,7 @@
           <a:p>
             <a:fld id="{48A87A34-81AB-432B-8DAE-1953F412C126}" type="datetimeFigureOut">
               <a:rPr lang="en-US" dirty="0"/>
-              <a:t>1/8/2015</a:t>
+              <a:t>1/9/2015</a:t>
             </a:fld>
             <a:endParaRPr lang="en-US" dirty="0"/>
           </a:p>
@@ -4856,7 +4860,7 @@
           <a:p>
             <a:fld id="{48A87A34-81AB-432B-8DAE-1953F412C126}" type="datetimeFigureOut">
               <a:rPr lang="en-US" dirty="0"/>
-              <a:t>1/8/2015</a:t>
+              <a:t>1/9/2015</a:t>
             </a:fld>
             <a:endParaRPr lang="en-US" dirty="0"/>
           </a:p>
@@ -5114,7 +5118,7 @@
           <a:p>
             <a:fld id="{48A87A34-81AB-432B-8DAE-1953F412C126}" type="datetimeFigureOut">
               <a:rPr lang="en-US" dirty="0"/>
-              <a:t>1/8/2015</a:t>
+              <a:t>1/9/2015</a:t>
             </a:fld>
             <a:endParaRPr lang="en-US" dirty="0"/>
           </a:p>
@@ -5543,7 +5547,7 @@
           <a:p>
             <a:fld id="{48A87A34-81AB-432B-8DAE-1953F412C126}" type="datetimeFigureOut">
               <a:rPr lang="en-US" dirty="0"/>
-              <a:t>1/8/2015</a:t>
+              <a:t>1/9/2015</a:t>
             </a:fld>
             <a:endParaRPr lang="en-US" dirty="0"/>
           </a:p>
@@ -6084,7 +6088,7 @@
           <a:p>
             <a:fld id="{48A87A34-81AB-432B-8DAE-1953F412C126}" type="datetimeFigureOut">
               <a:rPr lang="en-US" dirty="0"/>
-              <a:t>1/8/2015</a:t>
+              <a:t>1/9/2015</a:t>
             </a:fld>
             <a:endParaRPr lang="en-US" dirty="0"/>
           </a:p>
@@ -6799,7 +6803,7 @@
           <a:p>
             <a:fld id="{48A87A34-81AB-432B-8DAE-1953F412C126}" type="datetimeFigureOut">
               <a:rPr lang="en-US" dirty="0"/>
-              <a:t>1/8/2015</a:t>
+              <a:t>1/9/2015</a:t>
             </a:fld>
             <a:endParaRPr lang="en-US" dirty="0"/>
           </a:p>
@@ -6964,7 +6968,7 @@
           <a:p>
             <a:fld id="{48A87A34-81AB-432B-8DAE-1953F412C126}" type="datetimeFigureOut">
               <a:rPr lang="en-US" dirty="0"/>
-              <a:t>1/8/2015</a:t>
+              <a:t>1/9/2015</a:t>
             </a:fld>
             <a:endParaRPr lang="en-US" dirty="0"/>
           </a:p>
@@ -7139,7 +7143,7 @@
           <a:p>
             <a:fld id="{48A87A34-81AB-432B-8DAE-1953F412C126}" type="datetimeFigureOut">
               <a:rPr lang="en-US" dirty="0"/>
-              <a:t>1/8/2015</a:t>
+              <a:t>1/9/2015</a:t>
             </a:fld>
             <a:endParaRPr lang="en-US" dirty="0"/>
           </a:p>
@@ -7304,7 +7308,7 @@
           <a:p>
             <a:fld id="{48A87A34-81AB-432B-8DAE-1953F412C126}" type="datetimeFigureOut">
               <a:rPr lang="en-US" dirty="0"/>
-              <a:t>1/8/2015</a:t>
+              <a:t>1/9/2015</a:t>
             </a:fld>
             <a:endParaRPr lang="en-US" dirty="0"/>
           </a:p>
@@ -7549,7 +7553,7 @@
           <a:p>
             <a:fld id="{48A87A34-81AB-432B-8DAE-1953F412C126}" type="datetimeFigureOut">
               <a:rPr lang="en-US" dirty="0"/>
-              <a:t>1/8/2015</a:t>
+              <a:t>1/9/2015</a:t>
             </a:fld>
             <a:endParaRPr lang="en-US" dirty="0"/>
           </a:p>
@@ -7776,7 +7780,7 @@
           <a:p>
             <a:fld id="{48A87A34-81AB-432B-8DAE-1953F412C126}" type="datetimeFigureOut">
               <a:rPr lang="en-US" dirty="0"/>
-              <a:t>1/8/2015</a:t>
+              <a:t>1/9/2015</a:t>
             </a:fld>
             <a:endParaRPr lang="en-US" dirty="0"/>
           </a:p>
@@ -8152,7 +8156,7 @@
           <a:p>
             <a:fld id="{48A87A34-81AB-432B-8DAE-1953F412C126}" type="datetimeFigureOut">
               <a:rPr lang="en-US" dirty="0"/>
-              <a:t>1/8/2015</a:t>
+              <a:t>1/9/2015</a:t>
             </a:fld>
             <a:endParaRPr lang="en-US" dirty="0"/>
           </a:p>
@@ -8265,7 +8269,7 @@
           <a:p>
             <a:fld id="{48A87A34-81AB-432B-8DAE-1953F412C126}" type="datetimeFigureOut">
               <a:rPr lang="en-US" dirty="0"/>
-              <a:t>1/8/2015</a:t>
+              <a:t>1/9/2015</a:t>
             </a:fld>
             <a:endParaRPr lang="en-US" dirty="0"/>
           </a:p>
@@ -8355,7 +8359,7 @@
           <a:p>
             <a:fld id="{48A87A34-81AB-432B-8DAE-1953F412C126}" type="datetimeFigureOut">
               <a:rPr lang="en-US" dirty="0"/>
-              <a:t>1/8/2015</a:t>
+              <a:t>1/9/2015</a:t>
             </a:fld>
             <a:endParaRPr lang="en-US" dirty="0"/>
           </a:p>
@@ -8599,7 +8603,7 @@
           <a:p>
             <a:fld id="{48A87A34-81AB-432B-8DAE-1953F412C126}" type="datetimeFigureOut">
               <a:rPr lang="en-US" dirty="0"/>
-              <a:t>1/8/2015</a:t>
+              <a:t>1/9/2015</a:t>
             </a:fld>
             <a:endParaRPr lang="en-US" dirty="0"/>
           </a:p>
@@ -8874,7 +8878,7 @@
           <a:p>
             <a:fld id="{48A87A34-81AB-432B-8DAE-1953F412C126}" type="datetimeFigureOut">
               <a:rPr lang="en-US" dirty="0"/>
-              <a:t>1/8/2015</a:t>
+              <a:t>1/9/2015</a:t>
             </a:fld>
             <a:endParaRPr lang="en-US" dirty="0"/>
           </a:p>
@@ -8991,8 +8995,8 @@
           </a:prstGeom>
           <a:noFill/>
           <a:extLst>
-            <a:ext uri="{909E8E84-426E-40dd-AFC4-6F175D3DCCD1}">
-              <a14:hiddenFill xmlns="" xmlns:a14="http://schemas.microsoft.com/office/drawing/2010/main">
+            <a:ext uri="{909E8E84-426E-40DD-AFC4-6F175D3DCCD1}">
+              <a14:hiddenFill xmlns:a14="http://schemas.microsoft.com/office/drawing/2010/main">
                 <a:solidFill>
                   <a:srgbClr val="FFFFFF"/>
                 </a:solidFill>
@@ -9065,8 +9069,8 @@
                 <a:noFill/>
               </a:ln>
               <a:extLst>
-                <a:ext uri="{91240B29-F687-4f45-9708-019B960494DF}">
-                  <a14:hiddenLine xmlns="" xmlns:a14="http://schemas.microsoft.com/office/drawing/2010/main" w="9525">
+                <a:ext uri="{91240B29-F687-4F45-9708-019B960494DF}">
+                  <a14:hiddenLine xmlns:a14="http://schemas.microsoft.com/office/drawing/2010/main" w="9525">
                     <a:solidFill>
                       <a:srgbClr val="000000"/>
                     </a:solidFill>
@@ -9155,8 +9159,8 @@
                 <a:noFill/>
               </a:ln>
               <a:extLst>
-                <a:ext uri="{91240B29-F687-4f45-9708-019B960494DF}">
-                  <a14:hiddenLine xmlns="" xmlns:a14="http://schemas.microsoft.com/office/drawing/2010/main" w="9525">
+                <a:ext uri="{91240B29-F687-4F45-9708-019B960494DF}">
+                  <a14:hiddenLine xmlns:a14="http://schemas.microsoft.com/office/drawing/2010/main" w="9525">
                     <a:solidFill>
                       <a:srgbClr val="000000"/>
                     </a:solidFill>
@@ -9245,8 +9249,8 @@
                 <a:noFill/>
               </a:ln>
               <a:extLst>
-                <a:ext uri="{91240B29-F687-4f45-9708-019B960494DF}">
-                  <a14:hiddenLine xmlns="" xmlns:a14="http://schemas.microsoft.com/office/drawing/2010/main" w="9525">
+                <a:ext uri="{91240B29-F687-4F45-9708-019B960494DF}">
+                  <a14:hiddenLine xmlns:a14="http://schemas.microsoft.com/office/drawing/2010/main" w="9525">
                     <a:solidFill>
                       <a:srgbClr val="000000"/>
                     </a:solidFill>
@@ -9307,8 +9311,8 @@
                 <a:noFill/>
               </a:ln>
               <a:extLst>
-                <a:ext uri="{91240B29-F687-4f45-9708-019B960494DF}">
-                  <a14:hiddenLine xmlns="" xmlns:a14="http://schemas.microsoft.com/office/drawing/2010/main" w="9525">
+                <a:ext uri="{91240B29-F687-4F45-9708-019B960494DF}">
+                  <a14:hiddenLine xmlns:a14="http://schemas.microsoft.com/office/drawing/2010/main" w="9525">
                     <a:solidFill>
                       <a:srgbClr val="000000"/>
                     </a:solidFill>
@@ -9397,8 +9401,8 @@
                 <a:noFill/>
               </a:ln>
               <a:extLst>
-                <a:ext uri="{91240B29-F687-4f45-9708-019B960494DF}">
-                  <a14:hiddenLine xmlns="" xmlns:a14="http://schemas.microsoft.com/office/drawing/2010/main" w="9525">
+                <a:ext uri="{91240B29-F687-4F45-9708-019B960494DF}">
+                  <a14:hiddenLine xmlns:a14="http://schemas.microsoft.com/office/drawing/2010/main" w="9525">
                     <a:solidFill>
                       <a:srgbClr val="000000"/>
                     </a:solidFill>
@@ -9459,8 +9463,8 @@
                 <a:noFill/>
               </a:ln>
               <a:extLst>
-                <a:ext uri="{91240B29-F687-4f45-9708-019B960494DF}">
-                  <a14:hiddenLine xmlns="" xmlns:a14="http://schemas.microsoft.com/office/drawing/2010/main" w="9525">
+                <a:ext uri="{91240B29-F687-4F45-9708-019B960494DF}">
+                  <a14:hiddenLine xmlns:a14="http://schemas.microsoft.com/office/drawing/2010/main" w="9525">
                     <a:solidFill>
                       <a:srgbClr val="000000"/>
                     </a:solidFill>
@@ -9521,8 +9525,8 @@
                 <a:noFill/>
               </a:ln>
               <a:extLst>
-                <a:ext uri="{91240B29-F687-4f45-9708-019B960494DF}">
-                  <a14:hiddenLine xmlns="" xmlns:a14="http://schemas.microsoft.com/office/drawing/2010/main" w="9525">
+                <a:ext uri="{91240B29-F687-4F45-9708-019B960494DF}">
+                  <a14:hiddenLine xmlns:a14="http://schemas.microsoft.com/office/drawing/2010/main" w="9525">
                     <a:solidFill>
                       <a:srgbClr val="000000"/>
                     </a:solidFill>
@@ -9611,8 +9615,8 @@
                 <a:noFill/>
               </a:ln>
               <a:extLst>
-                <a:ext uri="{91240B29-F687-4f45-9708-019B960494DF}">
-                  <a14:hiddenLine xmlns="" xmlns:a14="http://schemas.microsoft.com/office/drawing/2010/main" w="9525">
+                <a:ext uri="{91240B29-F687-4F45-9708-019B960494DF}">
+                  <a14:hiddenLine xmlns:a14="http://schemas.microsoft.com/office/drawing/2010/main" w="9525">
                     <a:solidFill>
                       <a:srgbClr val="000000"/>
                     </a:solidFill>
@@ -9701,8 +9705,8 @@
                 <a:noFill/>
               </a:ln>
               <a:extLst>
-                <a:ext uri="{91240B29-F687-4f45-9708-019B960494DF}">
-                  <a14:hiddenLine xmlns="" xmlns:a14="http://schemas.microsoft.com/office/drawing/2010/main" w="9525">
+                <a:ext uri="{91240B29-F687-4F45-9708-019B960494DF}">
+                  <a14:hiddenLine xmlns:a14="http://schemas.microsoft.com/office/drawing/2010/main" w="9525">
                     <a:solidFill>
                       <a:srgbClr val="000000"/>
                     </a:solidFill>
@@ -9763,8 +9767,8 @@
                 <a:noFill/>
               </a:ln>
               <a:extLst>
-                <a:ext uri="{91240B29-F687-4f45-9708-019B960494DF}">
-                  <a14:hiddenLine xmlns="" xmlns:a14="http://schemas.microsoft.com/office/drawing/2010/main" w="9525">
+                <a:ext uri="{91240B29-F687-4F45-9708-019B960494DF}">
+                  <a14:hiddenLine xmlns:a14="http://schemas.microsoft.com/office/drawing/2010/main" w="9525">
                     <a:solidFill>
                       <a:srgbClr val="000000"/>
                     </a:solidFill>
@@ -9873,8 +9877,8 @@
                 <a:noFill/>
               </a:ln>
               <a:extLst>
-                <a:ext uri="{91240B29-F687-4f45-9708-019B960494DF}">
-                  <a14:hiddenLine xmlns="" xmlns:a14="http://schemas.microsoft.com/office/drawing/2010/main" w="9525">
+                <a:ext uri="{91240B29-F687-4F45-9708-019B960494DF}">
+                  <a14:hiddenLine xmlns:a14="http://schemas.microsoft.com/office/drawing/2010/main" w="9525">
                     <a:solidFill>
                       <a:srgbClr val="000000"/>
                     </a:solidFill>
@@ -9957,8 +9961,8 @@
                 <a:noFill/>
               </a:ln>
               <a:extLst>
-                <a:ext uri="{91240B29-F687-4f45-9708-019B960494DF}">
-                  <a14:hiddenLine xmlns="" xmlns:a14="http://schemas.microsoft.com/office/drawing/2010/main" w="9525">
+                <a:ext uri="{91240B29-F687-4F45-9708-019B960494DF}">
+                  <a14:hiddenLine xmlns:a14="http://schemas.microsoft.com/office/drawing/2010/main" w="9525">
                     <a:solidFill>
                       <a:srgbClr val="000000"/>
                     </a:solidFill>
@@ -10019,8 +10023,8 @@
                 <a:noFill/>
               </a:ln>
               <a:extLst>
-                <a:ext uri="{91240B29-F687-4f45-9708-019B960494DF}">
-                  <a14:hiddenLine xmlns="" xmlns:a14="http://schemas.microsoft.com/office/drawing/2010/main" w="9525">
+                <a:ext uri="{91240B29-F687-4F45-9708-019B960494DF}">
+                  <a14:hiddenLine xmlns:a14="http://schemas.microsoft.com/office/drawing/2010/main" w="9525">
                     <a:solidFill>
                       <a:srgbClr val="000000"/>
                     </a:solidFill>
@@ -10081,8 +10085,8 @@
                 <a:noFill/>
               </a:ln>
               <a:extLst>
-                <a:ext uri="{91240B29-F687-4f45-9708-019B960494DF}">
-                  <a14:hiddenLine xmlns="" xmlns:a14="http://schemas.microsoft.com/office/drawing/2010/main" w="9525">
+                <a:ext uri="{91240B29-F687-4F45-9708-019B960494DF}">
+                  <a14:hiddenLine xmlns:a14="http://schemas.microsoft.com/office/drawing/2010/main" w="9525">
                     <a:solidFill>
                       <a:srgbClr val="000000"/>
                     </a:solidFill>
@@ -10171,8 +10175,8 @@
                 <a:noFill/>
               </a:ln>
               <a:extLst>
-                <a:ext uri="{91240B29-F687-4f45-9708-019B960494DF}">
-                  <a14:hiddenLine xmlns="" xmlns:a14="http://schemas.microsoft.com/office/drawing/2010/main" w="9525">
+                <a:ext uri="{91240B29-F687-4F45-9708-019B960494DF}">
+                  <a14:hiddenLine xmlns:a14="http://schemas.microsoft.com/office/drawing/2010/main" w="9525">
                     <a:solidFill>
                       <a:srgbClr val="000000"/>
                     </a:solidFill>
@@ -10205,8 +10209,8 @@
                 <a:noFill/>
               </a:ln>
               <a:extLst>
-                <a:ext uri="{91240B29-F687-4f45-9708-019B960494DF}">
-                  <a14:hiddenLine xmlns="" xmlns:a14="http://schemas.microsoft.com/office/drawing/2010/main" w="9525">
+                <a:ext uri="{91240B29-F687-4F45-9708-019B960494DF}">
+                  <a14:hiddenLine xmlns:a14="http://schemas.microsoft.com/office/drawing/2010/main" w="9525">
                     <a:solidFill>
                       <a:srgbClr val="000000"/>
                     </a:solidFill>
@@ -10270,8 +10274,8 @@
                 <a:noFill/>
               </a:ln>
               <a:extLst>
-                <a:ext uri="{91240B29-F687-4f45-9708-019B960494DF}">
-                  <a14:hiddenLine xmlns="" xmlns:a14="http://schemas.microsoft.com/office/drawing/2010/main" w="9525">
+                <a:ext uri="{91240B29-F687-4F45-9708-019B960494DF}">
+                  <a14:hiddenLine xmlns:a14="http://schemas.microsoft.com/office/drawing/2010/main" w="9525">
                     <a:solidFill>
                       <a:srgbClr val="000000"/>
                     </a:solidFill>
@@ -10360,8 +10364,8 @@
                 <a:noFill/>
               </a:ln>
               <a:extLst>
-                <a:ext uri="{91240B29-F687-4f45-9708-019B960494DF}">
-                  <a14:hiddenLine xmlns="" xmlns:a14="http://schemas.microsoft.com/office/drawing/2010/main" w="9525">
+                <a:ext uri="{91240B29-F687-4F45-9708-019B960494DF}">
+                  <a14:hiddenLine xmlns:a14="http://schemas.microsoft.com/office/drawing/2010/main" w="9525">
                     <a:solidFill>
                       <a:srgbClr val="000000"/>
                     </a:solidFill>
@@ -10422,8 +10426,8 @@
                 <a:noFill/>
               </a:ln>
               <a:extLst>
-                <a:ext uri="{91240B29-F687-4f45-9708-019B960494DF}">
-                  <a14:hiddenLine xmlns="" xmlns:a14="http://schemas.microsoft.com/office/drawing/2010/main" w="9525">
+                <a:ext uri="{91240B29-F687-4F45-9708-019B960494DF}">
+                  <a14:hiddenLine xmlns:a14="http://schemas.microsoft.com/office/drawing/2010/main" w="9525">
                     <a:solidFill>
                       <a:srgbClr val="000000"/>
                     </a:solidFill>
@@ -10512,8 +10516,8 @@
                 <a:noFill/>
               </a:ln>
               <a:extLst>
-                <a:ext uri="{91240B29-F687-4f45-9708-019B960494DF}">
-                  <a14:hiddenLine xmlns="" xmlns:a14="http://schemas.microsoft.com/office/drawing/2010/main" w="9525">
+                <a:ext uri="{91240B29-F687-4F45-9708-019B960494DF}">
+                  <a14:hiddenLine xmlns:a14="http://schemas.microsoft.com/office/drawing/2010/main" w="9525">
                     <a:solidFill>
                       <a:srgbClr val="000000"/>
                     </a:solidFill>
@@ -10577,8 +10581,8 @@
                 <a:noFill/>
               </a:ln>
               <a:extLst>
-                <a:ext uri="{91240B29-F687-4f45-9708-019B960494DF}">
-                  <a14:hiddenLine xmlns="" xmlns:a14="http://schemas.microsoft.com/office/drawing/2010/main" w="9525">
+                <a:ext uri="{91240B29-F687-4F45-9708-019B960494DF}">
+                  <a14:hiddenLine xmlns:a14="http://schemas.microsoft.com/office/drawing/2010/main" w="9525">
                     <a:solidFill>
                       <a:srgbClr val="000000"/>
                     </a:solidFill>
@@ -10639,8 +10643,8 @@
                 <a:noFill/>
               </a:ln>
               <a:extLst>
-                <a:ext uri="{91240B29-F687-4f45-9708-019B960494DF}">
-                  <a14:hiddenLine xmlns="" xmlns:a14="http://schemas.microsoft.com/office/drawing/2010/main" w="9525">
+                <a:ext uri="{91240B29-F687-4F45-9708-019B960494DF}">
+                  <a14:hiddenLine xmlns:a14="http://schemas.microsoft.com/office/drawing/2010/main" w="9525">
                     <a:solidFill>
                       <a:srgbClr val="000000"/>
                     </a:solidFill>
@@ -10729,8 +10733,8 @@
                 <a:noFill/>
               </a:ln>
               <a:extLst>
-                <a:ext uri="{91240B29-F687-4f45-9708-019B960494DF}">
-                  <a14:hiddenLine xmlns="" xmlns:a14="http://schemas.microsoft.com/office/drawing/2010/main" w="9525">
+                <a:ext uri="{91240B29-F687-4F45-9708-019B960494DF}">
+                  <a14:hiddenLine xmlns:a14="http://schemas.microsoft.com/office/drawing/2010/main" w="9525">
                     <a:solidFill>
                       <a:srgbClr val="000000"/>
                     </a:solidFill>
@@ -10819,8 +10823,8 @@
                 <a:noFill/>
               </a:ln>
               <a:extLst>
-                <a:ext uri="{91240B29-F687-4f45-9708-019B960494DF}">
-                  <a14:hiddenLine xmlns="" xmlns:a14="http://schemas.microsoft.com/office/drawing/2010/main" w="9525">
+                <a:ext uri="{91240B29-F687-4F45-9708-019B960494DF}">
+                  <a14:hiddenLine xmlns:a14="http://schemas.microsoft.com/office/drawing/2010/main" w="9525">
                     <a:solidFill>
                       <a:srgbClr val="000000"/>
                     </a:solidFill>
@@ -10884,8 +10888,8 @@
                 <a:noFill/>
               </a:ln>
               <a:extLst>
-                <a:ext uri="{91240B29-F687-4f45-9708-019B960494DF}">
-                  <a14:hiddenLine xmlns="" xmlns:a14="http://schemas.microsoft.com/office/drawing/2010/main" w="9525">
+                <a:ext uri="{91240B29-F687-4F45-9708-019B960494DF}">
+                  <a14:hiddenLine xmlns:a14="http://schemas.microsoft.com/office/drawing/2010/main" w="9525">
                     <a:solidFill>
                       <a:srgbClr val="000000"/>
                     </a:solidFill>
@@ -11004,8 +11008,8 @@
                 <a:noFill/>
               </a:ln>
               <a:extLst>
-                <a:ext uri="{91240B29-F687-4f45-9708-019B960494DF}">
-                  <a14:hiddenLine xmlns="" xmlns:a14="http://schemas.microsoft.com/office/drawing/2010/main" w="9525">
+                <a:ext uri="{91240B29-F687-4F45-9708-019B960494DF}">
+                  <a14:hiddenLine xmlns:a14="http://schemas.microsoft.com/office/drawing/2010/main" w="9525">
                     <a:solidFill>
                       <a:srgbClr val="000000"/>
                     </a:solidFill>
@@ -11085,8 +11089,8 @@
                 <a:noFill/>
               </a:ln>
               <a:extLst>
-                <a:ext uri="{91240B29-F687-4f45-9708-019B960494DF}">
-                  <a14:hiddenLine xmlns="" xmlns:a14="http://schemas.microsoft.com/office/drawing/2010/main" w="9525">
+                <a:ext uri="{91240B29-F687-4F45-9708-019B960494DF}">
+                  <a14:hiddenLine xmlns:a14="http://schemas.microsoft.com/office/drawing/2010/main" w="9525">
                     <a:solidFill>
                       <a:srgbClr val="000000"/>
                     </a:solidFill>
@@ -11200,8 +11204,8 @@
                 <a:noFill/>
               </a:ln>
               <a:extLst>
-                <a:ext uri="{91240B29-F687-4f45-9708-019B960494DF}">
-                  <a14:hiddenLine xmlns="" xmlns:a14="http://schemas.microsoft.com/office/drawing/2010/main" w="9525">
+                <a:ext uri="{91240B29-F687-4F45-9708-019B960494DF}">
+                  <a14:hiddenLine xmlns:a14="http://schemas.microsoft.com/office/drawing/2010/main" w="9525">
                     <a:solidFill>
                       <a:srgbClr val="000000"/>
                     </a:solidFill>
@@ -11290,8 +11294,8 @@
                 <a:noFill/>
               </a:ln>
               <a:extLst>
-                <a:ext uri="{91240B29-F687-4f45-9708-019B960494DF}">
-                  <a14:hiddenLine xmlns="" xmlns:a14="http://schemas.microsoft.com/office/drawing/2010/main" w="9525">
+                <a:ext uri="{91240B29-F687-4F45-9708-019B960494DF}">
+                  <a14:hiddenLine xmlns:a14="http://schemas.microsoft.com/office/drawing/2010/main" w="9525">
                     <a:solidFill>
                       <a:srgbClr val="000000"/>
                     </a:solidFill>
@@ -11355,8 +11359,8 @@
                 <a:noFill/>
               </a:ln>
               <a:extLst>
-                <a:ext uri="{91240B29-F687-4f45-9708-019B960494DF}">
-                  <a14:hiddenLine xmlns="" xmlns:a14="http://schemas.microsoft.com/office/drawing/2010/main" w="9525">
+                <a:ext uri="{91240B29-F687-4F45-9708-019B960494DF}">
+                  <a14:hiddenLine xmlns:a14="http://schemas.microsoft.com/office/drawing/2010/main" w="9525">
                     <a:solidFill>
                       <a:srgbClr val="000000"/>
                     </a:solidFill>
@@ -11445,8 +11449,8 @@
                 <a:noFill/>
               </a:ln>
               <a:extLst>
-                <a:ext uri="{91240B29-F687-4f45-9708-019B960494DF}">
-                  <a14:hiddenLine xmlns="" xmlns:a14="http://schemas.microsoft.com/office/drawing/2010/main" w="9525">
+                <a:ext uri="{91240B29-F687-4F45-9708-019B960494DF}">
+                  <a14:hiddenLine xmlns:a14="http://schemas.microsoft.com/office/drawing/2010/main" w="9525">
                     <a:solidFill>
                       <a:srgbClr val="000000"/>
                     </a:solidFill>
@@ -11513,8 +11517,8 @@
                 <a:noFill/>
               </a:ln>
               <a:extLst>
-                <a:ext uri="{91240B29-F687-4f45-9708-019B960494DF}">
-                  <a14:hiddenLine xmlns="" xmlns:a14="http://schemas.microsoft.com/office/drawing/2010/main" w="9525">
+                <a:ext uri="{91240B29-F687-4F45-9708-019B960494DF}">
+                  <a14:hiddenLine xmlns:a14="http://schemas.microsoft.com/office/drawing/2010/main" w="9525">
                     <a:solidFill>
                       <a:srgbClr val="000000"/>
                     </a:solidFill>
@@ -11603,8 +11607,8 @@
                 <a:noFill/>
               </a:ln>
               <a:extLst>
-                <a:ext uri="{91240B29-F687-4f45-9708-019B960494DF}">
-                  <a14:hiddenLine xmlns="" xmlns:a14="http://schemas.microsoft.com/office/drawing/2010/main" w="9525">
+                <a:ext uri="{91240B29-F687-4F45-9708-019B960494DF}">
+                  <a14:hiddenLine xmlns:a14="http://schemas.microsoft.com/office/drawing/2010/main" w="9525">
                     <a:solidFill>
                       <a:srgbClr val="000000"/>
                     </a:solidFill>
@@ -11671,8 +11675,8 @@
                 <a:noFill/>
               </a:ln>
               <a:extLst>
-                <a:ext uri="{91240B29-F687-4f45-9708-019B960494DF}">
-                  <a14:hiddenLine xmlns="" xmlns:a14="http://schemas.microsoft.com/office/drawing/2010/main" w="9525">
+                <a:ext uri="{91240B29-F687-4F45-9708-019B960494DF}">
+                  <a14:hiddenLine xmlns:a14="http://schemas.microsoft.com/office/drawing/2010/main" w="9525">
                     <a:solidFill>
                       <a:srgbClr val="000000"/>
                     </a:solidFill>
@@ -11761,8 +11765,8 @@
                 <a:noFill/>
               </a:ln>
               <a:extLst>
-                <a:ext uri="{91240B29-F687-4f45-9708-019B960494DF}">
-                  <a14:hiddenLine xmlns="" xmlns:a14="http://schemas.microsoft.com/office/drawing/2010/main" w="9525">
+                <a:ext uri="{91240B29-F687-4F45-9708-019B960494DF}">
+                  <a14:hiddenLine xmlns:a14="http://schemas.microsoft.com/office/drawing/2010/main" w="9525">
                     <a:solidFill>
                       <a:srgbClr val="000000"/>
                     </a:solidFill>
@@ -11795,8 +11799,8 @@
                 <a:noFill/>
               </a:ln>
               <a:extLst>
-                <a:ext uri="{91240B29-F687-4f45-9708-019B960494DF}">
-                  <a14:hiddenLine xmlns="" xmlns:a14="http://schemas.microsoft.com/office/drawing/2010/main" w="9525">
+                <a:ext uri="{91240B29-F687-4F45-9708-019B960494DF}">
+                  <a14:hiddenLine xmlns:a14="http://schemas.microsoft.com/office/drawing/2010/main" w="9525">
                     <a:solidFill>
                       <a:srgbClr val="000000"/>
                     </a:solidFill>
@@ -11937,7 +11941,7 @@
             <a:fld id="{48A87A34-81AB-432B-8DAE-1953F412C126}" type="datetimeFigureOut">
               <a:rPr lang="en-US" dirty="0"/>
               <a:pPr/>
-              <a:t>1/8/2015</a:t>
+              <a:t>1/9/2015</a:t>
             </a:fld>
             <a:endParaRPr lang="en-US" dirty="0"/>
           </a:p>
@@ -12415,11 +12419,7 @@
           <a:p>
             <a:r>
               <a:rPr lang="en-US" dirty="0" smtClean="0"/>
-              <a:t>Ronaldo </a:t>
-            </a:r>
-            <a:r>
-              <a:rPr lang="en-US" dirty="0" err="1" smtClean="0"/>
-              <a:t>Shimpano</a:t>
+              <a:t>Ronald Shipman</a:t>
             </a:r>
             <a:endParaRPr lang="en-US" dirty="0"/>
           </a:p>
@@ -12472,6 +12472,344 @@
           <a:p>
             <a:r>
               <a:rPr lang="en-US" dirty="0" smtClean="0"/>
+              <a:t>Simulation and Verification</a:t>
+            </a:r>
+            <a:endParaRPr lang="en-US" dirty="0"/>
+          </a:p>
+        </p:txBody>
+      </p:sp>
+      <p:sp>
+        <p:nvSpPr>
+          <p:cNvPr id="3" name="Content Placeholder 2"/>
+          <p:cNvSpPr>
+            <a:spLocks noGrp="1"/>
+          </p:cNvSpPr>
+          <p:nvPr>
+            <p:ph idx="1"/>
+          </p:nvPr>
+        </p:nvSpPr>
+        <p:spPr/>
+        <p:txBody>
+          <a:bodyPr/>
+          <a:lstStyle/>
+          <a:p>
+            <a:endParaRPr lang="en-US"/>
+          </a:p>
+        </p:txBody>
+      </p:sp>
+    </p:spTree>
+    <p:extLst>
+      <p:ext uri="{BB962C8B-B14F-4D97-AF65-F5344CB8AC3E}">
+        <p14:creationId xmlns:p14="http://schemas.microsoft.com/office/powerpoint/2010/main" val="3978015491"/>
+      </p:ext>
+    </p:extLst>
+  </p:cSld>
+  <p:clrMapOvr>
+    <a:masterClrMapping/>
+  </p:clrMapOvr>
+</p:sld>
+</file>
+
+<file path=ppt/slides/slide11.xml><?xml version="1.0" encoding="utf-8"?>
+<p:sld xmlns:a="http://schemas.openxmlformats.org/drawingml/2006/main" xmlns:r="http://schemas.openxmlformats.org/officeDocument/2006/relationships" xmlns:p="http://schemas.openxmlformats.org/presentationml/2006/main">
+  <p:cSld>
+    <p:spTree>
+      <p:nvGrpSpPr>
+        <p:cNvPr id="1" name=""/>
+        <p:cNvGrpSpPr/>
+        <p:nvPr/>
+      </p:nvGrpSpPr>
+      <p:grpSpPr>
+        <a:xfrm>
+          <a:off x="0" y="0"/>
+          <a:ext cx="0" cy="0"/>
+          <a:chOff x="0" y="0"/>
+          <a:chExt cx="0" cy="0"/>
+        </a:xfrm>
+      </p:grpSpPr>
+      <p:sp>
+        <p:nvSpPr>
+          <p:cNvPr id="2" name="Title 1"/>
+          <p:cNvSpPr>
+            <a:spLocks noGrp="1"/>
+          </p:cNvSpPr>
+          <p:nvPr>
+            <p:ph type="title"/>
+          </p:nvPr>
+        </p:nvSpPr>
+        <p:spPr/>
+        <p:txBody>
+          <a:bodyPr/>
+          <a:lstStyle/>
+          <a:p>
+            <a:r>
+              <a:rPr lang="en-US" dirty="0" smtClean="0"/>
+              <a:t>Kinematic Modelling</a:t>
+            </a:r>
+            <a:endParaRPr lang="en-US" dirty="0"/>
+          </a:p>
+        </p:txBody>
+      </p:sp>
+      <p:sp>
+        <p:nvSpPr>
+          <p:cNvPr id="3" name="Content Placeholder 2"/>
+          <p:cNvSpPr>
+            <a:spLocks noGrp="1"/>
+          </p:cNvSpPr>
+          <p:nvPr>
+            <p:ph idx="1"/>
+          </p:nvPr>
+        </p:nvSpPr>
+        <p:spPr/>
+        <p:txBody>
+          <a:bodyPr/>
+          <a:lstStyle/>
+          <a:p>
+            <a:r>
+              <a:rPr lang="en-US" dirty="0"/>
+              <a:t>Homogenous Transformations</a:t>
+            </a:r>
+          </a:p>
+          <a:p>
+            <a:r>
+              <a:rPr lang="en-US" dirty="0"/>
+              <a:t>Determines cylinder stroke</a:t>
+            </a:r>
+          </a:p>
+          <a:p>
+            <a:pPr marL="0" indent="0">
+              <a:buNone/>
+            </a:pPr>
+            <a:endParaRPr lang="en-US" dirty="0"/>
+          </a:p>
+        </p:txBody>
+      </p:sp>
+    </p:spTree>
+    <p:extLst>
+      <p:ext uri="{BB962C8B-B14F-4D97-AF65-F5344CB8AC3E}">
+        <p14:creationId xmlns:p14="http://schemas.microsoft.com/office/powerpoint/2010/main" val="156962544"/>
+      </p:ext>
+    </p:extLst>
+  </p:cSld>
+  <p:clrMapOvr>
+    <a:masterClrMapping/>
+  </p:clrMapOvr>
+</p:sld>
+</file>
+
+<file path=ppt/slides/slide12.xml><?xml version="1.0" encoding="utf-8"?>
+<p:sld xmlns:a="http://schemas.openxmlformats.org/drawingml/2006/main" xmlns:r="http://schemas.openxmlformats.org/officeDocument/2006/relationships" xmlns:p="http://schemas.openxmlformats.org/presentationml/2006/main">
+  <p:cSld>
+    <p:spTree>
+      <p:nvGrpSpPr>
+        <p:cNvPr id="1" name=""/>
+        <p:cNvGrpSpPr/>
+        <p:nvPr/>
+      </p:nvGrpSpPr>
+      <p:grpSpPr>
+        <a:xfrm>
+          <a:off x="0" y="0"/>
+          <a:ext cx="0" cy="0"/>
+          <a:chOff x="0" y="0"/>
+          <a:chExt cx="0" cy="0"/>
+        </a:xfrm>
+      </p:grpSpPr>
+      <p:sp>
+        <p:nvSpPr>
+          <p:cNvPr id="2" name="Title 1"/>
+          <p:cNvSpPr>
+            <a:spLocks noGrp="1"/>
+          </p:cNvSpPr>
+          <p:nvPr>
+            <p:ph type="title"/>
+          </p:nvPr>
+        </p:nvSpPr>
+        <p:spPr/>
+        <p:txBody>
+          <a:bodyPr/>
+          <a:lstStyle/>
+          <a:p>
+            <a:r>
+              <a:rPr lang="en-US" dirty="0"/>
+              <a:t>Dynamic Model</a:t>
+            </a:r>
+          </a:p>
+        </p:txBody>
+      </p:sp>
+      <p:sp>
+        <p:nvSpPr>
+          <p:cNvPr id="3" name="Content Placeholder 2"/>
+          <p:cNvSpPr>
+            <a:spLocks noGrp="1"/>
+          </p:cNvSpPr>
+          <p:nvPr>
+            <p:ph idx="1"/>
+          </p:nvPr>
+        </p:nvSpPr>
+        <p:spPr/>
+        <p:txBody>
+          <a:bodyPr/>
+          <a:lstStyle/>
+          <a:p>
+            <a:r>
+              <a:rPr lang="en-US" dirty="0" err="1"/>
+              <a:t>Lagrangian</a:t>
+            </a:r>
+            <a:r>
+              <a:rPr lang="en-US" dirty="0"/>
+              <a:t> Mechanics</a:t>
+            </a:r>
+          </a:p>
+          <a:p>
+            <a:r>
+              <a:rPr lang="en-US" dirty="0"/>
+              <a:t>Non-inertial reference frames</a:t>
+            </a:r>
+          </a:p>
+          <a:p>
+            <a:r>
+              <a:rPr lang="en-US" dirty="0"/>
+              <a:t>Arbitrary grounded reference frame</a:t>
+            </a:r>
+          </a:p>
+          <a:p>
+            <a:r>
+              <a:rPr lang="en-US" dirty="0"/>
+              <a:t>Determines mechanical properties of </a:t>
+            </a:r>
+            <a:r>
+              <a:rPr lang="en-US" dirty="0" smtClean="0"/>
+              <a:t>components</a:t>
+            </a:r>
+          </a:p>
+          <a:p>
+            <a:r>
+              <a:rPr lang="en-US" smtClean="0"/>
+              <a:t>27 Equations</a:t>
+            </a:r>
+            <a:endParaRPr lang="en-US"/>
+          </a:p>
+        </p:txBody>
+      </p:sp>
+    </p:spTree>
+    <p:extLst>
+      <p:ext uri="{BB962C8B-B14F-4D97-AF65-F5344CB8AC3E}">
+        <p14:creationId xmlns:p14="http://schemas.microsoft.com/office/powerpoint/2010/main" val="18980793"/>
+      </p:ext>
+    </p:extLst>
+  </p:cSld>
+  <p:clrMapOvr>
+    <a:masterClrMapping/>
+  </p:clrMapOvr>
+</p:sld>
+</file>
+
+<file path=ppt/slides/slide13.xml><?xml version="1.0" encoding="utf-8"?>
+<p:sld xmlns:a="http://schemas.openxmlformats.org/drawingml/2006/main" xmlns:r="http://schemas.openxmlformats.org/officeDocument/2006/relationships" xmlns:p="http://schemas.openxmlformats.org/presentationml/2006/main">
+  <p:cSld>
+    <p:spTree>
+      <p:nvGrpSpPr>
+        <p:cNvPr id="1" name=""/>
+        <p:cNvGrpSpPr/>
+        <p:nvPr/>
+      </p:nvGrpSpPr>
+      <p:grpSpPr>
+        <a:xfrm>
+          <a:off x="0" y="0"/>
+          <a:ext cx="0" cy="0"/>
+          <a:chOff x="0" y="0"/>
+          <a:chExt cx="0" cy="0"/>
+        </a:xfrm>
+      </p:grpSpPr>
+      <p:sp>
+        <p:nvSpPr>
+          <p:cNvPr id="2" name="Title 1"/>
+          <p:cNvSpPr>
+            <a:spLocks noGrp="1"/>
+          </p:cNvSpPr>
+          <p:nvPr>
+            <p:ph type="title"/>
+          </p:nvPr>
+        </p:nvSpPr>
+        <p:spPr/>
+        <p:txBody>
+          <a:bodyPr/>
+          <a:lstStyle/>
+          <a:p>
+            <a:r>
+              <a:rPr lang="en-US" dirty="0" smtClean="0"/>
+              <a:t>Control architecture and electronics</a:t>
+            </a:r>
+            <a:endParaRPr lang="en-US" dirty="0"/>
+          </a:p>
+        </p:txBody>
+      </p:sp>
+      <p:sp>
+        <p:nvSpPr>
+          <p:cNvPr id="3" name="Content Placeholder 2"/>
+          <p:cNvSpPr>
+            <a:spLocks noGrp="1"/>
+          </p:cNvSpPr>
+          <p:nvPr>
+            <p:ph idx="1"/>
+          </p:nvPr>
+        </p:nvSpPr>
+        <p:spPr/>
+        <p:txBody>
+          <a:bodyPr/>
+          <a:lstStyle/>
+          <a:p>
+            <a:endParaRPr lang="en-US"/>
+          </a:p>
+        </p:txBody>
+      </p:sp>
+    </p:spTree>
+    <p:extLst>
+      <p:ext uri="{BB962C8B-B14F-4D97-AF65-F5344CB8AC3E}">
+        <p14:creationId xmlns:p14="http://schemas.microsoft.com/office/powerpoint/2010/main" val="3700963556"/>
+      </p:ext>
+    </p:extLst>
+  </p:cSld>
+  <p:clrMapOvr>
+    <a:masterClrMapping/>
+  </p:clrMapOvr>
+</p:sld>
+</file>
+
+<file path=ppt/slides/slide14.xml><?xml version="1.0" encoding="utf-8"?>
+<p:sld xmlns:a="http://schemas.openxmlformats.org/drawingml/2006/main" xmlns:r="http://schemas.openxmlformats.org/officeDocument/2006/relationships" xmlns:p="http://schemas.openxmlformats.org/presentationml/2006/main">
+  <p:cSld>
+    <p:spTree>
+      <p:nvGrpSpPr>
+        <p:cNvPr id="1" name=""/>
+        <p:cNvGrpSpPr/>
+        <p:nvPr/>
+      </p:nvGrpSpPr>
+      <p:grpSpPr>
+        <a:xfrm>
+          <a:off x="0" y="0"/>
+          <a:ext cx="0" cy="0"/>
+          <a:chOff x="0" y="0"/>
+          <a:chExt cx="0" cy="0"/>
+        </a:xfrm>
+      </p:grpSpPr>
+      <p:sp>
+        <p:nvSpPr>
+          <p:cNvPr id="2" name="Title 1"/>
+          <p:cNvSpPr>
+            <a:spLocks noGrp="1"/>
+          </p:cNvSpPr>
+          <p:nvPr>
+            <p:ph type="title"/>
+          </p:nvPr>
+        </p:nvSpPr>
+        <p:spPr/>
+        <p:txBody>
+          <a:bodyPr/>
+          <a:lstStyle/>
+          <a:p>
+            <a:r>
+              <a:rPr lang="en-US" dirty="0" smtClean="0"/>
               <a:t>Questions?</a:t>
             </a:r>
             <a:endParaRPr lang="en-US" dirty="0"/>
@@ -12920,42 +13258,997 @@
             <p:ph type="title"/>
           </p:nvPr>
         </p:nvSpPr>
-        <p:spPr/>
+        <p:spPr>
+          <a:xfrm>
+            <a:off x="923498" y="152400"/>
+            <a:ext cx="10972800" cy="990600"/>
+          </a:xfrm>
+        </p:spPr>
         <p:txBody>
           <a:bodyPr/>
           <a:lstStyle/>
           <a:p>
             <a:r>
               <a:rPr lang="en-US" dirty="0" smtClean="0"/>
-              <a:t>Simulation and Verification</a:t>
+              <a:t>Power Source Options</a:t>
             </a:r>
             <a:endParaRPr lang="en-US" dirty="0"/>
           </a:p>
         </p:txBody>
       </p:sp>
-      <p:sp>
-        <p:nvSpPr>
-          <p:cNvPr id="3" name="Content Placeholder 2"/>
-          <p:cNvSpPr>
-            <a:spLocks noGrp="1"/>
-          </p:cNvSpPr>
+      <p:graphicFrame>
+        <p:nvGraphicFramePr>
+          <p:cNvPr id="5" name="Content Placeholder 4"/>
+          <p:cNvGraphicFramePr>
+            <a:graphicFrameLocks noGrp="1"/>
+          </p:cNvGraphicFramePr>
           <p:nvPr>
             <p:ph idx="1"/>
+            <p:extLst>
+              <p:ext uri="{D42A27DB-BD31-4B8C-83A1-F6EECF244321}">
+                <p14:modId xmlns:p14="http://schemas.microsoft.com/office/powerpoint/2010/main" val="2171599680"/>
+              </p:ext>
+            </p:extLst>
           </p:nvPr>
-        </p:nvSpPr>
-        <p:spPr/>
-        <p:txBody>
-          <a:bodyPr/>
-          <a:lstStyle/>
-          <a:p>
-            <a:endParaRPr lang="en-US"/>
-          </a:p>
-        </p:txBody>
-      </p:sp>
+        </p:nvGraphicFramePr>
+        <p:xfrm>
+          <a:off x="723331" y="1143000"/>
+          <a:ext cx="10863618" cy="5403341"/>
+        </p:xfrm>
+        <a:graphic>
+          <a:graphicData uri="http://schemas.openxmlformats.org/drawingml/2006/table">
+            <a:tbl>
+              <a:tblPr firstRow="1" firstCol="1" bandRow="1"/>
+              <a:tblGrid>
+                <a:gridCol w="2374389"/>
+                <a:gridCol w="4248655"/>
+                <a:gridCol w="4240574"/>
+              </a:tblGrid>
+              <a:tr h="638174">
+                <a:tc>
+                  <a:txBody>
+                    <a:bodyPr/>
+                    <a:lstStyle/>
+                    <a:p>
+                      <a:pPr marL="0" marR="0">
+                        <a:lnSpc>
+                          <a:spcPct val="115000"/>
+                        </a:lnSpc>
+                        <a:spcBef>
+                          <a:spcPts val="0"/>
+                        </a:spcBef>
+                        <a:spcAft>
+                          <a:spcPts val="0"/>
+                        </a:spcAft>
+                      </a:pPr>
+                      <a:endParaRPr lang="en-US" sz="2400" b="1" dirty="0">
+                        <a:effectLst/>
+                        <a:latin typeface="Calibri"/>
+                        <a:ea typeface="Calibri"/>
+                        <a:cs typeface="Arial"/>
+                      </a:endParaRPr>
+                    </a:p>
+                  </a:txBody>
+                  <a:tcPr marT="0" marB="0">
+                    <a:lnL w="12700" cap="flat" cmpd="sng" algn="ctr">
+                      <a:solidFill>
+                        <a:srgbClr val="000000"/>
+                      </a:solidFill>
+                      <a:prstDash val="solid"/>
+                      <a:round/>
+                      <a:headEnd type="none" w="med" len="med"/>
+                      <a:tailEnd type="none" w="med" len="med"/>
+                    </a:lnL>
+                    <a:lnR w="12700" cap="flat" cmpd="sng" algn="ctr">
+                      <a:solidFill>
+                        <a:srgbClr val="000000"/>
+                      </a:solidFill>
+                      <a:prstDash val="solid"/>
+                      <a:round/>
+                      <a:headEnd type="none" w="med" len="med"/>
+                      <a:tailEnd type="none" w="med" len="med"/>
+                    </a:lnR>
+                    <a:lnT w="12700" cap="flat" cmpd="sng" algn="ctr">
+                      <a:solidFill>
+                        <a:srgbClr val="000000"/>
+                      </a:solidFill>
+                      <a:prstDash val="solid"/>
+                      <a:round/>
+                      <a:headEnd type="none" w="med" len="med"/>
+                      <a:tailEnd type="none" w="med" len="med"/>
+                    </a:lnT>
+                    <a:lnB w="12700" cap="flat" cmpd="sng" algn="ctr">
+                      <a:solidFill>
+                        <a:srgbClr val="000000"/>
+                      </a:solidFill>
+                      <a:prstDash val="solid"/>
+                      <a:round/>
+                      <a:headEnd type="none" w="med" len="med"/>
+                      <a:tailEnd type="none" w="med" len="med"/>
+                    </a:lnB>
+                  </a:tcPr>
+                </a:tc>
+                <a:tc>
+                  <a:txBody>
+                    <a:bodyPr/>
+                    <a:lstStyle/>
+                    <a:p>
+                      <a:pPr marL="0" marR="0">
+                        <a:lnSpc>
+                          <a:spcPct val="115000"/>
+                        </a:lnSpc>
+                        <a:spcBef>
+                          <a:spcPts val="0"/>
+                        </a:spcBef>
+                        <a:spcAft>
+                          <a:spcPts val="0"/>
+                        </a:spcAft>
+                      </a:pPr>
+                      <a:r>
+                        <a:rPr lang="en-US" sz="2400" b="1" dirty="0" smtClean="0">
+                          <a:effectLst/>
+                          <a:latin typeface="Calibri"/>
+                          <a:ea typeface="Calibri"/>
+                          <a:cs typeface="Arial"/>
+                        </a:rPr>
+                        <a:t>Advantages</a:t>
+                      </a:r>
+                      <a:endParaRPr lang="en-US" sz="2400" b="1" dirty="0">
+                        <a:effectLst/>
+                        <a:latin typeface="Calibri"/>
+                        <a:ea typeface="Calibri"/>
+                        <a:cs typeface="Arial"/>
+                      </a:endParaRPr>
+                    </a:p>
+                  </a:txBody>
+                  <a:tcPr marT="0" marB="0">
+                    <a:lnL w="12700" cap="flat" cmpd="sng" algn="ctr">
+                      <a:solidFill>
+                        <a:srgbClr val="000000"/>
+                      </a:solidFill>
+                      <a:prstDash val="solid"/>
+                      <a:round/>
+                      <a:headEnd type="none" w="med" len="med"/>
+                      <a:tailEnd type="none" w="med" len="med"/>
+                    </a:lnL>
+                    <a:lnR w="12700" cap="flat" cmpd="sng" algn="ctr">
+                      <a:solidFill>
+                        <a:srgbClr val="000000"/>
+                      </a:solidFill>
+                      <a:prstDash val="solid"/>
+                      <a:round/>
+                      <a:headEnd type="none" w="med" len="med"/>
+                      <a:tailEnd type="none" w="med" len="med"/>
+                    </a:lnR>
+                    <a:lnT w="12700" cap="flat" cmpd="sng" algn="ctr">
+                      <a:solidFill>
+                        <a:srgbClr val="000000"/>
+                      </a:solidFill>
+                      <a:prstDash val="solid"/>
+                      <a:round/>
+                      <a:headEnd type="none" w="med" len="med"/>
+                      <a:tailEnd type="none" w="med" len="med"/>
+                    </a:lnT>
+                    <a:lnB w="12700" cap="flat" cmpd="sng" algn="ctr">
+                      <a:solidFill>
+                        <a:srgbClr val="000000"/>
+                      </a:solidFill>
+                      <a:prstDash val="solid"/>
+                      <a:round/>
+                      <a:headEnd type="none" w="med" len="med"/>
+                      <a:tailEnd type="none" w="med" len="med"/>
+                    </a:lnB>
+                  </a:tcPr>
+                </a:tc>
+                <a:tc>
+                  <a:txBody>
+                    <a:bodyPr/>
+                    <a:lstStyle/>
+                    <a:p>
+                      <a:pPr marL="0" marR="0">
+                        <a:lnSpc>
+                          <a:spcPct val="115000"/>
+                        </a:lnSpc>
+                        <a:spcBef>
+                          <a:spcPts val="0"/>
+                        </a:spcBef>
+                        <a:spcAft>
+                          <a:spcPts val="0"/>
+                        </a:spcAft>
+                      </a:pPr>
+                      <a:r>
+                        <a:rPr lang="en-US" sz="2400" b="1" dirty="0" smtClean="0">
+                          <a:effectLst/>
+                          <a:latin typeface="Calibri"/>
+                          <a:ea typeface="Calibri"/>
+                          <a:cs typeface="Arial"/>
+                        </a:rPr>
+                        <a:t>Disadvantages</a:t>
+                      </a:r>
+                      <a:endParaRPr lang="en-US" sz="2400" b="1" dirty="0">
+                        <a:effectLst/>
+                        <a:latin typeface="Calibri"/>
+                        <a:ea typeface="Calibri"/>
+                        <a:cs typeface="Arial"/>
+                      </a:endParaRPr>
+                    </a:p>
+                  </a:txBody>
+                  <a:tcPr marT="0" marB="0">
+                    <a:lnL w="12700" cap="flat" cmpd="sng" algn="ctr">
+                      <a:solidFill>
+                        <a:srgbClr val="000000"/>
+                      </a:solidFill>
+                      <a:prstDash val="solid"/>
+                      <a:round/>
+                      <a:headEnd type="none" w="med" len="med"/>
+                      <a:tailEnd type="none" w="med" len="med"/>
+                    </a:lnL>
+                    <a:lnR w="12700" cap="flat" cmpd="sng" algn="ctr">
+                      <a:solidFill>
+                        <a:srgbClr val="000000"/>
+                      </a:solidFill>
+                      <a:prstDash val="solid"/>
+                      <a:round/>
+                      <a:headEnd type="none" w="med" len="med"/>
+                      <a:tailEnd type="none" w="med" len="med"/>
+                    </a:lnR>
+                    <a:lnT w="12700" cap="flat" cmpd="sng" algn="ctr">
+                      <a:solidFill>
+                        <a:srgbClr val="000000"/>
+                      </a:solidFill>
+                      <a:prstDash val="solid"/>
+                      <a:round/>
+                      <a:headEnd type="none" w="med" len="med"/>
+                      <a:tailEnd type="none" w="med" len="med"/>
+                    </a:lnT>
+                    <a:lnB w="12700" cap="flat" cmpd="sng" algn="ctr">
+                      <a:solidFill>
+                        <a:srgbClr val="000000"/>
+                      </a:solidFill>
+                      <a:prstDash val="solid"/>
+                      <a:round/>
+                      <a:headEnd type="none" w="med" len="med"/>
+                      <a:tailEnd type="none" w="med" len="med"/>
+                    </a:lnB>
+                  </a:tcPr>
+                </a:tc>
+              </a:tr>
+              <a:tr h="1400175">
+                <a:tc>
+                  <a:txBody>
+                    <a:bodyPr/>
+                    <a:lstStyle/>
+                    <a:p>
+                      <a:pPr marL="0" marR="0">
+                        <a:lnSpc>
+                          <a:spcPct val="115000"/>
+                        </a:lnSpc>
+                        <a:spcBef>
+                          <a:spcPts val="0"/>
+                        </a:spcBef>
+                        <a:spcAft>
+                          <a:spcPts val="0"/>
+                        </a:spcAft>
+                      </a:pPr>
+                      <a:r>
+                        <a:rPr lang="en-US" sz="2400" b="1" dirty="0">
+                          <a:effectLst/>
+                          <a:latin typeface="Calibri"/>
+                          <a:ea typeface="Calibri"/>
+                          <a:cs typeface="Arial"/>
+                        </a:rPr>
+                        <a:t>Hydraulic Power Source</a:t>
+                      </a:r>
+                      <a:endParaRPr lang="en-US" sz="2400" dirty="0">
+                        <a:effectLst/>
+                        <a:latin typeface="Calibri"/>
+                        <a:ea typeface="Calibri"/>
+                        <a:cs typeface="Arial"/>
+                      </a:endParaRPr>
+                    </a:p>
+                  </a:txBody>
+                  <a:tcPr marT="0" marB="0">
+                    <a:lnL w="12700" cap="flat" cmpd="sng" algn="ctr">
+                      <a:solidFill>
+                        <a:srgbClr val="000000"/>
+                      </a:solidFill>
+                      <a:prstDash val="solid"/>
+                      <a:round/>
+                      <a:headEnd type="none" w="med" len="med"/>
+                      <a:tailEnd type="none" w="med" len="med"/>
+                    </a:lnL>
+                    <a:lnR w="12700" cap="flat" cmpd="sng" algn="ctr">
+                      <a:solidFill>
+                        <a:srgbClr val="000000"/>
+                      </a:solidFill>
+                      <a:prstDash val="solid"/>
+                      <a:round/>
+                      <a:headEnd type="none" w="med" len="med"/>
+                      <a:tailEnd type="none" w="med" len="med"/>
+                    </a:lnR>
+                    <a:lnT w="12700" cap="flat" cmpd="sng" algn="ctr">
+                      <a:solidFill>
+                        <a:srgbClr val="000000"/>
+                      </a:solidFill>
+                      <a:prstDash val="solid"/>
+                      <a:round/>
+                      <a:headEnd type="none" w="med" len="med"/>
+                      <a:tailEnd type="none" w="med" len="med"/>
+                    </a:lnT>
+                    <a:lnB w="12700" cap="flat" cmpd="sng" algn="ctr">
+                      <a:solidFill>
+                        <a:srgbClr val="000000"/>
+                      </a:solidFill>
+                      <a:prstDash val="solid"/>
+                      <a:round/>
+                      <a:headEnd type="none" w="med" len="med"/>
+                      <a:tailEnd type="none" w="med" len="med"/>
+                    </a:lnB>
+                  </a:tcPr>
+                </a:tc>
+                <a:tc>
+                  <a:txBody>
+                    <a:bodyPr/>
+                    <a:lstStyle/>
+                    <a:p>
+                      <a:pPr marL="0" marR="0">
+                        <a:lnSpc>
+                          <a:spcPct val="115000"/>
+                        </a:lnSpc>
+                        <a:spcBef>
+                          <a:spcPts val="0"/>
+                        </a:spcBef>
+                        <a:spcAft>
+                          <a:spcPts val="0"/>
+                        </a:spcAft>
+                      </a:pPr>
+                      <a:r>
+                        <a:rPr lang="en-US" sz="2400">
+                          <a:effectLst/>
+                          <a:latin typeface="Calibri"/>
+                          <a:ea typeface="Calibri"/>
+                          <a:cs typeface="Arial"/>
+                        </a:rPr>
+                        <a:t>-Highest achievable power density</a:t>
+                      </a:r>
+                    </a:p>
+                  </a:txBody>
+                  <a:tcPr marT="0" marB="0">
+                    <a:lnL w="12700" cap="flat" cmpd="sng" algn="ctr">
+                      <a:solidFill>
+                        <a:srgbClr val="000000"/>
+                      </a:solidFill>
+                      <a:prstDash val="solid"/>
+                      <a:round/>
+                      <a:headEnd type="none" w="med" len="med"/>
+                      <a:tailEnd type="none" w="med" len="med"/>
+                    </a:lnL>
+                    <a:lnR w="12700" cap="flat" cmpd="sng" algn="ctr">
+                      <a:solidFill>
+                        <a:srgbClr val="000000"/>
+                      </a:solidFill>
+                      <a:prstDash val="solid"/>
+                      <a:round/>
+                      <a:headEnd type="none" w="med" len="med"/>
+                      <a:tailEnd type="none" w="med" len="med"/>
+                    </a:lnR>
+                    <a:lnT w="12700" cap="flat" cmpd="sng" algn="ctr">
+                      <a:solidFill>
+                        <a:srgbClr val="000000"/>
+                      </a:solidFill>
+                      <a:prstDash val="solid"/>
+                      <a:round/>
+                      <a:headEnd type="none" w="med" len="med"/>
+                      <a:tailEnd type="none" w="med" len="med"/>
+                    </a:lnT>
+                    <a:lnB w="12700" cap="flat" cmpd="sng" algn="ctr">
+                      <a:solidFill>
+                        <a:srgbClr val="000000"/>
+                      </a:solidFill>
+                      <a:prstDash val="solid"/>
+                      <a:round/>
+                      <a:headEnd type="none" w="med" len="med"/>
+                      <a:tailEnd type="none" w="med" len="med"/>
+                    </a:lnB>
+                  </a:tcPr>
+                </a:tc>
+                <a:tc>
+                  <a:txBody>
+                    <a:bodyPr/>
+                    <a:lstStyle/>
+                    <a:p>
+                      <a:pPr marL="0" marR="0">
+                        <a:lnSpc>
+                          <a:spcPct val="115000"/>
+                        </a:lnSpc>
+                        <a:spcBef>
+                          <a:spcPts val="0"/>
+                        </a:spcBef>
+                        <a:spcAft>
+                          <a:spcPts val="0"/>
+                        </a:spcAft>
+                      </a:pPr>
+                      <a:r>
+                        <a:rPr lang="en-US" sz="2400" dirty="0">
+                          <a:effectLst/>
+                          <a:latin typeface="Calibri"/>
+                          <a:ea typeface="Calibri"/>
+                          <a:cs typeface="Arial"/>
+                        </a:rPr>
+                        <a:t>-High maintenance</a:t>
+                      </a:r>
+                    </a:p>
+                    <a:p>
+                      <a:pPr marL="0" marR="0">
+                        <a:lnSpc>
+                          <a:spcPct val="115000"/>
+                        </a:lnSpc>
+                        <a:spcBef>
+                          <a:spcPts val="0"/>
+                        </a:spcBef>
+                        <a:spcAft>
+                          <a:spcPts val="0"/>
+                        </a:spcAft>
+                      </a:pPr>
+                      <a:r>
+                        <a:rPr lang="en-US" sz="2400" dirty="0">
+                          <a:effectLst/>
+                          <a:latin typeface="Calibri"/>
+                          <a:ea typeface="Calibri"/>
+                          <a:cs typeface="Arial"/>
+                        </a:rPr>
+                        <a:t>-Heavy</a:t>
+                      </a:r>
+                    </a:p>
+                    <a:p>
+                      <a:pPr marL="0" marR="0">
+                        <a:lnSpc>
+                          <a:spcPct val="115000"/>
+                        </a:lnSpc>
+                        <a:spcBef>
+                          <a:spcPts val="0"/>
+                        </a:spcBef>
+                        <a:spcAft>
+                          <a:spcPts val="0"/>
+                        </a:spcAft>
+                      </a:pPr>
+                      <a:r>
+                        <a:rPr lang="en-US" sz="2400" dirty="0">
+                          <a:effectLst/>
+                          <a:latin typeface="Calibri"/>
+                          <a:ea typeface="Calibri"/>
+                          <a:cs typeface="Arial"/>
+                        </a:rPr>
+                        <a:t>-Dirty</a:t>
+                      </a:r>
+                    </a:p>
+                  </a:txBody>
+                  <a:tcPr marT="0" marB="0">
+                    <a:lnL w="12700" cap="flat" cmpd="sng" algn="ctr">
+                      <a:solidFill>
+                        <a:srgbClr val="000000"/>
+                      </a:solidFill>
+                      <a:prstDash val="solid"/>
+                      <a:round/>
+                      <a:headEnd type="none" w="med" len="med"/>
+                      <a:tailEnd type="none" w="med" len="med"/>
+                    </a:lnL>
+                    <a:lnR w="12700" cap="flat" cmpd="sng" algn="ctr">
+                      <a:solidFill>
+                        <a:srgbClr val="000000"/>
+                      </a:solidFill>
+                      <a:prstDash val="solid"/>
+                      <a:round/>
+                      <a:headEnd type="none" w="med" len="med"/>
+                      <a:tailEnd type="none" w="med" len="med"/>
+                    </a:lnR>
+                    <a:lnT w="12700" cap="flat" cmpd="sng" algn="ctr">
+                      <a:solidFill>
+                        <a:srgbClr val="000000"/>
+                      </a:solidFill>
+                      <a:prstDash val="solid"/>
+                      <a:round/>
+                      <a:headEnd type="none" w="med" len="med"/>
+                      <a:tailEnd type="none" w="med" len="med"/>
+                    </a:lnT>
+                    <a:lnB w="12700" cap="flat" cmpd="sng" algn="ctr">
+                      <a:solidFill>
+                        <a:srgbClr val="000000"/>
+                      </a:solidFill>
+                      <a:prstDash val="solid"/>
+                      <a:round/>
+                      <a:headEnd type="none" w="med" len="med"/>
+                      <a:tailEnd type="none" w="med" len="med"/>
+                    </a:lnB>
+                  </a:tcPr>
+                </a:tc>
+              </a:tr>
+              <a:tr h="933450">
+                <a:tc>
+                  <a:txBody>
+                    <a:bodyPr/>
+                    <a:lstStyle/>
+                    <a:p>
+                      <a:pPr marL="0" marR="0">
+                        <a:lnSpc>
+                          <a:spcPct val="115000"/>
+                        </a:lnSpc>
+                        <a:spcBef>
+                          <a:spcPts val="0"/>
+                        </a:spcBef>
+                        <a:spcAft>
+                          <a:spcPts val="0"/>
+                        </a:spcAft>
+                      </a:pPr>
+                      <a:r>
+                        <a:rPr lang="en-US" sz="2400" b="1">
+                          <a:effectLst/>
+                          <a:latin typeface="Calibri"/>
+                          <a:ea typeface="Calibri"/>
+                          <a:cs typeface="Arial"/>
+                        </a:rPr>
+                        <a:t>Electric Power Source</a:t>
+                      </a:r>
+                      <a:endParaRPr lang="en-US" sz="2400">
+                        <a:effectLst/>
+                        <a:latin typeface="Calibri"/>
+                        <a:ea typeface="Calibri"/>
+                        <a:cs typeface="Arial"/>
+                      </a:endParaRPr>
+                    </a:p>
+                  </a:txBody>
+                  <a:tcPr marT="0" marB="0">
+                    <a:lnL w="12700" cap="flat" cmpd="sng" algn="ctr">
+                      <a:solidFill>
+                        <a:srgbClr val="000000"/>
+                      </a:solidFill>
+                      <a:prstDash val="solid"/>
+                      <a:round/>
+                      <a:headEnd type="none" w="med" len="med"/>
+                      <a:tailEnd type="none" w="med" len="med"/>
+                    </a:lnL>
+                    <a:lnR w="12700" cap="flat" cmpd="sng" algn="ctr">
+                      <a:solidFill>
+                        <a:srgbClr val="000000"/>
+                      </a:solidFill>
+                      <a:prstDash val="solid"/>
+                      <a:round/>
+                      <a:headEnd type="none" w="med" len="med"/>
+                      <a:tailEnd type="none" w="med" len="med"/>
+                    </a:lnR>
+                    <a:lnT w="12700" cap="flat" cmpd="sng" algn="ctr">
+                      <a:solidFill>
+                        <a:srgbClr val="000000"/>
+                      </a:solidFill>
+                      <a:prstDash val="solid"/>
+                      <a:round/>
+                      <a:headEnd type="none" w="med" len="med"/>
+                      <a:tailEnd type="none" w="med" len="med"/>
+                    </a:lnT>
+                    <a:lnB w="12700" cap="flat" cmpd="sng" algn="ctr">
+                      <a:solidFill>
+                        <a:srgbClr val="000000"/>
+                      </a:solidFill>
+                      <a:prstDash val="solid"/>
+                      <a:round/>
+                      <a:headEnd type="none" w="med" len="med"/>
+                      <a:tailEnd type="none" w="med" len="med"/>
+                    </a:lnB>
+                  </a:tcPr>
+                </a:tc>
+                <a:tc>
+                  <a:txBody>
+                    <a:bodyPr/>
+                    <a:lstStyle/>
+                    <a:p>
+                      <a:pPr marL="0" marR="0">
+                        <a:lnSpc>
+                          <a:spcPct val="115000"/>
+                        </a:lnSpc>
+                        <a:spcBef>
+                          <a:spcPts val="0"/>
+                        </a:spcBef>
+                        <a:spcAft>
+                          <a:spcPts val="0"/>
+                        </a:spcAft>
+                      </a:pPr>
+                      <a:r>
+                        <a:rPr lang="en-US" sz="2400" dirty="0">
+                          <a:effectLst/>
+                          <a:latin typeface="Calibri"/>
+                          <a:ea typeface="Calibri"/>
+                          <a:cs typeface="Arial"/>
+                        </a:rPr>
+                        <a:t>-Accurate positioning</a:t>
+                      </a:r>
+                    </a:p>
+                  </a:txBody>
+                  <a:tcPr marT="0" marB="0">
+                    <a:lnL w="12700" cap="flat" cmpd="sng" algn="ctr">
+                      <a:solidFill>
+                        <a:srgbClr val="000000"/>
+                      </a:solidFill>
+                      <a:prstDash val="solid"/>
+                      <a:round/>
+                      <a:headEnd type="none" w="med" len="med"/>
+                      <a:tailEnd type="none" w="med" len="med"/>
+                    </a:lnL>
+                    <a:lnR w="12700" cap="flat" cmpd="sng" algn="ctr">
+                      <a:solidFill>
+                        <a:srgbClr val="000000"/>
+                      </a:solidFill>
+                      <a:prstDash val="solid"/>
+                      <a:round/>
+                      <a:headEnd type="none" w="med" len="med"/>
+                      <a:tailEnd type="none" w="med" len="med"/>
+                    </a:lnR>
+                    <a:lnT w="12700" cap="flat" cmpd="sng" algn="ctr">
+                      <a:solidFill>
+                        <a:srgbClr val="000000"/>
+                      </a:solidFill>
+                      <a:prstDash val="solid"/>
+                      <a:round/>
+                      <a:headEnd type="none" w="med" len="med"/>
+                      <a:tailEnd type="none" w="med" len="med"/>
+                    </a:lnT>
+                    <a:lnB w="12700" cap="flat" cmpd="sng" algn="ctr">
+                      <a:solidFill>
+                        <a:srgbClr val="000000"/>
+                      </a:solidFill>
+                      <a:prstDash val="solid"/>
+                      <a:round/>
+                      <a:headEnd type="none" w="med" len="med"/>
+                      <a:tailEnd type="none" w="med" len="med"/>
+                    </a:lnB>
+                  </a:tcPr>
+                </a:tc>
+                <a:tc>
+                  <a:txBody>
+                    <a:bodyPr/>
+                    <a:lstStyle/>
+                    <a:p>
+                      <a:pPr marL="0" marR="0">
+                        <a:lnSpc>
+                          <a:spcPct val="115000"/>
+                        </a:lnSpc>
+                        <a:spcBef>
+                          <a:spcPts val="0"/>
+                        </a:spcBef>
+                        <a:spcAft>
+                          <a:spcPts val="0"/>
+                        </a:spcAft>
+                      </a:pPr>
+                      <a:r>
+                        <a:rPr lang="en-US" sz="2400">
+                          <a:effectLst/>
+                          <a:latin typeface="Calibri"/>
+                          <a:ea typeface="Calibri"/>
+                          <a:cs typeface="Arial"/>
+                        </a:rPr>
+                        <a:t>-Lowest achievable power density</a:t>
+                      </a:r>
+                    </a:p>
+                    <a:p>
+                      <a:pPr marL="0" marR="0">
+                        <a:lnSpc>
+                          <a:spcPct val="115000"/>
+                        </a:lnSpc>
+                        <a:spcBef>
+                          <a:spcPts val="0"/>
+                        </a:spcBef>
+                        <a:spcAft>
+                          <a:spcPts val="0"/>
+                        </a:spcAft>
+                      </a:pPr>
+                      <a:r>
+                        <a:rPr lang="en-US" sz="2400">
+                          <a:effectLst/>
+                          <a:latin typeface="Calibri"/>
+                          <a:ea typeface="Calibri"/>
+                          <a:cs typeface="Arial"/>
+                        </a:rPr>
+                        <a:t>-Noncompliant</a:t>
+                      </a:r>
+                    </a:p>
+                  </a:txBody>
+                  <a:tcPr marT="0" marB="0">
+                    <a:lnL w="12700" cap="flat" cmpd="sng" algn="ctr">
+                      <a:solidFill>
+                        <a:srgbClr val="000000"/>
+                      </a:solidFill>
+                      <a:prstDash val="solid"/>
+                      <a:round/>
+                      <a:headEnd type="none" w="med" len="med"/>
+                      <a:tailEnd type="none" w="med" len="med"/>
+                    </a:lnL>
+                    <a:lnR w="12700" cap="flat" cmpd="sng" algn="ctr">
+                      <a:solidFill>
+                        <a:srgbClr val="000000"/>
+                      </a:solidFill>
+                      <a:prstDash val="solid"/>
+                      <a:round/>
+                      <a:headEnd type="none" w="med" len="med"/>
+                      <a:tailEnd type="none" w="med" len="med"/>
+                    </a:lnR>
+                    <a:lnT w="12700" cap="flat" cmpd="sng" algn="ctr">
+                      <a:solidFill>
+                        <a:srgbClr val="000000"/>
+                      </a:solidFill>
+                      <a:prstDash val="solid"/>
+                      <a:round/>
+                      <a:headEnd type="none" w="med" len="med"/>
+                      <a:tailEnd type="none" w="med" len="med"/>
+                    </a:lnT>
+                    <a:lnB w="12700" cap="flat" cmpd="sng" algn="ctr">
+                      <a:solidFill>
+                        <a:srgbClr val="000000"/>
+                      </a:solidFill>
+                      <a:prstDash val="solid"/>
+                      <a:round/>
+                      <a:headEnd type="none" w="med" len="med"/>
+                      <a:tailEnd type="none" w="med" len="med"/>
+                    </a:lnB>
+                  </a:tcPr>
+                </a:tc>
+              </a:tr>
+              <a:tr h="1400175">
+                <a:tc>
+                  <a:txBody>
+                    <a:bodyPr/>
+                    <a:lstStyle/>
+                    <a:p>
+                      <a:pPr marL="0" marR="0">
+                        <a:lnSpc>
+                          <a:spcPct val="115000"/>
+                        </a:lnSpc>
+                        <a:spcBef>
+                          <a:spcPts val="0"/>
+                        </a:spcBef>
+                        <a:spcAft>
+                          <a:spcPts val="0"/>
+                        </a:spcAft>
+                      </a:pPr>
+                      <a:r>
+                        <a:rPr lang="en-US" sz="2400" b="1">
+                          <a:effectLst/>
+                          <a:latin typeface="Calibri"/>
+                          <a:ea typeface="Calibri"/>
+                          <a:cs typeface="Arial"/>
+                        </a:rPr>
+                        <a:t>Pneumatic Power Source</a:t>
+                      </a:r>
+                      <a:endParaRPr lang="en-US" sz="2400">
+                        <a:effectLst/>
+                        <a:latin typeface="Calibri"/>
+                        <a:ea typeface="Calibri"/>
+                        <a:cs typeface="Arial"/>
+                      </a:endParaRPr>
+                    </a:p>
+                  </a:txBody>
+                  <a:tcPr marT="0" marB="0">
+                    <a:lnL w="12700" cap="flat" cmpd="sng" algn="ctr">
+                      <a:solidFill>
+                        <a:srgbClr val="000000"/>
+                      </a:solidFill>
+                      <a:prstDash val="solid"/>
+                      <a:round/>
+                      <a:headEnd type="none" w="med" len="med"/>
+                      <a:tailEnd type="none" w="med" len="med"/>
+                    </a:lnL>
+                    <a:lnR w="12700" cap="flat" cmpd="sng" algn="ctr">
+                      <a:solidFill>
+                        <a:srgbClr val="000000"/>
+                      </a:solidFill>
+                      <a:prstDash val="solid"/>
+                      <a:round/>
+                      <a:headEnd type="none" w="med" len="med"/>
+                      <a:tailEnd type="none" w="med" len="med"/>
+                    </a:lnR>
+                    <a:lnT w="12700" cap="flat" cmpd="sng" algn="ctr">
+                      <a:solidFill>
+                        <a:srgbClr val="000000"/>
+                      </a:solidFill>
+                      <a:prstDash val="solid"/>
+                      <a:round/>
+                      <a:headEnd type="none" w="med" len="med"/>
+                      <a:tailEnd type="none" w="med" len="med"/>
+                    </a:lnT>
+                    <a:lnB w="12700" cap="flat" cmpd="sng" algn="ctr">
+                      <a:solidFill>
+                        <a:srgbClr val="000000"/>
+                      </a:solidFill>
+                      <a:prstDash val="solid"/>
+                      <a:round/>
+                      <a:headEnd type="none" w="med" len="med"/>
+                      <a:tailEnd type="none" w="med" len="med"/>
+                    </a:lnB>
+                  </a:tcPr>
+                </a:tc>
+                <a:tc>
+                  <a:txBody>
+                    <a:bodyPr/>
+                    <a:lstStyle/>
+                    <a:p>
+                      <a:pPr marL="0" marR="0">
+                        <a:lnSpc>
+                          <a:spcPct val="115000"/>
+                        </a:lnSpc>
+                        <a:spcBef>
+                          <a:spcPts val="0"/>
+                        </a:spcBef>
+                        <a:spcAft>
+                          <a:spcPts val="0"/>
+                        </a:spcAft>
+                      </a:pPr>
+                      <a:r>
+                        <a:rPr lang="en-US" sz="2400" dirty="0">
+                          <a:effectLst/>
+                          <a:latin typeface="Calibri"/>
+                          <a:ea typeface="Calibri"/>
+                          <a:cs typeface="Arial"/>
+                        </a:rPr>
+                        <a:t>-Higher power density than electric power</a:t>
+                      </a:r>
+                    </a:p>
+                    <a:p>
+                      <a:pPr marL="0" marR="0">
+                        <a:lnSpc>
+                          <a:spcPct val="115000"/>
+                        </a:lnSpc>
+                        <a:spcBef>
+                          <a:spcPts val="0"/>
+                        </a:spcBef>
+                        <a:spcAft>
+                          <a:spcPts val="0"/>
+                        </a:spcAft>
+                      </a:pPr>
+                      <a:r>
+                        <a:rPr lang="en-US" sz="2400" dirty="0">
+                          <a:effectLst/>
+                          <a:latin typeface="Calibri"/>
+                          <a:ea typeface="Calibri"/>
+                          <a:cs typeface="Arial"/>
+                        </a:rPr>
+                        <a:t>-Low Maintenance</a:t>
+                      </a:r>
+                    </a:p>
+                    <a:p>
+                      <a:pPr marL="0" marR="0">
+                        <a:lnSpc>
+                          <a:spcPct val="115000"/>
+                        </a:lnSpc>
+                        <a:spcBef>
+                          <a:spcPts val="0"/>
+                        </a:spcBef>
+                        <a:spcAft>
+                          <a:spcPts val="0"/>
+                        </a:spcAft>
+                      </a:pPr>
+                      <a:r>
+                        <a:rPr lang="en-US" sz="2400" dirty="0">
+                          <a:effectLst/>
+                          <a:latin typeface="Calibri"/>
+                          <a:ea typeface="Calibri"/>
+                          <a:cs typeface="Arial"/>
+                        </a:rPr>
+                        <a:t>-Compliant action from fluid compression</a:t>
+                      </a:r>
+                    </a:p>
+                  </a:txBody>
+                  <a:tcPr marT="0" marB="0">
+                    <a:lnL w="12700" cap="flat" cmpd="sng" algn="ctr">
+                      <a:solidFill>
+                        <a:srgbClr val="000000"/>
+                      </a:solidFill>
+                      <a:prstDash val="solid"/>
+                      <a:round/>
+                      <a:headEnd type="none" w="med" len="med"/>
+                      <a:tailEnd type="none" w="med" len="med"/>
+                    </a:lnL>
+                    <a:lnR w="12700" cap="flat" cmpd="sng" algn="ctr">
+                      <a:solidFill>
+                        <a:srgbClr val="000000"/>
+                      </a:solidFill>
+                      <a:prstDash val="solid"/>
+                      <a:round/>
+                      <a:headEnd type="none" w="med" len="med"/>
+                      <a:tailEnd type="none" w="med" len="med"/>
+                    </a:lnR>
+                    <a:lnT w="12700" cap="flat" cmpd="sng" algn="ctr">
+                      <a:solidFill>
+                        <a:srgbClr val="000000"/>
+                      </a:solidFill>
+                      <a:prstDash val="solid"/>
+                      <a:round/>
+                      <a:headEnd type="none" w="med" len="med"/>
+                      <a:tailEnd type="none" w="med" len="med"/>
+                    </a:lnT>
+                    <a:lnB w="12700" cap="flat" cmpd="sng" algn="ctr">
+                      <a:solidFill>
+                        <a:srgbClr val="000000"/>
+                      </a:solidFill>
+                      <a:prstDash val="solid"/>
+                      <a:round/>
+                      <a:headEnd type="none" w="med" len="med"/>
+                      <a:tailEnd type="none" w="med" len="med"/>
+                    </a:lnB>
+                  </a:tcPr>
+                </a:tc>
+                <a:tc>
+                  <a:txBody>
+                    <a:bodyPr/>
+                    <a:lstStyle/>
+                    <a:p>
+                      <a:pPr marL="0" marR="0">
+                        <a:lnSpc>
+                          <a:spcPct val="115000"/>
+                        </a:lnSpc>
+                        <a:spcBef>
+                          <a:spcPts val="0"/>
+                        </a:spcBef>
+                        <a:spcAft>
+                          <a:spcPts val="0"/>
+                        </a:spcAft>
+                      </a:pPr>
+                      <a:r>
+                        <a:rPr lang="en-US" sz="2400" dirty="0">
+                          <a:effectLst/>
+                          <a:latin typeface="Calibri"/>
+                          <a:ea typeface="Calibri"/>
+                          <a:cs typeface="Arial"/>
+                        </a:rPr>
+                        <a:t>-Compressible fluid causes inaccuracy in positioning</a:t>
+                      </a:r>
+                    </a:p>
+                  </a:txBody>
+                  <a:tcPr marT="0" marB="0">
+                    <a:lnL w="12700" cap="flat" cmpd="sng" algn="ctr">
+                      <a:solidFill>
+                        <a:srgbClr val="000000"/>
+                      </a:solidFill>
+                      <a:prstDash val="solid"/>
+                      <a:round/>
+                      <a:headEnd type="none" w="med" len="med"/>
+                      <a:tailEnd type="none" w="med" len="med"/>
+                    </a:lnL>
+                    <a:lnR w="12700" cap="flat" cmpd="sng" algn="ctr">
+                      <a:solidFill>
+                        <a:srgbClr val="000000"/>
+                      </a:solidFill>
+                      <a:prstDash val="solid"/>
+                      <a:round/>
+                      <a:headEnd type="none" w="med" len="med"/>
+                      <a:tailEnd type="none" w="med" len="med"/>
+                    </a:lnR>
+                    <a:lnT w="12700" cap="flat" cmpd="sng" algn="ctr">
+                      <a:solidFill>
+                        <a:srgbClr val="000000"/>
+                      </a:solidFill>
+                      <a:prstDash val="solid"/>
+                      <a:round/>
+                      <a:headEnd type="none" w="med" len="med"/>
+                      <a:tailEnd type="none" w="med" len="med"/>
+                    </a:lnT>
+                    <a:lnB w="12700" cap="flat" cmpd="sng" algn="ctr">
+                      <a:solidFill>
+                        <a:srgbClr val="000000"/>
+                      </a:solidFill>
+                      <a:prstDash val="solid"/>
+                      <a:round/>
+                      <a:headEnd type="none" w="med" len="med"/>
+                      <a:tailEnd type="none" w="med" len="med"/>
+                    </a:lnB>
+                  </a:tcPr>
+                </a:tc>
+              </a:tr>
+            </a:tbl>
+          </a:graphicData>
+        </a:graphic>
+      </p:graphicFrame>
     </p:spTree>
     <p:extLst>
       <p:ext uri="{BB962C8B-B14F-4D97-AF65-F5344CB8AC3E}">
-        <p14:creationId xmlns:p14="http://schemas.microsoft.com/office/powerpoint/2010/main" val="3978015491"/>
+        <p14:creationId xmlns:p14="http://schemas.microsoft.com/office/powerpoint/2010/main" val="2724449421"/>
       </p:ext>
     </p:extLst>
   </p:cSld>
@@ -12992,14 +14285,19 @@
             <p:ph type="title"/>
           </p:nvPr>
         </p:nvSpPr>
-        <p:spPr/>
+        <p:spPr>
+          <a:xfrm>
+            <a:off x="1219200" y="0"/>
+            <a:ext cx="10972800" cy="1143000"/>
+          </a:xfrm>
+        </p:spPr>
         <p:txBody>
           <a:bodyPr/>
           <a:lstStyle/>
           <a:p>
             <a:r>
               <a:rPr lang="en-US" dirty="0" smtClean="0"/>
-              <a:t>Kinematic Modelling</a:t>
+              <a:t>Components</a:t>
             </a:r>
             <a:endParaRPr lang="en-US" dirty="0"/>
           </a:p>
@@ -13015,34 +14313,222 @@
             <p:ph idx="1"/>
           </p:nvPr>
         </p:nvSpPr>
-        <p:spPr/>
+        <p:spPr>
+          <a:xfrm>
+            <a:off x="1016000" y="1102056"/>
+            <a:ext cx="7704919" cy="5029200"/>
+          </a:xfrm>
+        </p:spPr>
         <p:txBody>
-          <a:bodyPr/>
+          <a:bodyPr>
+            <a:normAutofit fontScale="92500" lnSpcReduction="20000"/>
+          </a:bodyPr>
           <a:lstStyle/>
           <a:p>
+            <a:pPr marL="0" indent="0">
+              <a:buNone/>
+            </a:pPr>
+            <a:r>
+              <a:rPr lang="en-US" dirty="0" smtClean="0"/>
+              <a:t>Pneumatic </a:t>
+            </a:r>
             <a:r>
               <a:rPr lang="en-US" dirty="0"/>
-              <a:t>Homogenous Transformations</a:t>
-            </a:r>
-          </a:p>
-          <a:p>
-            <a:r>
-              <a:rPr lang="en-US" dirty="0"/>
-              <a:t>Determines cylinder stroke</a:t>
-            </a:r>
-          </a:p>
-          <a:p>
-            <a:pPr marL="0" indent="0">
-              <a:buNone/>
-            </a:pPr>
-            <a:endParaRPr lang="en-US" dirty="0"/>
+              <a:t>components </a:t>
+            </a:r>
+            <a:r>
+              <a:rPr lang="en-US" dirty="0" smtClean="0"/>
+              <a:t>include:</a:t>
+            </a:r>
+          </a:p>
+          <a:p>
+            <a:r>
+              <a:rPr lang="en-US" sz="3000" dirty="0"/>
+              <a:t>A</a:t>
+            </a:r>
+            <a:r>
+              <a:rPr lang="en-US" sz="3000" dirty="0" smtClean="0"/>
+              <a:t>ir </a:t>
+            </a:r>
+            <a:r>
+              <a:rPr lang="en-US" sz="3000" dirty="0"/>
+              <a:t>S</a:t>
+            </a:r>
+            <a:r>
+              <a:rPr lang="en-US" sz="3000" dirty="0" smtClean="0"/>
+              <a:t>upply </a:t>
+            </a:r>
+            <a:r>
+              <a:rPr lang="en-US" sz="3000" dirty="0"/>
+              <a:t>T</a:t>
+            </a:r>
+            <a:r>
+              <a:rPr lang="en-US" sz="3000" dirty="0" smtClean="0"/>
+              <a:t>ank</a:t>
+            </a:r>
+            <a:endParaRPr lang="en-US" sz="3000" dirty="0" smtClean="0"/>
+          </a:p>
+          <a:p>
+            <a:r>
+              <a:rPr lang="en-US" sz="3000" dirty="0" smtClean="0"/>
+              <a:t>A</a:t>
+            </a:r>
+            <a:r>
+              <a:rPr lang="en-US" sz="3000" dirty="0" smtClean="0"/>
+              <a:t>ir </a:t>
+            </a:r>
+            <a:r>
+              <a:rPr lang="en-US" sz="3000" dirty="0"/>
+              <a:t>C</a:t>
+            </a:r>
+            <a:r>
+              <a:rPr lang="en-US" sz="3000" dirty="0" smtClean="0"/>
+              <a:t>ompressor</a:t>
+            </a:r>
+            <a:endParaRPr lang="en-US" sz="3000" dirty="0" smtClean="0"/>
+          </a:p>
+          <a:p>
+            <a:r>
+              <a:rPr lang="en-US" sz="3000" dirty="0"/>
+              <a:t>D</a:t>
+            </a:r>
+            <a:r>
+              <a:rPr lang="en-US" sz="3000" dirty="0" smtClean="0"/>
+              <a:t>ouble </a:t>
+            </a:r>
+            <a:r>
+              <a:rPr lang="en-US" sz="3000" dirty="0"/>
+              <a:t>A</a:t>
+            </a:r>
+            <a:r>
+              <a:rPr lang="en-US" sz="3000" dirty="0" smtClean="0"/>
+              <a:t>cting </a:t>
+            </a:r>
+            <a:r>
+              <a:rPr lang="en-US" sz="3000" dirty="0"/>
+              <a:t>A</a:t>
+            </a:r>
+            <a:r>
+              <a:rPr lang="en-US" sz="3000" dirty="0" smtClean="0"/>
+              <a:t>ir </a:t>
+            </a:r>
+            <a:r>
+              <a:rPr lang="en-US" sz="3000" dirty="0"/>
+              <a:t>C</a:t>
+            </a:r>
+            <a:r>
+              <a:rPr lang="en-US" sz="3000" dirty="0" smtClean="0"/>
+              <a:t>ylinders </a:t>
+            </a:r>
+            <a:r>
+              <a:rPr lang="en-US" sz="3000" dirty="0" smtClean="0"/>
+              <a:t>(w/ feedback)</a:t>
+            </a:r>
+          </a:p>
+          <a:p>
+            <a:r>
+              <a:rPr lang="en-US" sz="3000" dirty="0" smtClean="0"/>
+              <a:t>R</a:t>
+            </a:r>
+            <a:r>
+              <a:rPr lang="en-US" sz="3000" dirty="0" smtClean="0"/>
+              <a:t>eceiver Tank</a:t>
+            </a:r>
+            <a:endParaRPr lang="en-US" sz="3000" dirty="0" smtClean="0"/>
+          </a:p>
+          <a:p>
+            <a:r>
+              <a:rPr lang="en-US" sz="3000" dirty="0"/>
+              <a:t>S</a:t>
+            </a:r>
+            <a:r>
+              <a:rPr lang="en-US" sz="3000" dirty="0" smtClean="0"/>
+              <a:t>olenoid </a:t>
+            </a:r>
+            <a:r>
+              <a:rPr lang="en-US" sz="3000" dirty="0"/>
+              <a:t>V</a:t>
+            </a:r>
+            <a:r>
+              <a:rPr lang="en-US" sz="3000" dirty="0" smtClean="0"/>
+              <a:t>alve </a:t>
+            </a:r>
+            <a:endParaRPr lang="en-US" sz="3000" dirty="0" smtClean="0"/>
+          </a:p>
+          <a:p>
+            <a:r>
+              <a:rPr lang="en-US" sz="3000" dirty="0"/>
+              <a:t>D</a:t>
+            </a:r>
+            <a:r>
+              <a:rPr lang="en-US" sz="3000" dirty="0" smtClean="0"/>
+              <a:t>irectional </a:t>
+            </a:r>
+            <a:r>
+              <a:rPr lang="en-US" sz="3000" dirty="0"/>
+              <a:t>C</a:t>
+            </a:r>
+            <a:r>
+              <a:rPr lang="en-US" sz="3000" dirty="0" smtClean="0"/>
+              <a:t>ontrol </a:t>
+            </a:r>
+            <a:r>
+              <a:rPr lang="en-US" sz="3000" dirty="0"/>
+              <a:t>V</a:t>
+            </a:r>
+            <a:r>
+              <a:rPr lang="en-US" sz="3000" dirty="0" smtClean="0"/>
+              <a:t>alves </a:t>
+            </a:r>
+            <a:r>
+              <a:rPr lang="en-US" sz="3000" dirty="0" smtClean="0"/>
+              <a:t>(4/2)</a:t>
+            </a:r>
+          </a:p>
+          <a:p>
+            <a:r>
+              <a:rPr lang="en-US" sz="3000" dirty="0"/>
+              <a:t>P</a:t>
+            </a:r>
+            <a:r>
+              <a:rPr lang="en-US" sz="3000" dirty="0" smtClean="0"/>
+              <a:t>ressure </a:t>
+            </a:r>
+            <a:r>
+              <a:rPr lang="en-US" sz="3000" dirty="0"/>
+              <a:t>R</a:t>
+            </a:r>
+            <a:r>
+              <a:rPr lang="en-US" sz="3000" dirty="0" smtClean="0"/>
+              <a:t>elief </a:t>
+            </a:r>
+            <a:r>
+              <a:rPr lang="en-US" sz="3000" dirty="0"/>
+              <a:t>V</a:t>
+            </a:r>
+            <a:r>
+              <a:rPr lang="en-US" sz="3000" dirty="0" smtClean="0"/>
+              <a:t>alve</a:t>
+            </a:r>
+            <a:endParaRPr lang="en-US" sz="3000" dirty="0" smtClean="0"/>
+          </a:p>
+          <a:p>
+            <a:r>
+              <a:rPr lang="en-US" sz="3000" dirty="0"/>
+              <a:t>T</a:t>
+            </a:r>
+            <a:r>
+              <a:rPr lang="en-US" sz="3000" dirty="0" smtClean="0"/>
+              <a:t>ubing</a:t>
+            </a:r>
+            <a:endParaRPr lang="en-US" sz="3000" dirty="0" smtClean="0"/>
           </a:p>
         </p:txBody>
       </p:sp>
     </p:spTree>
     <p:extLst>
       <p:ext uri="{BB962C8B-B14F-4D97-AF65-F5344CB8AC3E}">
-        <p14:creationId xmlns:p14="http://schemas.microsoft.com/office/powerpoint/2010/main" val="156962544"/>
+        <p14:creationId xmlns:p14="http://schemas.microsoft.com/office/powerpoint/2010/main" val="999933654"/>
       </p:ext>
     </p:extLst>
   </p:cSld>
@@ -13079,77 +14565,65 @@
             <p:ph type="title"/>
           </p:nvPr>
         </p:nvSpPr>
-        <p:spPr/>
+        <p:spPr>
+          <a:xfrm>
+            <a:off x="1100470" y="250029"/>
+            <a:ext cx="9905998" cy="1478570"/>
+          </a:xfrm>
+        </p:spPr>
         <p:txBody>
           <a:bodyPr/>
           <a:lstStyle/>
           <a:p>
             <a:r>
-              <a:rPr lang="en-US" dirty="0"/>
-              <a:t>Dynamic Model</a:t>
-            </a:r>
+              <a:rPr lang="en-US" dirty="0" smtClean="0"/>
+              <a:t>Pneumatic Circuit</a:t>
+            </a:r>
+            <a:endParaRPr lang="en-US" dirty="0"/>
           </a:p>
         </p:txBody>
       </p:sp>
-      <p:sp>
-        <p:nvSpPr>
-          <p:cNvPr id="3" name="Content Placeholder 2"/>
-          <p:cNvSpPr>
-            <a:spLocks noGrp="1"/>
-          </p:cNvSpPr>
+      <p:pic>
+        <p:nvPicPr>
+          <p:cNvPr id="4" name="Content Placeholder 3" descr="D:\MyDocs\Documents\Classes\AgileRoboticControls\Research\Pneumatic Circuits\Sample Circuit.png"/>
+          <p:cNvPicPr>
+            <a:picLocks noGrp="1"/>
+          </p:cNvPicPr>
           <p:nvPr>
             <p:ph idx="1"/>
           </p:nvPr>
-        </p:nvSpPr>
-        <p:spPr/>
-        <p:txBody>
-          <a:bodyPr/>
-          <a:lstStyle/>
-          <a:p>
-            <a:r>
-              <a:rPr lang="en-US" dirty="0" err="1"/>
-              <a:t>Lagrangian</a:t>
-            </a:r>
-            <a:r>
-              <a:rPr lang="en-US" dirty="0"/>
-              <a:t> Mechanics</a:t>
-            </a:r>
-          </a:p>
-          <a:p>
-            <a:r>
-              <a:rPr lang="en-US" dirty="0"/>
-              <a:t>Non-inertial reference frames</a:t>
-            </a:r>
-          </a:p>
-          <a:p>
-            <a:r>
-              <a:rPr lang="en-US" dirty="0"/>
-              <a:t>Arbitrary grounded reference frame</a:t>
-            </a:r>
-          </a:p>
-          <a:p>
-            <a:r>
-              <a:rPr lang="en-US" dirty="0"/>
-              <a:t>Determines mechanical properties of </a:t>
-            </a:r>
-            <a:r>
-              <a:rPr lang="en-US" dirty="0" smtClean="0"/>
-              <a:t>components</a:t>
-            </a:r>
-          </a:p>
-          <a:p>
-            <a:r>
-              <a:rPr lang="en-US" smtClean="0"/>
-              <a:t>27 Equations</a:t>
-            </a:r>
-            <a:endParaRPr lang="en-US"/>
-          </a:p>
-        </p:txBody>
-      </p:sp>
+        </p:nvPicPr>
+        <p:blipFill>
+          <a:blip r:embed="rId2">
+            <a:extLst>
+              <a:ext uri="{28A0092B-C50C-407E-A947-70E740481C1C}">
+                <a14:useLocalDpi xmlns:a14="http://schemas.microsoft.com/office/drawing/2010/main" val="0"/>
+              </a:ext>
+            </a:extLst>
+          </a:blip>
+          <a:srcRect/>
+          <a:stretch>
+            <a:fillRect/>
+          </a:stretch>
+        </p:blipFill>
+        <p:spPr bwMode="auto">
+          <a:xfrm>
+            <a:off x="1023581" y="1583139"/>
+            <a:ext cx="10072049" cy="4219433"/>
+          </a:xfrm>
+          <a:prstGeom prst="rect">
+            <a:avLst/>
+          </a:prstGeom>
+          <a:noFill/>
+          <a:ln>
+            <a:noFill/>
+          </a:ln>
+        </p:spPr>
+      </p:pic>
     </p:spTree>
     <p:extLst>
       <p:ext uri="{BB962C8B-B14F-4D97-AF65-F5344CB8AC3E}">
-        <p14:creationId xmlns:p14="http://schemas.microsoft.com/office/powerpoint/2010/main" val="18980793"/>
+        <p14:creationId xmlns:p14="http://schemas.microsoft.com/office/powerpoint/2010/main" val="1815423388"/>
       </p:ext>
     </p:extLst>
   </p:cSld>
@@ -13193,7 +14667,7 @@
           <a:p>
             <a:r>
               <a:rPr lang="en-US" dirty="0" smtClean="0"/>
-              <a:t>Control architecture and electronics</a:t>
+              <a:t>What’s Next?</a:t>
             </a:r>
             <a:endParaRPr lang="en-US" dirty="0"/>
           </a:p>
@@ -13209,19 +14683,61 @@
             <p:ph idx="1"/>
           </p:nvPr>
         </p:nvSpPr>
-        <p:spPr/>
+        <p:spPr>
+          <a:xfrm>
+            <a:off x="1155060" y="1880997"/>
+            <a:ext cx="9905999" cy="3541714"/>
+          </a:xfrm>
+        </p:spPr>
         <p:txBody>
           <a:bodyPr/>
           <a:lstStyle/>
           <a:p>
-            <a:endParaRPr lang="en-US"/>
+            <a:r>
+              <a:rPr lang="en-US" dirty="0" smtClean="0"/>
+              <a:t>Determine necessary output forces of cylinders based on kinematic equations</a:t>
+            </a:r>
+          </a:p>
+          <a:p>
+            <a:r>
+              <a:rPr lang="en-US" dirty="0" smtClean="0"/>
+              <a:t>Select appropriate pneumatic components </a:t>
+            </a:r>
+            <a:r>
+              <a:rPr lang="en-US" dirty="0" smtClean="0"/>
+              <a:t>based on needed specifications</a:t>
+            </a:r>
+            <a:endParaRPr lang="en-US" dirty="0" smtClean="0"/>
+          </a:p>
+          <a:p>
+            <a:r>
+              <a:rPr lang="en-US" dirty="0" smtClean="0"/>
+              <a:t>Test air cylinders</a:t>
+            </a:r>
+          </a:p>
+          <a:p>
+            <a:r>
+              <a:rPr lang="en-US" dirty="0"/>
+              <a:t>P</a:t>
+            </a:r>
+            <a:r>
+              <a:rPr lang="en-US" dirty="0" smtClean="0"/>
+              <a:t>neumatic circuit construction</a:t>
+            </a:r>
+          </a:p>
+          <a:p>
+            <a:r>
+              <a:rPr lang="en-US" dirty="0" smtClean="0"/>
+              <a:t>Test circuit with control system</a:t>
+            </a:r>
+            <a:endParaRPr lang="en-US" dirty="0"/>
           </a:p>
         </p:txBody>
       </p:sp>
     </p:spTree>
     <p:extLst>
       <p:ext uri="{BB962C8B-B14F-4D97-AF65-F5344CB8AC3E}">
-        <p14:creationId xmlns:p14="http://schemas.microsoft.com/office/powerpoint/2010/main" val="3700963556"/>
+        <p14:creationId xmlns:p14="http://schemas.microsoft.com/office/powerpoint/2010/main" val="2066895567"/>
       </p:ext>
     </p:extLst>
   </p:cSld>
@@ -13476,7 +14992,7 @@
   <a:extraClrSchemeLst/>
   <a:extLst>
     <a:ext uri="{05A4C25C-085E-4340-85A3-A5531E510DB2}">
-      <thm15:themeFamily xmlns:thm15="http://schemas.microsoft.com/office/thememl/2012/main" name="Circuit" id="{0AC2F7E7-15F5-431C-B2A2-456FE929F56C}" vid="{142578CA-DEC9-49C3-80AF-C113973CC9A9}"/>
+      <thm15:themeFamily xmlns:thm15="http://schemas.microsoft.com/office/thememl/2012/main" xmlns="" name="Circuit" id="{0AC2F7E7-15F5-431C-B2A2-456FE929F56C}" vid="{142578CA-DEC9-49C3-80AF-C113973CC9A9}"/>
     </a:ext>
   </a:extLst>
 </a:theme>

</xml_diff>

<commit_message>
Powerpoint, TODO List, Memo4
Powerpoint controls and software slides added

TODO list (color updated)

Memo 4 Goals removed since they have not been decided.
</commit_message>
<xml_diff>
--- a/Design Powerpoint.pptx
+++ b/Design Powerpoint.pptx
@@ -17,8 +17,11 @@
     <p:sldId id="261" r:id="rId11"/>
     <p:sldId id="265" r:id="rId12"/>
     <p:sldId id="266" r:id="rId13"/>
-    <p:sldId id="262" r:id="rId14"/>
-    <p:sldId id="263" r:id="rId15"/>
+    <p:sldId id="271" r:id="rId14"/>
+    <p:sldId id="272" r:id="rId15"/>
+    <p:sldId id="273" r:id="rId16"/>
+    <p:sldId id="274" r:id="rId17"/>
+    <p:sldId id="263" r:id="rId18"/>
   </p:sldIdLst>
   <p:sldSz cx="12192000" cy="6858000"/>
   <p:notesSz cx="6858000" cy="9144000"/>
@@ -119,7 +122,18 @@
   </p:defaultTextStyle>
   <p:extLst>
     <p:ext uri="{EFAFB233-063F-42B5-8137-9DF3F51BA10A}">
-      <p15:sldGuideLst xmlns:p15="http://schemas.microsoft.com/office/powerpoint/2012/main" xmlns=""/>
+      <p15:sldGuideLst xmlns:p15="http://schemas.microsoft.com/office/powerpoint/2012/main">
+        <p15:guide id="1" orient="horz" pos="2160">
+          <p15:clr>
+            <a:srgbClr val="A4A3A4"/>
+          </p15:clr>
+        </p15:guide>
+        <p15:guide id="2" pos="3840">
+          <p15:clr>
+            <a:srgbClr val="A4A3A4"/>
+          </p15:clr>
+        </p15:guide>
+      </p15:sldGuideLst>
     </p:ext>
   </p:extLst>
 </p:presentation>
@@ -12684,10 +12698,10 @@
           </a:p>
           <a:p>
             <a:r>
-              <a:rPr lang="en-US" smtClean="0"/>
+              <a:rPr lang="en-US" dirty="0" smtClean="0"/>
               <a:t>27 Equations</a:t>
             </a:r>
-            <a:endParaRPr lang="en-US"/>
+            <a:endParaRPr lang="en-US" dirty="0"/>
           </a:p>
         </p:txBody>
       </p:sp>
@@ -12733,14 +12747,113 @@
         </p:nvSpPr>
         <p:spPr/>
         <p:txBody>
+          <a:bodyPr>
+            <a:normAutofit/>
+          </a:bodyPr>
+          <a:lstStyle/>
+          <a:p>
+            <a:r>
+              <a:rPr lang="en-US" sz="4000" dirty="0" smtClean="0"/>
+              <a:t>Control architecture</a:t>
+            </a:r>
+            <a:endParaRPr lang="en-US" sz="4000" dirty="0"/>
+          </a:p>
+        </p:txBody>
+      </p:sp>
+      <p:sp>
+        <p:nvSpPr>
+          <p:cNvPr id="3" name="Content Placeholder 2"/>
+          <p:cNvSpPr>
+            <a:spLocks noGrp="1"/>
+          </p:cNvSpPr>
+          <p:nvPr>
+            <p:ph idx="1"/>
+          </p:nvPr>
+        </p:nvSpPr>
+        <p:spPr>
+          <a:xfrm>
+            <a:off x="1141412" y="2249486"/>
+            <a:ext cx="9905999" cy="4265613"/>
+          </a:xfrm>
+        </p:spPr>
+        <p:txBody>
+          <a:bodyPr>
+            <a:normAutofit/>
+          </a:bodyPr>
+          <a:lstStyle/>
+          <a:p>
+            <a:r>
+              <a:rPr lang="en-US" sz="2800" dirty="0" smtClean="0"/>
+              <a:t>Control algorithms (PIDs) implemented in software</a:t>
+            </a:r>
+          </a:p>
+          <a:p>
+            <a:r>
+              <a:rPr lang="en-US" sz="2800" dirty="0" smtClean="0"/>
+              <a:t>Software used in this project is MATLAB, Simulink, and the associated CODER software</a:t>
+            </a:r>
+          </a:p>
+          <a:p>
+            <a:r>
+              <a:rPr lang="en-US" sz="2800" dirty="0" smtClean="0"/>
+              <a:t>Simulink model of the control is developed and then C code is generated for the target hardware.</a:t>
+            </a:r>
+          </a:p>
+          <a:p>
+            <a:r>
+              <a:rPr lang="en-US" sz="2800" dirty="0" smtClean="0"/>
+              <a:t>Current hardware is an Arduino Mega 2560</a:t>
+            </a:r>
+            <a:endParaRPr lang="en-US" sz="2800" dirty="0"/>
+          </a:p>
+        </p:txBody>
+      </p:sp>
+    </p:spTree>
+    <p:extLst>
+      <p:ext uri="{BB962C8B-B14F-4D97-AF65-F5344CB8AC3E}">
+        <p14:creationId xmlns:p14="http://schemas.microsoft.com/office/powerpoint/2010/main" val="3213992839"/>
+      </p:ext>
+    </p:extLst>
+  </p:cSld>
+  <p:clrMapOvr>
+    <a:masterClrMapping/>
+  </p:clrMapOvr>
+</p:sld>
+</file>
+
+<file path=ppt/slides/slide14.xml><?xml version="1.0" encoding="utf-8"?>
+<p:sld xmlns:a="http://schemas.openxmlformats.org/drawingml/2006/main" xmlns:r="http://schemas.openxmlformats.org/officeDocument/2006/relationships" xmlns:p="http://schemas.openxmlformats.org/presentationml/2006/main">
+  <p:cSld>
+    <p:spTree>
+      <p:nvGrpSpPr>
+        <p:cNvPr id="1" name=""/>
+        <p:cNvGrpSpPr/>
+        <p:nvPr/>
+      </p:nvGrpSpPr>
+      <p:grpSpPr>
+        <a:xfrm>
+          <a:off x="0" y="0"/>
+          <a:ext cx="0" cy="0"/>
+          <a:chOff x="0" y="0"/>
+          <a:chExt cx="0" cy="0"/>
+        </a:xfrm>
+      </p:grpSpPr>
+      <p:sp>
+        <p:nvSpPr>
+          <p:cNvPr id="2" name="Title 1"/>
+          <p:cNvSpPr>
+            <a:spLocks noGrp="1"/>
+          </p:cNvSpPr>
+          <p:nvPr>
+            <p:ph type="title"/>
+          </p:nvPr>
+        </p:nvSpPr>
+        <p:spPr/>
+        <p:txBody>
           <a:bodyPr/>
           <a:lstStyle/>
           <a:p>
-            <a:r>
-              <a:rPr lang="en-US" dirty="0" smtClean="0"/>
-              <a:t>Control architecture and electronics</a:t>
-            </a:r>
-            <a:endParaRPr lang="en-US" dirty="0"/>
+            <a:endParaRPr lang="en-US"/>
           </a:p>
         </p:txBody>
       </p:sp>
@@ -12759,14 +12872,18 @@
           <a:bodyPr/>
           <a:lstStyle/>
           <a:p>
-            <a:endParaRPr lang="en-US"/>
+            <a:r>
+              <a:rPr lang="en-US" dirty="0" smtClean="0"/>
+              <a:t>&lt;Picture of Simulink model with PIDs&gt;</a:t>
+            </a:r>
+            <a:endParaRPr lang="en-US" dirty="0"/>
           </a:p>
         </p:txBody>
       </p:sp>
     </p:spTree>
     <p:extLst>
       <p:ext uri="{BB962C8B-B14F-4D97-AF65-F5344CB8AC3E}">
-        <p14:creationId xmlns:p14="http://schemas.microsoft.com/office/powerpoint/2010/main" val="3700963556"/>
+        <p14:creationId xmlns:p14="http://schemas.microsoft.com/office/powerpoint/2010/main" val="3175501738"/>
       </p:ext>
     </p:extLst>
   </p:cSld>
@@ -12776,7 +12893,233 @@
 </p:sld>
 </file>
 
-<file path=ppt/slides/slide14.xml><?xml version="1.0" encoding="utf-8"?>
+<file path=ppt/slides/slide15.xml><?xml version="1.0" encoding="utf-8"?>
+<p:sld xmlns:a="http://schemas.openxmlformats.org/drawingml/2006/main" xmlns:r="http://schemas.openxmlformats.org/officeDocument/2006/relationships" xmlns:p="http://schemas.openxmlformats.org/presentationml/2006/main">
+  <p:cSld>
+    <p:spTree>
+      <p:nvGrpSpPr>
+        <p:cNvPr id="1" name=""/>
+        <p:cNvGrpSpPr/>
+        <p:nvPr/>
+      </p:nvGrpSpPr>
+      <p:grpSpPr>
+        <a:xfrm>
+          <a:off x="0" y="0"/>
+          <a:ext cx="0" cy="0"/>
+          <a:chOff x="0" y="0"/>
+          <a:chExt cx="0" cy="0"/>
+        </a:xfrm>
+      </p:grpSpPr>
+      <p:sp>
+        <p:nvSpPr>
+          <p:cNvPr id="2" name="Title 1"/>
+          <p:cNvSpPr>
+            <a:spLocks noGrp="1"/>
+          </p:cNvSpPr>
+          <p:nvPr>
+            <p:ph type="title"/>
+          </p:nvPr>
+        </p:nvSpPr>
+        <p:spPr/>
+        <p:txBody>
+          <a:bodyPr/>
+          <a:lstStyle/>
+          <a:p>
+            <a:r>
+              <a:rPr lang="en-US" dirty="0" smtClean="0"/>
+              <a:t>Signal Conditioning</a:t>
+            </a:r>
+            <a:endParaRPr lang="en-US" dirty="0"/>
+          </a:p>
+        </p:txBody>
+      </p:sp>
+      <p:sp>
+        <p:nvSpPr>
+          <p:cNvPr id="3" name="Content Placeholder 2"/>
+          <p:cNvSpPr>
+            <a:spLocks noGrp="1"/>
+          </p:cNvSpPr>
+          <p:nvPr>
+            <p:ph idx="1"/>
+          </p:nvPr>
+        </p:nvSpPr>
+        <p:spPr>
+          <a:xfrm>
+            <a:off x="1141412" y="1869622"/>
+            <a:ext cx="9905999" cy="4637314"/>
+          </a:xfrm>
+        </p:spPr>
+        <p:txBody>
+          <a:bodyPr>
+            <a:normAutofit/>
+          </a:bodyPr>
+          <a:lstStyle/>
+          <a:p>
+            <a:r>
+              <a:rPr lang="en-US" dirty="0" smtClean="0"/>
+              <a:t>To drive the pneumatic actuators digital PWM signals from the microcontroller will be filtered by a low pass filter into analog signals</a:t>
+            </a:r>
+          </a:p>
+          <a:p>
+            <a:r>
+              <a:rPr lang="en-US" dirty="0" smtClean="0"/>
+              <a:t>The analog signals will be scaled by amplifiers to the correct voltage required by the pneumatic actuator</a:t>
+            </a:r>
+          </a:p>
+          <a:p>
+            <a:r>
+              <a:rPr lang="en-US" dirty="0" smtClean="0"/>
+              <a:t>Circuit isolation is needed to separate the 5 volt microcontroller circuit from the 12 volt actuator circuit</a:t>
+            </a:r>
+          </a:p>
+          <a:p>
+            <a:r>
+              <a:rPr lang="en-US" dirty="0" smtClean="0"/>
+              <a:t>Circuit isolation will be achieved using </a:t>
+            </a:r>
+            <a:r>
+              <a:rPr lang="en-US" dirty="0" err="1" smtClean="0"/>
+              <a:t>opto</a:t>
+            </a:r>
+            <a:r>
+              <a:rPr lang="en-US" dirty="0" smtClean="0"/>
+              <a:t>-isolators</a:t>
+            </a:r>
+          </a:p>
+          <a:p>
+            <a:r>
+              <a:rPr lang="en-US" dirty="0" smtClean="0"/>
+              <a:t>The feedback in the control loop will be a position feedback from the cylinder</a:t>
+            </a:r>
+          </a:p>
+          <a:p>
+            <a:endParaRPr lang="en-US" dirty="0"/>
+          </a:p>
+        </p:txBody>
+      </p:sp>
+    </p:spTree>
+    <p:extLst>
+      <p:ext uri="{BB962C8B-B14F-4D97-AF65-F5344CB8AC3E}">
+        <p14:creationId xmlns:p14="http://schemas.microsoft.com/office/powerpoint/2010/main" val="3380542292"/>
+      </p:ext>
+    </p:extLst>
+  </p:cSld>
+  <p:clrMapOvr>
+    <a:masterClrMapping/>
+  </p:clrMapOvr>
+</p:sld>
+</file>
+
+<file path=ppt/slides/slide16.xml><?xml version="1.0" encoding="utf-8"?>
+<p:sld xmlns:a="http://schemas.openxmlformats.org/drawingml/2006/main" xmlns:r="http://schemas.openxmlformats.org/officeDocument/2006/relationships" xmlns:p="http://schemas.openxmlformats.org/presentationml/2006/main">
+  <p:cSld>
+    <p:spTree>
+      <p:nvGrpSpPr>
+        <p:cNvPr id="1" name=""/>
+        <p:cNvGrpSpPr/>
+        <p:nvPr/>
+      </p:nvGrpSpPr>
+      <p:grpSpPr>
+        <a:xfrm>
+          <a:off x="0" y="0"/>
+          <a:ext cx="0" cy="0"/>
+          <a:chOff x="0" y="0"/>
+          <a:chExt cx="0" cy="0"/>
+        </a:xfrm>
+      </p:grpSpPr>
+      <p:sp>
+        <p:nvSpPr>
+          <p:cNvPr id="2" name="Title 1"/>
+          <p:cNvSpPr>
+            <a:spLocks noGrp="1"/>
+          </p:cNvSpPr>
+          <p:nvPr>
+            <p:ph type="title"/>
+          </p:nvPr>
+        </p:nvSpPr>
+        <p:spPr/>
+        <p:txBody>
+          <a:bodyPr/>
+          <a:lstStyle/>
+          <a:p>
+            <a:r>
+              <a:rPr lang="en-US" dirty="0" smtClean="0"/>
+              <a:t>User Interface</a:t>
+            </a:r>
+            <a:endParaRPr lang="en-US" dirty="0"/>
+          </a:p>
+        </p:txBody>
+      </p:sp>
+      <p:sp>
+        <p:nvSpPr>
+          <p:cNvPr id="3" name="Content Placeholder 2"/>
+          <p:cNvSpPr>
+            <a:spLocks noGrp="1"/>
+          </p:cNvSpPr>
+          <p:nvPr>
+            <p:ph idx="1"/>
+          </p:nvPr>
+        </p:nvSpPr>
+        <p:spPr/>
+        <p:txBody>
+          <a:bodyPr/>
+          <a:lstStyle/>
+          <a:p>
+            <a:r>
+              <a:rPr lang="en-US" dirty="0" smtClean="0"/>
+              <a:t>The robot will be remotely controlled by a human operator</a:t>
+            </a:r>
+          </a:p>
+          <a:p>
+            <a:r>
+              <a:rPr lang="en-US" dirty="0" err="1" smtClean="0"/>
+              <a:t>Xbee</a:t>
+            </a:r>
+            <a:r>
+              <a:rPr lang="en-US" dirty="0" smtClean="0"/>
+              <a:t> short range radio devices using IEEE standard 802.15.4 will be used to handle the wireless communication</a:t>
+            </a:r>
+          </a:p>
+          <a:p>
+            <a:pPr marL="0" indent="0">
+              <a:buNone/>
+            </a:pPr>
+            <a:endParaRPr lang="en-US" dirty="0" smtClean="0"/>
+          </a:p>
+          <a:p>
+            <a:pPr marL="0" indent="0">
+              <a:buNone/>
+            </a:pPr>
+            <a:r>
+              <a:rPr lang="en-US" dirty="0" smtClean="0"/>
+              <a:t>&lt;Picture of controller, </a:t>
+            </a:r>
+            <a:r>
+              <a:rPr lang="en-US" dirty="0" err="1" smtClean="0"/>
+              <a:t>Xbee</a:t>
+            </a:r>
+            <a:r>
+              <a:rPr lang="en-US" dirty="0" smtClean="0"/>
+              <a:t> device, transmission medium, radio waves&gt;</a:t>
+            </a:r>
+            <a:endParaRPr lang="en-US" dirty="0"/>
+          </a:p>
+        </p:txBody>
+      </p:sp>
+    </p:spTree>
+    <p:extLst>
+      <p:ext uri="{BB962C8B-B14F-4D97-AF65-F5344CB8AC3E}">
+        <p14:creationId xmlns:p14="http://schemas.microsoft.com/office/powerpoint/2010/main" val="1403694238"/>
+      </p:ext>
+    </p:extLst>
+  </p:cSld>
+  <p:clrMapOvr>
+    <a:masterClrMapping/>
+  </p:clrMapOvr>
+</p:sld>
+</file>
+
+<file path=ppt/slides/slide17.xml><?xml version="1.0" encoding="utf-8"?>
 <p:sld xmlns:a="http://schemas.openxmlformats.org/drawingml/2006/main" xmlns:r="http://schemas.openxmlformats.org/officeDocument/2006/relationships" xmlns:p="http://schemas.openxmlformats.org/presentationml/2006/main">
   <p:cSld>
     <p:spTree>
@@ -14366,11 +14709,40 @@
               <a:rPr lang="en-US" sz="3000" dirty="0" smtClean="0"/>
               <a:t>ank</a:t>
             </a:r>
-            <a:endParaRPr lang="en-US" sz="3000" dirty="0" smtClean="0"/>
           </a:p>
           <a:p>
             <a:r>
               <a:rPr lang="en-US" sz="3000" dirty="0" smtClean="0"/>
+              <a:t>Air </a:t>
+            </a:r>
+            <a:r>
+              <a:rPr lang="en-US" sz="3000" dirty="0"/>
+              <a:t>C</a:t>
+            </a:r>
+            <a:r>
+              <a:rPr lang="en-US" sz="3000" dirty="0" smtClean="0"/>
+              <a:t>ompressor</a:t>
+            </a:r>
+          </a:p>
+          <a:p>
+            <a:r>
+              <a:rPr lang="en-US" sz="3000" dirty="0"/>
+              <a:t>D</a:t>
+            </a:r>
+            <a:r>
+              <a:rPr lang="en-US" sz="3000" dirty="0" smtClean="0"/>
+              <a:t>ouble </a:t>
+            </a:r>
+            <a:r>
+              <a:rPr lang="en-US" sz="3000" dirty="0"/>
+              <a:t>A</a:t>
+            </a:r>
+            <a:r>
+              <a:rPr lang="en-US" sz="3000" dirty="0" smtClean="0"/>
+              <a:t>cting </a:t>
+            </a:r>
+            <a:r>
+              <a:rPr lang="en-US" sz="3000" dirty="0"/>
               <a:t>A</a:t>
             </a:r>
             <a:r>
@@ -14383,9 +14755,32 @@
             </a:r>
             <a:r>
               <a:rPr lang="en-US" sz="3000" dirty="0" smtClean="0"/>
-              <a:t>ompressor</a:t>
-            </a:r>
-            <a:endParaRPr lang="en-US" sz="3000" dirty="0" smtClean="0"/>
+              <a:t>ylinders (w/ feedback)</a:t>
+            </a:r>
+          </a:p>
+          <a:p>
+            <a:r>
+              <a:rPr lang="en-US" sz="3000" dirty="0" smtClean="0"/>
+              <a:t>Receiver Tank</a:t>
+            </a:r>
+          </a:p>
+          <a:p>
+            <a:r>
+              <a:rPr lang="en-US" sz="3000" dirty="0"/>
+              <a:t>S</a:t>
+            </a:r>
+            <a:r>
+              <a:rPr lang="en-US" sz="3000" dirty="0" smtClean="0"/>
+              <a:t>olenoid </a:t>
+            </a:r>
+            <a:r>
+              <a:rPr lang="en-US" sz="3000" dirty="0"/>
+              <a:t>V</a:t>
+            </a:r>
+            <a:r>
+              <a:rPr lang="en-US" sz="3000" dirty="0" smtClean="0"/>
+              <a:t>alve </a:t>
+            </a:r>
           </a:p>
           <a:p>
             <a:r>
@@ -14394,23 +14789,7 @@
             </a:r>
             <a:r>
               <a:rPr lang="en-US" sz="3000" dirty="0" smtClean="0"/>
-              <a:t>ouble </a:t>
-            </a:r>
-            <a:r>
-              <a:rPr lang="en-US" sz="3000" dirty="0"/>
-              <a:t>A</a:t>
-            </a:r>
-            <a:r>
-              <a:rPr lang="en-US" sz="3000" dirty="0" smtClean="0"/>
-              <a:t>cting </a:t>
-            </a:r>
-            <a:r>
-              <a:rPr lang="en-US" sz="3000" dirty="0"/>
-              <a:t>A</a:t>
-            </a:r>
-            <a:r>
-              <a:rPr lang="en-US" sz="3000" dirty="0" smtClean="0"/>
-              <a:t>ir </a:t>
+              <a:t>irectional </a:t>
             </a:r>
             <a:r>
               <a:rPr lang="en-US" sz="3000" dirty="0"/>
@@ -14418,32 +14797,7 @@
             </a:r>
             <a:r>
               <a:rPr lang="en-US" sz="3000" dirty="0" smtClean="0"/>
-              <a:t>ylinders </a:t>
-            </a:r>
-            <a:r>
-              <a:rPr lang="en-US" sz="3000" dirty="0" smtClean="0"/>
-              <a:t>(w/ feedback)</a:t>
-            </a:r>
-          </a:p>
-          <a:p>
-            <a:r>
-              <a:rPr lang="en-US" sz="3000" dirty="0" smtClean="0"/>
-              <a:t>R</a:t>
-            </a:r>
-            <a:r>
-              <a:rPr lang="en-US" sz="3000" dirty="0" smtClean="0"/>
-              <a:t>eceiver Tank</a:t>
-            </a:r>
-            <a:endParaRPr lang="en-US" sz="3000" dirty="0" smtClean="0"/>
-          </a:p>
-          <a:p>
-            <a:r>
-              <a:rPr lang="en-US" sz="3000" dirty="0"/>
-              <a:t>S</a:t>
-            </a:r>
-            <a:r>
-              <a:rPr lang="en-US" sz="3000" dirty="0" smtClean="0"/>
-              <a:t>olenoid </a:t>
+              <a:t>ontrol </a:t>
             </a:r>
             <a:r>
               <a:rPr lang="en-US" sz="3000" dirty="0"/>
@@ -14451,26 +14805,25 @@
             </a:r>
             <a:r>
               <a:rPr lang="en-US" sz="3000" dirty="0" smtClean="0"/>
-              <a:t>alve </a:t>
-            </a:r>
-            <a:endParaRPr lang="en-US" sz="3000" dirty="0" smtClean="0"/>
+              <a:t>alves (4/2)</a:t>
+            </a:r>
           </a:p>
           <a:p>
             <a:r>
               <a:rPr lang="en-US" sz="3000" dirty="0"/>
-              <a:t>D</a:t>
+              <a:t>P</a:t>
             </a:r>
             <a:r>
               <a:rPr lang="en-US" sz="3000" dirty="0" smtClean="0"/>
-              <a:t>irectional </a:t>
+              <a:t>ressure </a:t>
             </a:r>
             <a:r>
               <a:rPr lang="en-US" sz="3000" dirty="0"/>
-              <a:t>C</a:t>
+              <a:t>R</a:t>
             </a:r>
             <a:r>
               <a:rPr lang="en-US" sz="3000" dirty="0" smtClean="0"/>
-              <a:t>ontrol </a:t>
+              <a:t>elief </a:t>
             </a:r>
             <a:r>
               <a:rPr lang="en-US" sz="3000" dirty="0"/>
@@ -14478,39 +14831,8 @@
             </a:r>
             <a:r>
               <a:rPr lang="en-US" sz="3000" dirty="0" smtClean="0"/>
-              <a:t>alves </a:t>
-            </a:r>
-            <a:r>
-              <a:rPr lang="en-US" sz="3000" dirty="0" smtClean="0"/>
-              <a:t>(4/2)</a:t>
-            </a:r>
-          </a:p>
-          <a:p>
-            <a:r>
-              <a:rPr lang="en-US" sz="3000" dirty="0"/>
-              <a:t>P</a:t>
-            </a:r>
-            <a:r>
-              <a:rPr lang="en-US" sz="3000" dirty="0" smtClean="0"/>
-              <a:t>ressure </a:t>
-            </a:r>
-            <a:r>
-              <a:rPr lang="en-US" sz="3000" dirty="0"/>
-              <a:t>R</a:t>
-            </a:r>
-            <a:r>
-              <a:rPr lang="en-US" sz="3000" dirty="0" smtClean="0"/>
-              <a:t>elief </a:t>
-            </a:r>
-            <a:r>
-              <a:rPr lang="en-US" sz="3000" dirty="0"/>
-              <a:t>V</a:t>
-            </a:r>
-            <a:r>
-              <a:rPr lang="en-US" sz="3000" dirty="0" smtClean="0"/>
               <a:t>alve</a:t>
             </a:r>
-            <a:endParaRPr lang="en-US" sz="3000" dirty="0" smtClean="0"/>
           </a:p>
           <a:p>
             <a:r>
@@ -14521,7 +14843,6 @@
               <a:rPr lang="en-US" sz="3000" dirty="0" smtClean="0"/>
               <a:t>ubing</a:t>
             </a:r>
-            <a:endParaRPr lang="en-US" sz="3000" dirty="0" smtClean="0"/>
           </a:p>
         </p:txBody>
       </p:sp>
@@ -14701,13 +15022,8 @@
           <a:p>
             <a:r>
               <a:rPr lang="en-US" dirty="0" smtClean="0"/>
-              <a:t>Select appropriate pneumatic components </a:t>
-            </a:r>
-            <a:r>
-              <a:rPr lang="en-US" dirty="0" smtClean="0"/>
-              <a:t>based on needed specifications</a:t>
-            </a:r>
-            <a:endParaRPr lang="en-US" dirty="0" smtClean="0"/>
+              <a:t>Select appropriate pneumatic components based on needed specifications</a:t>
+            </a:r>
           </a:p>
           <a:p>
             <a:r>
@@ -14992,7 +15308,7 @@
   <a:extraClrSchemeLst/>
   <a:extLst>
     <a:ext uri="{05A4C25C-085E-4340-85A3-A5531E510DB2}">
-      <thm15:themeFamily xmlns:thm15="http://schemas.microsoft.com/office/thememl/2012/main" xmlns="" name="Circuit" id="{0AC2F7E7-15F5-431C-B2A2-456FE929F56C}" vid="{142578CA-DEC9-49C3-80AF-C113973CC9A9}"/>
+      <thm15:themeFamily xmlns:thm15="http://schemas.microsoft.com/office/thememl/2012/main" name="Circuit" id="{0AC2F7E7-15F5-431C-B2A2-456FE929F56C}" vid="{142578CA-DEC9-49C3-80AF-C113973CC9A9}"/>
     </a:ext>
   </a:extLst>
 </a:theme>

</xml_diff>